<commit_message>
No changes, just zoomed out.
</commit_message>
<xml_diff>
--- a/slides/KeyStone Advanced Debug.pptx
+++ b/slides/KeyStone Advanced Debug.pptx
@@ -1129,6 +1129,13 @@
         </dgm:presLayoutVars>
       </dgm:prSet>
       <dgm:spPr/>
+      <dgm:t>
+        <a:bodyPr/>
+        <a:lstStyle/>
+        <a:p>
+          <a:endParaRPr lang="en-US"/>
+        </a:p>
+      </dgm:t>
     </dgm:pt>
     <dgm:pt modelId="{9D1A61A1-B2AA-4F6A-AD68-CA1F7CD1DF22}" type="pres">
       <dgm:prSet presAssocID="{DC1518B7-EDD6-4CCF-9688-BF43B6ABDDB5}" presName="node" presStyleLbl="node1" presStyleIdx="0" presStyleCnt="5">
@@ -1137,14 +1144,35 @@
         </dgm:presLayoutVars>
       </dgm:prSet>
       <dgm:spPr/>
+      <dgm:t>
+        <a:bodyPr/>
+        <a:lstStyle/>
+        <a:p>
+          <a:endParaRPr lang="en-US"/>
+        </a:p>
+      </dgm:t>
     </dgm:pt>
     <dgm:pt modelId="{2C793FD2-6A40-488B-8088-8D409044269C}" type="pres">
       <dgm:prSet presAssocID="{3E71EEED-B8A8-41CA-92B7-5F1CDAF3BE2F}" presName="sibTrans" presStyleLbl="sibTrans2D1" presStyleIdx="0" presStyleCnt="5"/>
       <dgm:spPr/>
+      <dgm:t>
+        <a:bodyPr/>
+        <a:lstStyle/>
+        <a:p>
+          <a:endParaRPr lang="en-US"/>
+        </a:p>
+      </dgm:t>
     </dgm:pt>
     <dgm:pt modelId="{586AA159-1625-454D-A036-99A7A81CC350}" type="pres">
       <dgm:prSet presAssocID="{3E71EEED-B8A8-41CA-92B7-5F1CDAF3BE2F}" presName="connectorText" presStyleLbl="sibTrans2D1" presStyleIdx="0" presStyleCnt="5"/>
       <dgm:spPr/>
+      <dgm:t>
+        <a:bodyPr/>
+        <a:lstStyle/>
+        <a:p>
+          <a:endParaRPr lang="en-US"/>
+        </a:p>
+      </dgm:t>
     </dgm:pt>
     <dgm:pt modelId="{4CFB935C-7860-4776-A04C-834BDF85D630}" type="pres">
       <dgm:prSet presAssocID="{142584DF-DF37-4E4D-8B12-3F1186ED8A79}" presName="node" presStyleLbl="node1" presStyleIdx="1" presStyleCnt="5">
@@ -1153,14 +1181,35 @@
         </dgm:presLayoutVars>
       </dgm:prSet>
       <dgm:spPr/>
+      <dgm:t>
+        <a:bodyPr/>
+        <a:lstStyle/>
+        <a:p>
+          <a:endParaRPr lang="en-US"/>
+        </a:p>
+      </dgm:t>
     </dgm:pt>
     <dgm:pt modelId="{194CE3CF-2BF2-4AF5-9CEB-61305F2C5E2D}" type="pres">
       <dgm:prSet presAssocID="{F9A12A89-8926-472F-A7F2-6C018E0DE993}" presName="sibTrans" presStyleLbl="sibTrans2D1" presStyleIdx="1" presStyleCnt="5"/>
       <dgm:spPr/>
+      <dgm:t>
+        <a:bodyPr/>
+        <a:lstStyle/>
+        <a:p>
+          <a:endParaRPr lang="en-US"/>
+        </a:p>
+      </dgm:t>
     </dgm:pt>
     <dgm:pt modelId="{CFCBAE3F-24A5-4178-8FA4-D975A8B7374E}" type="pres">
       <dgm:prSet presAssocID="{F9A12A89-8926-472F-A7F2-6C018E0DE993}" presName="connectorText" presStyleLbl="sibTrans2D1" presStyleIdx="1" presStyleCnt="5"/>
       <dgm:spPr/>
+      <dgm:t>
+        <a:bodyPr/>
+        <a:lstStyle/>
+        <a:p>
+          <a:endParaRPr lang="en-US"/>
+        </a:p>
+      </dgm:t>
     </dgm:pt>
     <dgm:pt modelId="{EA63BA78-DFE1-4E32-B4E3-D3637C87D01A}" type="pres">
       <dgm:prSet presAssocID="{94959A71-8399-4743-A822-4B2822F36EB9}" presName="node" presStyleLbl="node1" presStyleIdx="2" presStyleCnt="5">
@@ -1169,14 +1218,35 @@
         </dgm:presLayoutVars>
       </dgm:prSet>
       <dgm:spPr/>
+      <dgm:t>
+        <a:bodyPr/>
+        <a:lstStyle/>
+        <a:p>
+          <a:endParaRPr lang="en-US"/>
+        </a:p>
+      </dgm:t>
     </dgm:pt>
     <dgm:pt modelId="{DA3308EA-AC4F-4F40-B121-EF1B7A77DC44}" type="pres">
       <dgm:prSet presAssocID="{341A2B66-E7B4-4CCE-A800-2D09F00E988D}" presName="sibTrans" presStyleLbl="sibTrans2D1" presStyleIdx="2" presStyleCnt="5"/>
       <dgm:spPr/>
+      <dgm:t>
+        <a:bodyPr/>
+        <a:lstStyle/>
+        <a:p>
+          <a:endParaRPr lang="en-US"/>
+        </a:p>
+      </dgm:t>
     </dgm:pt>
     <dgm:pt modelId="{D328AB4C-7799-47B7-A8F1-3355D4AEDC1D}" type="pres">
       <dgm:prSet presAssocID="{341A2B66-E7B4-4CCE-A800-2D09F00E988D}" presName="connectorText" presStyleLbl="sibTrans2D1" presStyleIdx="2" presStyleCnt="5"/>
       <dgm:spPr/>
+      <dgm:t>
+        <a:bodyPr/>
+        <a:lstStyle/>
+        <a:p>
+          <a:endParaRPr lang="en-US"/>
+        </a:p>
+      </dgm:t>
     </dgm:pt>
     <dgm:pt modelId="{7865197D-6E8D-4FFF-BEF4-77D19CDA6748}" type="pres">
       <dgm:prSet presAssocID="{1303FBFC-9B1F-43AD-A9CC-01EC7DFCCA63}" presName="node" presStyleLbl="node1" presStyleIdx="3" presStyleCnt="5">
@@ -1185,14 +1255,35 @@
         </dgm:presLayoutVars>
       </dgm:prSet>
       <dgm:spPr/>
+      <dgm:t>
+        <a:bodyPr/>
+        <a:lstStyle/>
+        <a:p>
+          <a:endParaRPr lang="en-US"/>
+        </a:p>
+      </dgm:t>
     </dgm:pt>
     <dgm:pt modelId="{BAAC15F4-9D1D-4DF8-800E-A898ABC0F2AB}" type="pres">
       <dgm:prSet presAssocID="{963AB9C7-534E-4244-8795-2DE50C0AAE1A}" presName="sibTrans" presStyleLbl="sibTrans2D1" presStyleIdx="3" presStyleCnt="5"/>
       <dgm:spPr/>
+      <dgm:t>
+        <a:bodyPr/>
+        <a:lstStyle/>
+        <a:p>
+          <a:endParaRPr lang="en-US"/>
+        </a:p>
+      </dgm:t>
     </dgm:pt>
     <dgm:pt modelId="{1020FBBB-690C-4821-A794-B22748BC07F6}" type="pres">
       <dgm:prSet presAssocID="{963AB9C7-534E-4244-8795-2DE50C0AAE1A}" presName="connectorText" presStyleLbl="sibTrans2D1" presStyleIdx="3" presStyleCnt="5"/>
       <dgm:spPr/>
+      <dgm:t>
+        <a:bodyPr/>
+        <a:lstStyle/>
+        <a:p>
+          <a:endParaRPr lang="en-US"/>
+        </a:p>
+      </dgm:t>
     </dgm:pt>
     <dgm:pt modelId="{7154A4FA-E800-40EB-A87E-5CECCE812433}" type="pres">
       <dgm:prSet presAssocID="{604DED0C-C7D1-44E9-9D91-4EA86CC58132}" presName="node" presStyleLbl="node1" presStyleIdx="4" presStyleCnt="5">
@@ -1201,14 +1292,35 @@
         </dgm:presLayoutVars>
       </dgm:prSet>
       <dgm:spPr/>
+      <dgm:t>
+        <a:bodyPr/>
+        <a:lstStyle/>
+        <a:p>
+          <a:endParaRPr lang="en-US"/>
+        </a:p>
+      </dgm:t>
     </dgm:pt>
     <dgm:pt modelId="{58C57B0B-F787-4E7B-A44C-92F01115E8E7}" type="pres">
       <dgm:prSet presAssocID="{F9D67482-08A8-41D2-A4D4-28EF53768755}" presName="sibTrans" presStyleLbl="sibTrans2D1" presStyleIdx="4" presStyleCnt="5"/>
       <dgm:spPr/>
+      <dgm:t>
+        <a:bodyPr/>
+        <a:lstStyle/>
+        <a:p>
+          <a:endParaRPr lang="en-US"/>
+        </a:p>
+      </dgm:t>
     </dgm:pt>
     <dgm:pt modelId="{0DE8E6C8-D66E-45A0-B23D-743ED7603BE1}" type="pres">
       <dgm:prSet presAssocID="{F9D67482-08A8-41D2-A4D4-28EF53768755}" presName="connectorText" presStyleLbl="sibTrans2D1" presStyleIdx="4" presStyleCnt="5"/>
       <dgm:spPr/>
+      <dgm:t>
+        <a:bodyPr/>
+        <a:lstStyle/>
+        <a:p>
+          <a:endParaRPr lang="en-US"/>
+        </a:p>
+      </dgm:t>
     </dgm:pt>
   </dgm:ptLst>
   <dgm:cxnLst>
@@ -1217,8 +1329,8 @@
     <dgm:cxn modelId="{FB579B80-661A-4626-B61F-E71F4E734262}" type="presOf" srcId="{142584DF-DF37-4E4D-8B12-3F1186ED8A79}" destId="{4CFB935C-7860-4776-A04C-834BDF85D630}" srcOrd="0" destOrd="0" presId="urn:microsoft.com/office/officeart/2005/8/layout/cycle2"/>
     <dgm:cxn modelId="{F708609E-B605-4F54-9CB0-43BFD707546D}" type="presOf" srcId="{DC1518B7-EDD6-4CCF-9688-BF43B6ABDDB5}" destId="{9D1A61A1-B2AA-4F6A-AD68-CA1F7CD1DF22}" srcOrd="0" destOrd="0" presId="urn:microsoft.com/office/officeart/2005/8/layout/cycle2"/>
     <dgm:cxn modelId="{1D8D5F4A-711A-4C36-9FDB-4E9DFB74713E}" type="presOf" srcId="{341A2B66-E7B4-4CCE-A800-2D09F00E988D}" destId="{DA3308EA-AC4F-4F40-B121-EF1B7A77DC44}" srcOrd="0" destOrd="0" presId="urn:microsoft.com/office/officeart/2005/8/layout/cycle2"/>
+    <dgm:cxn modelId="{457A18C9-81F1-4A35-ADA5-3C23816981B3}" type="presOf" srcId="{F9D67482-08A8-41D2-A4D4-28EF53768755}" destId="{58C57B0B-F787-4E7B-A44C-92F01115E8E7}" srcOrd="0" destOrd="0" presId="urn:microsoft.com/office/officeart/2005/8/layout/cycle2"/>
     <dgm:cxn modelId="{8000DA2E-31CB-4AD9-AF9B-52BAB5602E59}" srcId="{FD57CCFC-B83B-464C-88F8-BC6450268F97}" destId="{142584DF-DF37-4E4D-8B12-3F1186ED8A79}" srcOrd="1" destOrd="0" parTransId="{ED9FF5C5-2955-4ABE-8CBD-A291C105BC10}" sibTransId="{F9A12A89-8926-472F-A7F2-6C018E0DE993}"/>
-    <dgm:cxn modelId="{457A18C9-81F1-4A35-ADA5-3C23816981B3}" type="presOf" srcId="{F9D67482-08A8-41D2-A4D4-28EF53768755}" destId="{58C57B0B-F787-4E7B-A44C-92F01115E8E7}" srcOrd="0" destOrd="0" presId="urn:microsoft.com/office/officeart/2005/8/layout/cycle2"/>
     <dgm:cxn modelId="{856A50DA-D64A-4647-9709-42A133F935EB}" type="presOf" srcId="{963AB9C7-534E-4244-8795-2DE50C0AAE1A}" destId="{BAAC15F4-9D1D-4DF8-800E-A898ABC0F2AB}" srcOrd="0" destOrd="0" presId="urn:microsoft.com/office/officeart/2005/8/layout/cycle2"/>
     <dgm:cxn modelId="{5BC36940-CB7A-4758-BE58-DC68FE675A98}" type="presOf" srcId="{F9D67482-08A8-41D2-A4D4-28EF53768755}" destId="{0DE8E6C8-D66E-45A0-B23D-743ED7603BE1}" srcOrd="1" destOrd="0" presId="urn:microsoft.com/office/officeart/2005/8/layout/cycle2"/>
     <dgm:cxn modelId="{5BBB9AAA-3A31-48A0-9041-47E02695D120}" type="presOf" srcId="{341A2B66-E7B4-4CCE-A800-2D09F00E988D}" destId="{D328AB4C-7799-47B7-A8F1-3355D4AEDC1D}" srcOrd="1" destOrd="0" presId="urn:microsoft.com/office/officeart/2005/8/layout/cycle2"/>
@@ -1230,8 +1342,8 @@
     <dgm:cxn modelId="{0A57CA8B-CCE8-45FB-ABAA-4658A3B96B41}" srcId="{FD57CCFC-B83B-464C-88F8-BC6450268F97}" destId="{94959A71-8399-4743-A822-4B2822F36EB9}" srcOrd="2" destOrd="0" parTransId="{7B73C905-77F1-455E-8A1E-1C07DA733669}" sibTransId="{341A2B66-E7B4-4CCE-A800-2D09F00E988D}"/>
     <dgm:cxn modelId="{83F18F01-1EBB-4F68-A566-C281ACD257AA}" type="presOf" srcId="{F9A12A89-8926-472F-A7F2-6C018E0DE993}" destId="{194CE3CF-2BF2-4AF5-9CEB-61305F2C5E2D}" srcOrd="0" destOrd="0" presId="urn:microsoft.com/office/officeart/2005/8/layout/cycle2"/>
     <dgm:cxn modelId="{A6CED050-C5D2-4A6A-B3EA-9375EB900D7C}" type="presOf" srcId="{1303FBFC-9B1F-43AD-A9CC-01EC7DFCCA63}" destId="{7865197D-6E8D-4FFF-BEF4-77D19CDA6748}" srcOrd="0" destOrd="0" presId="urn:microsoft.com/office/officeart/2005/8/layout/cycle2"/>
+    <dgm:cxn modelId="{782EF038-CBD4-42BC-9F87-E70F0C5BA753}" type="presOf" srcId="{604DED0C-C7D1-44E9-9D91-4EA86CC58132}" destId="{7154A4FA-E800-40EB-A87E-5CECCE812433}" srcOrd="0" destOrd="0" presId="urn:microsoft.com/office/officeart/2005/8/layout/cycle2"/>
     <dgm:cxn modelId="{7A19FA8A-9349-4A90-96EE-3F1BEED66291}" type="presOf" srcId="{963AB9C7-534E-4244-8795-2DE50C0AAE1A}" destId="{1020FBBB-690C-4821-A794-B22748BC07F6}" srcOrd="1" destOrd="0" presId="urn:microsoft.com/office/officeart/2005/8/layout/cycle2"/>
-    <dgm:cxn modelId="{782EF038-CBD4-42BC-9F87-E70F0C5BA753}" type="presOf" srcId="{604DED0C-C7D1-44E9-9D91-4EA86CC58132}" destId="{7154A4FA-E800-40EB-A87E-5CECCE812433}" srcOrd="0" destOrd="0" presId="urn:microsoft.com/office/officeart/2005/8/layout/cycle2"/>
     <dgm:cxn modelId="{8318BC13-B71D-4942-9198-291D21A68FEF}" srcId="{FD57CCFC-B83B-464C-88F8-BC6450268F97}" destId="{604DED0C-C7D1-44E9-9D91-4EA86CC58132}" srcOrd="4" destOrd="0" parTransId="{80FF181E-2F3F-4C95-B016-991B121BE693}" sibTransId="{F9D67482-08A8-41D2-A4D4-28EF53768755}"/>
     <dgm:cxn modelId="{9E0C6E45-BB6E-4222-ABBC-A7113BC40F60}" type="presParOf" srcId="{67A0B1C8-6388-410F-ABFD-B0A6F2F228F7}" destId="{9D1A61A1-B2AA-4F6A-AD68-CA1F7CD1DF22}" srcOrd="0" destOrd="0" presId="urn:microsoft.com/office/officeart/2005/8/layout/cycle2"/>
     <dgm:cxn modelId="{97FEE296-E53E-47B7-988E-0AECC9F987D1}" type="presParOf" srcId="{67A0B1C8-6388-410F-ABFD-B0A6F2F228F7}" destId="{2C793FD2-6A40-488B-8088-8D409044269C}" srcOrd="1" destOrd="0" presId="urn:microsoft.com/office/officeart/2005/8/layout/cycle2"/>
@@ -1267,774 +1379,6 @@
       <dsp:cNvGrpSpPr/>
     </dsp:nvGrpSpPr>
     <dsp:grpSpPr/>
-    <dsp:sp modelId="{9D1A61A1-B2AA-4F6A-AD68-CA1F7CD1DF22}">
-      <dsp:nvSpPr>
-        <dsp:cNvPr id="0" name=""/>
-        <dsp:cNvSpPr/>
-      </dsp:nvSpPr>
-      <dsp:spPr>
-        <a:xfrm>
-          <a:off x="1520465" y="879"/>
-          <a:ext cx="1150069" cy="1150069"/>
-        </a:xfrm>
-        <a:prstGeom prst="ellipse">
-          <a:avLst/>
-        </a:prstGeom>
-        <a:solidFill>
-          <a:schemeClr val="accent1">
-            <a:hueOff val="0"/>
-            <a:satOff val="0"/>
-            <a:lumOff val="0"/>
-            <a:alphaOff val="0"/>
-          </a:schemeClr>
-        </a:solidFill>
-        <a:ln w="25400" cap="flat" cmpd="sng" algn="ctr">
-          <a:solidFill>
-            <a:schemeClr val="lt1">
-              <a:hueOff val="0"/>
-              <a:satOff val="0"/>
-              <a:lumOff val="0"/>
-              <a:alphaOff val="0"/>
-            </a:schemeClr>
-          </a:solidFill>
-          <a:prstDash val="solid"/>
-        </a:ln>
-        <a:effectLst/>
-      </dsp:spPr>
-      <dsp:style>
-        <a:lnRef idx="2">
-          <a:scrgbClr r="0" g="0" b="0"/>
-        </a:lnRef>
-        <a:fillRef idx="1">
-          <a:scrgbClr r="0" g="0" b="0"/>
-        </a:fillRef>
-        <a:effectRef idx="0">
-          <a:scrgbClr r="0" g="0" b="0"/>
-        </a:effectRef>
-        <a:fontRef idx="minor">
-          <a:schemeClr val="lt1"/>
-        </a:fontRef>
-      </dsp:style>
-      <dsp:txBody>
-        <a:bodyPr spcFirstLastPara="0" vert="horz" wrap="square" lIns="36830" tIns="36830" rIns="36830" bIns="36830" numCol="1" spcCol="1270" anchor="ctr" anchorCtr="0">
-          <a:noAutofit/>
-        </a:bodyPr>
-        <a:lstStyle/>
-        <a:p>
-          <a:pPr lvl="0" algn="ctr" defTabSz="1289050">
-            <a:lnSpc>
-              <a:spcPct val="90000"/>
-            </a:lnSpc>
-            <a:spcBef>
-              <a:spcPct val="0"/>
-            </a:spcBef>
-            <a:spcAft>
-              <a:spcPct val="35000"/>
-            </a:spcAft>
-          </a:pPr>
-          <a:r>
-            <a:rPr lang="en-US" sz="2900" kern="1200" dirty="0" smtClean="0"/>
-            <a:t>TSK0</a:t>
-          </a:r>
-          <a:endParaRPr lang="en-US" sz="2900" kern="1200" dirty="0"/>
-        </a:p>
-      </dsp:txBody>
-      <dsp:txXfrm>
-        <a:off x="1520465" y="879"/>
-        <a:ext cx="1150069" cy="1150069"/>
-      </dsp:txXfrm>
-    </dsp:sp>
-    <dsp:sp modelId="{2C793FD2-6A40-488B-8088-8D409044269C}">
-      <dsp:nvSpPr>
-        <dsp:cNvPr id="0" name=""/>
-        <dsp:cNvSpPr/>
-      </dsp:nvSpPr>
-      <dsp:spPr>
-        <a:xfrm rot="2160000">
-          <a:off x="2634247" y="884415"/>
-          <a:ext cx="305977" cy="388148"/>
-        </a:xfrm>
-        <a:prstGeom prst="rightArrow">
-          <a:avLst>
-            <a:gd name="adj1" fmla="val 60000"/>
-            <a:gd name="adj2" fmla="val 50000"/>
-          </a:avLst>
-        </a:prstGeom>
-        <a:solidFill>
-          <a:schemeClr val="accent1">
-            <a:tint val="60000"/>
-            <a:hueOff val="0"/>
-            <a:satOff val="0"/>
-            <a:lumOff val="0"/>
-            <a:alphaOff val="0"/>
-          </a:schemeClr>
-        </a:solidFill>
-        <a:ln>
-          <a:noFill/>
-        </a:ln>
-        <a:effectLst/>
-      </dsp:spPr>
-      <dsp:style>
-        <a:lnRef idx="0">
-          <a:scrgbClr r="0" g="0" b="0"/>
-        </a:lnRef>
-        <a:fillRef idx="1">
-          <a:scrgbClr r="0" g="0" b="0"/>
-        </a:fillRef>
-        <a:effectRef idx="0">
-          <a:scrgbClr r="0" g="0" b="0"/>
-        </a:effectRef>
-        <a:fontRef idx="minor">
-          <a:schemeClr val="lt1"/>
-        </a:fontRef>
-      </dsp:style>
-      <dsp:txBody>
-        <a:bodyPr spcFirstLastPara="0" vert="horz" wrap="square" lIns="0" tIns="0" rIns="0" bIns="0" numCol="1" spcCol="1270" anchor="ctr" anchorCtr="0">
-          <a:noAutofit/>
-        </a:bodyPr>
-        <a:lstStyle/>
-        <a:p>
-          <a:pPr lvl="0" algn="ctr" defTabSz="711200">
-            <a:lnSpc>
-              <a:spcPct val="90000"/>
-            </a:lnSpc>
-            <a:spcBef>
-              <a:spcPct val="0"/>
-            </a:spcBef>
-            <a:spcAft>
-              <a:spcPct val="35000"/>
-            </a:spcAft>
-          </a:pPr>
-          <a:endParaRPr lang="en-US" sz="1600" kern="1200"/>
-        </a:p>
-      </dsp:txBody>
-      <dsp:txXfrm rot="2160000">
-        <a:off x="2634247" y="884415"/>
-        <a:ext cx="305977" cy="388148"/>
-      </dsp:txXfrm>
-    </dsp:sp>
-    <dsp:sp modelId="{4CFB935C-7860-4776-A04C-834BDF85D630}">
-      <dsp:nvSpPr>
-        <dsp:cNvPr id="0" name=""/>
-        <dsp:cNvSpPr/>
-      </dsp:nvSpPr>
-      <dsp:spPr>
-        <a:xfrm>
-          <a:off x="2917948" y="1016210"/>
-          <a:ext cx="1150069" cy="1150069"/>
-        </a:xfrm>
-        <a:prstGeom prst="ellipse">
-          <a:avLst/>
-        </a:prstGeom>
-        <a:gradFill rotWithShape="1">
-          <a:gsLst>
-            <a:gs pos="0">
-              <a:schemeClr val="accent2">
-                <a:tint val="50000"/>
-                <a:satMod val="300000"/>
-              </a:schemeClr>
-            </a:gs>
-            <a:gs pos="35000">
-              <a:schemeClr val="accent2">
-                <a:tint val="37000"/>
-                <a:satMod val="300000"/>
-              </a:schemeClr>
-            </a:gs>
-            <a:gs pos="100000">
-              <a:schemeClr val="accent2">
-                <a:tint val="15000"/>
-                <a:satMod val="350000"/>
-              </a:schemeClr>
-            </a:gs>
-          </a:gsLst>
-          <a:lin ang="16200000" scaled="1"/>
-        </a:gradFill>
-        <a:ln w="9525" cap="flat" cmpd="sng" algn="ctr">
-          <a:solidFill>
-            <a:schemeClr val="accent2">
-              <a:shade val="95000"/>
-              <a:satMod val="105000"/>
-            </a:schemeClr>
-          </a:solidFill>
-          <a:prstDash val="solid"/>
-        </a:ln>
-        <a:effectLst>
-          <a:outerShdw blurRad="40000" dist="20000" dir="5400000" rotWithShape="0">
-            <a:srgbClr val="000000">
-              <a:alpha val="38000"/>
-            </a:srgbClr>
-          </a:outerShdw>
-        </a:effectLst>
-      </dsp:spPr>
-      <dsp:style>
-        <a:lnRef idx="1">
-          <a:schemeClr val="accent2"/>
-        </a:lnRef>
-        <a:fillRef idx="2">
-          <a:schemeClr val="accent2"/>
-        </a:fillRef>
-        <a:effectRef idx="1">
-          <a:schemeClr val="accent2"/>
-        </a:effectRef>
-        <a:fontRef idx="minor">
-          <a:schemeClr val="dk1"/>
-        </a:fontRef>
-      </dsp:style>
-      <dsp:txBody>
-        <a:bodyPr spcFirstLastPara="0" vert="horz" wrap="square" lIns="36830" tIns="36830" rIns="36830" bIns="36830" numCol="1" spcCol="1270" anchor="ctr" anchorCtr="0">
-          <a:noAutofit/>
-        </a:bodyPr>
-        <a:lstStyle/>
-        <a:p>
-          <a:pPr lvl="0" algn="ctr" defTabSz="1289050">
-            <a:lnSpc>
-              <a:spcPct val="90000"/>
-            </a:lnSpc>
-            <a:spcBef>
-              <a:spcPct val="0"/>
-            </a:spcBef>
-            <a:spcAft>
-              <a:spcPct val="35000"/>
-            </a:spcAft>
-          </a:pPr>
-          <a:r>
-            <a:rPr lang="en-US" sz="2900" kern="1200" dirty="0" smtClean="0"/>
-            <a:t>TSK1</a:t>
-          </a:r>
-          <a:endParaRPr lang="en-US" sz="2900" kern="1200" dirty="0"/>
-        </a:p>
-      </dsp:txBody>
-      <dsp:txXfrm>
-        <a:off x="2917948" y="1016210"/>
-        <a:ext cx="1150069" cy="1150069"/>
-      </dsp:txXfrm>
-    </dsp:sp>
-    <dsp:sp modelId="{194CE3CF-2BF2-4AF5-9CEB-61305F2C5E2D}">
-      <dsp:nvSpPr>
-        <dsp:cNvPr id="0" name=""/>
-        <dsp:cNvSpPr/>
-      </dsp:nvSpPr>
-      <dsp:spPr>
-        <a:xfrm rot="6480000">
-          <a:off x="3075775" y="2210355"/>
-          <a:ext cx="305977" cy="388148"/>
-        </a:xfrm>
-        <a:prstGeom prst="rightArrow">
-          <a:avLst>
-            <a:gd name="adj1" fmla="val 60000"/>
-            <a:gd name="adj2" fmla="val 50000"/>
-          </a:avLst>
-        </a:prstGeom>
-        <a:solidFill>
-          <a:schemeClr val="accent1">
-            <a:tint val="60000"/>
-            <a:hueOff val="0"/>
-            <a:satOff val="0"/>
-            <a:lumOff val="0"/>
-            <a:alphaOff val="0"/>
-          </a:schemeClr>
-        </a:solidFill>
-        <a:ln>
-          <a:noFill/>
-        </a:ln>
-        <a:effectLst/>
-      </dsp:spPr>
-      <dsp:style>
-        <a:lnRef idx="0">
-          <a:scrgbClr r="0" g="0" b="0"/>
-        </a:lnRef>
-        <a:fillRef idx="1">
-          <a:scrgbClr r="0" g="0" b="0"/>
-        </a:fillRef>
-        <a:effectRef idx="0">
-          <a:scrgbClr r="0" g="0" b="0"/>
-        </a:effectRef>
-        <a:fontRef idx="minor">
-          <a:schemeClr val="lt1"/>
-        </a:fontRef>
-      </dsp:style>
-      <dsp:txBody>
-        <a:bodyPr spcFirstLastPara="0" vert="horz" wrap="square" lIns="0" tIns="0" rIns="0" bIns="0" numCol="1" spcCol="1270" anchor="ctr" anchorCtr="0">
-          <a:noAutofit/>
-        </a:bodyPr>
-        <a:lstStyle/>
-        <a:p>
-          <a:pPr lvl="0" algn="ctr" defTabSz="711200">
-            <a:lnSpc>
-              <a:spcPct val="90000"/>
-            </a:lnSpc>
-            <a:spcBef>
-              <a:spcPct val="0"/>
-            </a:spcBef>
-            <a:spcAft>
-              <a:spcPct val="35000"/>
-            </a:spcAft>
-          </a:pPr>
-          <a:endParaRPr lang="en-US" sz="1600" kern="1200"/>
-        </a:p>
-      </dsp:txBody>
-      <dsp:txXfrm rot="6480000">
-        <a:off x="3075775" y="2210355"/>
-        <a:ext cx="305977" cy="388148"/>
-      </dsp:txXfrm>
-    </dsp:sp>
-    <dsp:sp modelId="{EA63BA78-DFE1-4E32-B4E3-D3637C87D01A}">
-      <dsp:nvSpPr>
-        <dsp:cNvPr id="0" name=""/>
-        <dsp:cNvSpPr/>
-      </dsp:nvSpPr>
-      <dsp:spPr>
-        <a:xfrm>
-          <a:off x="2384157" y="2659051"/>
-          <a:ext cx="1150069" cy="1150069"/>
-        </a:xfrm>
-        <a:prstGeom prst="ellipse">
-          <a:avLst/>
-        </a:prstGeom>
-        <a:solidFill>
-          <a:schemeClr val="accent1">
-            <a:hueOff val="0"/>
-            <a:satOff val="0"/>
-            <a:lumOff val="0"/>
-            <a:alphaOff val="0"/>
-          </a:schemeClr>
-        </a:solidFill>
-        <a:ln w="25400" cap="flat" cmpd="sng" algn="ctr">
-          <a:solidFill>
-            <a:schemeClr val="lt1">
-              <a:hueOff val="0"/>
-              <a:satOff val="0"/>
-              <a:lumOff val="0"/>
-              <a:alphaOff val="0"/>
-            </a:schemeClr>
-          </a:solidFill>
-          <a:prstDash val="solid"/>
-        </a:ln>
-        <a:effectLst/>
-      </dsp:spPr>
-      <dsp:style>
-        <a:lnRef idx="2">
-          <a:scrgbClr r="0" g="0" b="0"/>
-        </a:lnRef>
-        <a:fillRef idx="1">
-          <a:scrgbClr r="0" g="0" b="0"/>
-        </a:fillRef>
-        <a:effectRef idx="0">
-          <a:scrgbClr r="0" g="0" b="0"/>
-        </a:effectRef>
-        <a:fontRef idx="minor">
-          <a:schemeClr val="lt1"/>
-        </a:fontRef>
-      </dsp:style>
-      <dsp:txBody>
-        <a:bodyPr spcFirstLastPara="0" vert="horz" wrap="square" lIns="36830" tIns="36830" rIns="36830" bIns="36830" numCol="1" spcCol="1270" anchor="ctr" anchorCtr="0">
-          <a:noAutofit/>
-        </a:bodyPr>
-        <a:lstStyle/>
-        <a:p>
-          <a:pPr lvl="0" algn="ctr" defTabSz="1289050">
-            <a:lnSpc>
-              <a:spcPct val="90000"/>
-            </a:lnSpc>
-            <a:spcBef>
-              <a:spcPct val="0"/>
-            </a:spcBef>
-            <a:spcAft>
-              <a:spcPct val="35000"/>
-            </a:spcAft>
-          </a:pPr>
-          <a:r>
-            <a:rPr lang="en-US" sz="2900" kern="1200" dirty="0" smtClean="0"/>
-            <a:t>TSK2</a:t>
-          </a:r>
-          <a:endParaRPr lang="en-US" sz="2900" kern="1200" dirty="0"/>
-        </a:p>
-      </dsp:txBody>
-      <dsp:txXfrm>
-        <a:off x="2384157" y="2659051"/>
-        <a:ext cx="1150069" cy="1150069"/>
-      </dsp:txXfrm>
-    </dsp:sp>
-    <dsp:sp modelId="{DA3308EA-AC4F-4F40-B121-EF1B7A77DC44}">
-      <dsp:nvSpPr>
-        <dsp:cNvPr id="0" name=""/>
-        <dsp:cNvSpPr/>
-      </dsp:nvSpPr>
-      <dsp:spPr>
-        <a:xfrm rot="10800000">
-          <a:off x="1951171" y="3040011"/>
-          <a:ext cx="305977" cy="388148"/>
-        </a:xfrm>
-        <a:prstGeom prst="rightArrow">
-          <a:avLst>
-            <a:gd name="adj1" fmla="val 60000"/>
-            <a:gd name="adj2" fmla="val 50000"/>
-          </a:avLst>
-        </a:prstGeom>
-        <a:solidFill>
-          <a:schemeClr val="accent1">
-            <a:tint val="60000"/>
-            <a:hueOff val="0"/>
-            <a:satOff val="0"/>
-            <a:lumOff val="0"/>
-            <a:alphaOff val="0"/>
-          </a:schemeClr>
-        </a:solidFill>
-        <a:ln>
-          <a:noFill/>
-        </a:ln>
-        <a:effectLst/>
-      </dsp:spPr>
-      <dsp:style>
-        <a:lnRef idx="0">
-          <a:scrgbClr r="0" g="0" b="0"/>
-        </a:lnRef>
-        <a:fillRef idx="1">
-          <a:scrgbClr r="0" g="0" b="0"/>
-        </a:fillRef>
-        <a:effectRef idx="0">
-          <a:scrgbClr r="0" g="0" b="0"/>
-        </a:effectRef>
-        <a:fontRef idx="minor">
-          <a:schemeClr val="lt1"/>
-        </a:fontRef>
-      </dsp:style>
-      <dsp:txBody>
-        <a:bodyPr spcFirstLastPara="0" vert="horz" wrap="square" lIns="0" tIns="0" rIns="0" bIns="0" numCol="1" spcCol="1270" anchor="ctr" anchorCtr="0">
-          <a:noAutofit/>
-        </a:bodyPr>
-        <a:lstStyle/>
-        <a:p>
-          <a:pPr lvl="0" algn="ctr" defTabSz="711200">
-            <a:lnSpc>
-              <a:spcPct val="90000"/>
-            </a:lnSpc>
-            <a:spcBef>
-              <a:spcPct val="0"/>
-            </a:spcBef>
-            <a:spcAft>
-              <a:spcPct val="35000"/>
-            </a:spcAft>
-          </a:pPr>
-          <a:endParaRPr lang="en-US" sz="1600" kern="1200"/>
-        </a:p>
-      </dsp:txBody>
-      <dsp:txXfrm rot="10800000">
-        <a:off x="1951171" y="3040011"/>
-        <a:ext cx="305977" cy="388148"/>
-      </dsp:txXfrm>
-    </dsp:sp>
-    <dsp:sp modelId="{7865197D-6E8D-4FFF-BEF4-77D19CDA6748}">
-      <dsp:nvSpPr>
-        <dsp:cNvPr id="0" name=""/>
-        <dsp:cNvSpPr/>
-      </dsp:nvSpPr>
-      <dsp:spPr>
-        <a:xfrm>
-          <a:off x="656772" y="2659051"/>
-          <a:ext cx="1150069" cy="1150069"/>
-        </a:xfrm>
-        <a:prstGeom prst="ellipse">
-          <a:avLst/>
-        </a:prstGeom>
-        <a:gradFill rotWithShape="1">
-          <a:gsLst>
-            <a:gs pos="0">
-              <a:schemeClr val="accent2">
-                <a:tint val="50000"/>
-                <a:satMod val="300000"/>
-              </a:schemeClr>
-            </a:gs>
-            <a:gs pos="35000">
-              <a:schemeClr val="accent2">
-                <a:tint val="37000"/>
-                <a:satMod val="300000"/>
-              </a:schemeClr>
-            </a:gs>
-            <a:gs pos="100000">
-              <a:schemeClr val="accent2">
-                <a:tint val="15000"/>
-                <a:satMod val="350000"/>
-              </a:schemeClr>
-            </a:gs>
-          </a:gsLst>
-          <a:lin ang="16200000" scaled="1"/>
-        </a:gradFill>
-        <a:ln w="9525" cap="flat" cmpd="sng" algn="ctr">
-          <a:solidFill>
-            <a:schemeClr val="accent2">
-              <a:shade val="95000"/>
-              <a:satMod val="105000"/>
-            </a:schemeClr>
-          </a:solidFill>
-          <a:prstDash val="solid"/>
-        </a:ln>
-        <a:effectLst>
-          <a:outerShdw blurRad="40000" dist="20000" dir="5400000" rotWithShape="0">
-            <a:srgbClr val="000000">
-              <a:alpha val="38000"/>
-            </a:srgbClr>
-          </a:outerShdw>
-        </a:effectLst>
-      </dsp:spPr>
-      <dsp:style>
-        <a:lnRef idx="1">
-          <a:schemeClr val="accent2"/>
-        </a:lnRef>
-        <a:fillRef idx="2">
-          <a:schemeClr val="accent2"/>
-        </a:fillRef>
-        <a:effectRef idx="1">
-          <a:schemeClr val="accent2"/>
-        </a:effectRef>
-        <a:fontRef idx="minor">
-          <a:schemeClr val="dk1"/>
-        </a:fontRef>
-      </dsp:style>
-      <dsp:txBody>
-        <a:bodyPr spcFirstLastPara="0" vert="horz" wrap="square" lIns="36830" tIns="36830" rIns="36830" bIns="36830" numCol="1" spcCol="1270" anchor="ctr" anchorCtr="0">
-          <a:noAutofit/>
-        </a:bodyPr>
-        <a:lstStyle/>
-        <a:p>
-          <a:pPr lvl="0" algn="ctr" defTabSz="1289050">
-            <a:lnSpc>
-              <a:spcPct val="90000"/>
-            </a:lnSpc>
-            <a:spcBef>
-              <a:spcPct val="0"/>
-            </a:spcBef>
-            <a:spcAft>
-              <a:spcPct val="35000"/>
-            </a:spcAft>
-          </a:pPr>
-          <a:r>
-            <a:rPr lang="en-US" sz="2900" kern="1200" dirty="0" smtClean="0"/>
-            <a:t>TSK3</a:t>
-          </a:r>
-          <a:endParaRPr lang="en-US" sz="2900" kern="1200" dirty="0"/>
-        </a:p>
-      </dsp:txBody>
-      <dsp:txXfrm>
-        <a:off x="656772" y="2659051"/>
-        <a:ext cx="1150069" cy="1150069"/>
-      </dsp:txXfrm>
-    </dsp:sp>
-    <dsp:sp modelId="{BAAC15F4-9D1D-4DF8-800E-A898ABC0F2AB}">
-      <dsp:nvSpPr>
-        <dsp:cNvPr id="0" name=""/>
-        <dsp:cNvSpPr/>
-      </dsp:nvSpPr>
-      <dsp:spPr>
-        <a:xfrm rot="15120000">
-          <a:off x="814599" y="2226827"/>
-          <a:ext cx="305977" cy="388148"/>
-        </a:xfrm>
-        <a:prstGeom prst="rightArrow">
-          <a:avLst>
-            <a:gd name="adj1" fmla="val 60000"/>
-            <a:gd name="adj2" fmla="val 50000"/>
-          </a:avLst>
-        </a:prstGeom>
-        <a:solidFill>
-          <a:schemeClr val="accent1">
-            <a:tint val="60000"/>
-            <a:hueOff val="0"/>
-            <a:satOff val="0"/>
-            <a:lumOff val="0"/>
-            <a:alphaOff val="0"/>
-          </a:schemeClr>
-        </a:solidFill>
-        <a:ln>
-          <a:noFill/>
-        </a:ln>
-        <a:effectLst/>
-      </dsp:spPr>
-      <dsp:style>
-        <a:lnRef idx="0">
-          <a:scrgbClr r="0" g="0" b="0"/>
-        </a:lnRef>
-        <a:fillRef idx="1">
-          <a:scrgbClr r="0" g="0" b="0"/>
-        </a:fillRef>
-        <a:effectRef idx="0">
-          <a:scrgbClr r="0" g="0" b="0"/>
-        </a:effectRef>
-        <a:fontRef idx="minor">
-          <a:schemeClr val="lt1"/>
-        </a:fontRef>
-      </dsp:style>
-      <dsp:txBody>
-        <a:bodyPr spcFirstLastPara="0" vert="horz" wrap="square" lIns="0" tIns="0" rIns="0" bIns="0" numCol="1" spcCol="1270" anchor="ctr" anchorCtr="0">
-          <a:noAutofit/>
-        </a:bodyPr>
-        <a:lstStyle/>
-        <a:p>
-          <a:pPr lvl="0" algn="ctr" defTabSz="711200">
-            <a:lnSpc>
-              <a:spcPct val="90000"/>
-            </a:lnSpc>
-            <a:spcBef>
-              <a:spcPct val="0"/>
-            </a:spcBef>
-            <a:spcAft>
-              <a:spcPct val="35000"/>
-            </a:spcAft>
-          </a:pPr>
-          <a:endParaRPr lang="en-US" sz="1600" kern="1200"/>
-        </a:p>
-      </dsp:txBody>
-      <dsp:txXfrm rot="15120000">
-        <a:off x="814599" y="2226827"/>
-        <a:ext cx="305977" cy="388148"/>
-      </dsp:txXfrm>
-    </dsp:sp>
-    <dsp:sp modelId="{7154A4FA-E800-40EB-A87E-5CECCE812433}">
-      <dsp:nvSpPr>
-        <dsp:cNvPr id="0" name=""/>
-        <dsp:cNvSpPr/>
-      </dsp:nvSpPr>
-      <dsp:spPr>
-        <a:xfrm>
-          <a:off x="122981" y="1016210"/>
-          <a:ext cx="1150069" cy="1150069"/>
-        </a:xfrm>
-        <a:prstGeom prst="ellipse">
-          <a:avLst/>
-        </a:prstGeom>
-        <a:solidFill>
-          <a:schemeClr val="accent1">
-            <a:hueOff val="0"/>
-            <a:satOff val="0"/>
-            <a:lumOff val="0"/>
-            <a:alphaOff val="0"/>
-          </a:schemeClr>
-        </a:solidFill>
-        <a:ln w="25400" cap="flat" cmpd="sng" algn="ctr">
-          <a:solidFill>
-            <a:schemeClr val="lt1">
-              <a:hueOff val="0"/>
-              <a:satOff val="0"/>
-              <a:lumOff val="0"/>
-              <a:alphaOff val="0"/>
-            </a:schemeClr>
-          </a:solidFill>
-          <a:prstDash val="solid"/>
-        </a:ln>
-        <a:effectLst/>
-      </dsp:spPr>
-      <dsp:style>
-        <a:lnRef idx="2">
-          <a:scrgbClr r="0" g="0" b="0"/>
-        </a:lnRef>
-        <a:fillRef idx="1">
-          <a:scrgbClr r="0" g="0" b="0"/>
-        </a:fillRef>
-        <a:effectRef idx="0">
-          <a:scrgbClr r="0" g="0" b="0"/>
-        </a:effectRef>
-        <a:fontRef idx="minor">
-          <a:schemeClr val="lt1"/>
-        </a:fontRef>
-      </dsp:style>
-      <dsp:txBody>
-        <a:bodyPr spcFirstLastPara="0" vert="horz" wrap="square" lIns="36830" tIns="36830" rIns="36830" bIns="36830" numCol="1" spcCol="1270" anchor="ctr" anchorCtr="0">
-          <a:noAutofit/>
-        </a:bodyPr>
-        <a:lstStyle/>
-        <a:p>
-          <a:pPr lvl="0" algn="ctr" defTabSz="1289050">
-            <a:lnSpc>
-              <a:spcPct val="90000"/>
-            </a:lnSpc>
-            <a:spcBef>
-              <a:spcPct val="0"/>
-            </a:spcBef>
-            <a:spcAft>
-              <a:spcPct val="35000"/>
-            </a:spcAft>
-          </a:pPr>
-          <a:r>
-            <a:rPr lang="en-US" sz="2900" kern="1200" dirty="0" smtClean="0"/>
-            <a:t>TSK4</a:t>
-          </a:r>
-          <a:endParaRPr lang="en-US" sz="2900" kern="1200" dirty="0"/>
-        </a:p>
-      </dsp:txBody>
-      <dsp:txXfrm>
-        <a:off x="122981" y="1016210"/>
-        <a:ext cx="1150069" cy="1150069"/>
-      </dsp:txXfrm>
-    </dsp:sp>
-    <dsp:sp modelId="{58C57B0B-F787-4E7B-A44C-92F01115E8E7}">
-      <dsp:nvSpPr>
-        <dsp:cNvPr id="0" name=""/>
-        <dsp:cNvSpPr/>
-      </dsp:nvSpPr>
-      <dsp:spPr>
-        <a:xfrm rot="19440000">
-          <a:off x="1236763" y="894595"/>
-          <a:ext cx="305977" cy="388148"/>
-        </a:xfrm>
-        <a:prstGeom prst="rightArrow">
-          <a:avLst>
-            <a:gd name="adj1" fmla="val 60000"/>
-            <a:gd name="adj2" fmla="val 50000"/>
-          </a:avLst>
-        </a:prstGeom>
-        <a:solidFill>
-          <a:schemeClr val="accent1">
-            <a:tint val="60000"/>
-            <a:hueOff val="0"/>
-            <a:satOff val="0"/>
-            <a:lumOff val="0"/>
-            <a:alphaOff val="0"/>
-          </a:schemeClr>
-        </a:solidFill>
-        <a:ln>
-          <a:noFill/>
-        </a:ln>
-        <a:effectLst/>
-      </dsp:spPr>
-      <dsp:style>
-        <a:lnRef idx="0">
-          <a:scrgbClr r="0" g="0" b="0"/>
-        </a:lnRef>
-        <a:fillRef idx="1">
-          <a:scrgbClr r="0" g="0" b="0"/>
-        </a:fillRef>
-        <a:effectRef idx="0">
-          <a:scrgbClr r="0" g="0" b="0"/>
-        </a:effectRef>
-        <a:fontRef idx="minor">
-          <a:schemeClr val="lt1"/>
-        </a:fontRef>
-      </dsp:style>
-      <dsp:txBody>
-        <a:bodyPr spcFirstLastPara="0" vert="horz" wrap="square" lIns="0" tIns="0" rIns="0" bIns="0" numCol="1" spcCol="1270" anchor="ctr" anchorCtr="0">
-          <a:noAutofit/>
-        </a:bodyPr>
-        <a:lstStyle/>
-        <a:p>
-          <a:pPr lvl="0" algn="ctr" defTabSz="711200">
-            <a:lnSpc>
-              <a:spcPct val="90000"/>
-            </a:lnSpc>
-            <a:spcBef>
-              <a:spcPct val="0"/>
-            </a:spcBef>
-            <a:spcAft>
-              <a:spcPct val="35000"/>
-            </a:spcAft>
-          </a:pPr>
-          <a:endParaRPr lang="en-US" sz="1600" kern="1200"/>
-        </a:p>
-      </dsp:txBody>
-      <dsp:txXfrm rot="19440000">
-        <a:off x="1236763" y="894595"/>
-        <a:ext cx="305977" cy="388148"/>
-      </dsp:txXfrm>
-    </dsp:sp>
   </dsp:spTree>
 </dsp:drawing>
 </file>
@@ -3367,7 +2711,7 @@
             <a:fld id="{E168EC2E-7004-4E52-B364-EF7EFD24F792}" type="datetimeFigureOut">
               <a:rPr lang="en-US" smtClean="0"/>
               <a:pPr/>
-              <a:t>4/30/2012</a:t>
+              <a:t>5/3/2012</a:t>
             </a:fld>
             <a:endParaRPr lang="en-US"/>
           </a:p>

</xml_diff>

<commit_message>
Fixed Ottawa tag to be the same format as the others.
</commit_message>
<xml_diff>
--- a/slides/KeyStone Advanced Debug.pptx
+++ b/slides/KeyStone Advanced Debug.pptx
@@ -1129,13 +1129,6 @@
         </dgm:presLayoutVars>
       </dgm:prSet>
       <dgm:spPr/>
-      <dgm:t>
-        <a:bodyPr/>
-        <a:lstStyle/>
-        <a:p>
-          <a:endParaRPr lang="en-US"/>
-        </a:p>
-      </dgm:t>
     </dgm:pt>
     <dgm:pt modelId="{9D1A61A1-B2AA-4F6A-AD68-CA1F7CD1DF22}" type="pres">
       <dgm:prSet presAssocID="{DC1518B7-EDD6-4CCF-9688-BF43B6ABDDB5}" presName="node" presStyleLbl="node1" presStyleIdx="0" presStyleCnt="5">
@@ -1144,35 +1137,14 @@
         </dgm:presLayoutVars>
       </dgm:prSet>
       <dgm:spPr/>
-      <dgm:t>
-        <a:bodyPr/>
-        <a:lstStyle/>
-        <a:p>
-          <a:endParaRPr lang="en-US"/>
-        </a:p>
-      </dgm:t>
     </dgm:pt>
     <dgm:pt modelId="{2C793FD2-6A40-488B-8088-8D409044269C}" type="pres">
       <dgm:prSet presAssocID="{3E71EEED-B8A8-41CA-92B7-5F1CDAF3BE2F}" presName="sibTrans" presStyleLbl="sibTrans2D1" presStyleIdx="0" presStyleCnt="5"/>
       <dgm:spPr/>
-      <dgm:t>
-        <a:bodyPr/>
-        <a:lstStyle/>
-        <a:p>
-          <a:endParaRPr lang="en-US"/>
-        </a:p>
-      </dgm:t>
     </dgm:pt>
     <dgm:pt modelId="{586AA159-1625-454D-A036-99A7A81CC350}" type="pres">
       <dgm:prSet presAssocID="{3E71EEED-B8A8-41CA-92B7-5F1CDAF3BE2F}" presName="connectorText" presStyleLbl="sibTrans2D1" presStyleIdx="0" presStyleCnt="5"/>
       <dgm:spPr/>
-      <dgm:t>
-        <a:bodyPr/>
-        <a:lstStyle/>
-        <a:p>
-          <a:endParaRPr lang="en-US"/>
-        </a:p>
-      </dgm:t>
     </dgm:pt>
     <dgm:pt modelId="{4CFB935C-7860-4776-A04C-834BDF85D630}" type="pres">
       <dgm:prSet presAssocID="{142584DF-DF37-4E4D-8B12-3F1186ED8A79}" presName="node" presStyleLbl="node1" presStyleIdx="1" presStyleCnt="5">
@@ -1181,35 +1153,14 @@
         </dgm:presLayoutVars>
       </dgm:prSet>
       <dgm:spPr/>
-      <dgm:t>
-        <a:bodyPr/>
-        <a:lstStyle/>
-        <a:p>
-          <a:endParaRPr lang="en-US"/>
-        </a:p>
-      </dgm:t>
     </dgm:pt>
     <dgm:pt modelId="{194CE3CF-2BF2-4AF5-9CEB-61305F2C5E2D}" type="pres">
       <dgm:prSet presAssocID="{F9A12A89-8926-472F-A7F2-6C018E0DE993}" presName="sibTrans" presStyleLbl="sibTrans2D1" presStyleIdx="1" presStyleCnt="5"/>
       <dgm:spPr/>
-      <dgm:t>
-        <a:bodyPr/>
-        <a:lstStyle/>
-        <a:p>
-          <a:endParaRPr lang="en-US"/>
-        </a:p>
-      </dgm:t>
     </dgm:pt>
     <dgm:pt modelId="{CFCBAE3F-24A5-4178-8FA4-D975A8B7374E}" type="pres">
       <dgm:prSet presAssocID="{F9A12A89-8926-472F-A7F2-6C018E0DE993}" presName="connectorText" presStyleLbl="sibTrans2D1" presStyleIdx="1" presStyleCnt="5"/>
       <dgm:spPr/>
-      <dgm:t>
-        <a:bodyPr/>
-        <a:lstStyle/>
-        <a:p>
-          <a:endParaRPr lang="en-US"/>
-        </a:p>
-      </dgm:t>
     </dgm:pt>
     <dgm:pt modelId="{EA63BA78-DFE1-4E32-B4E3-D3637C87D01A}" type="pres">
       <dgm:prSet presAssocID="{94959A71-8399-4743-A822-4B2822F36EB9}" presName="node" presStyleLbl="node1" presStyleIdx="2" presStyleCnt="5">
@@ -1218,35 +1169,14 @@
         </dgm:presLayoutVars>
       </dgm:prSet>
       <dgm:spPr/>
-      <dgm:t>
-        <a:bodyPr/>
-        <a:lstStyle/>
-        <a:p>
-          <a:endParaRPr lang="en-US"/>
-        </a:p>
-      </dgm:t>
     </dgm:pt>
     <dgm:pt modelId="{DA3308EA-AC4F-4F40-B121-EF1B7A77DC44}" type="pres">
       <dgm:prSet presAssocID="{341A2B66-E7B4-4CCE-A800-2D09F00E988D}" presName="sibTrans" presStyleLbl="sibTrans2D1" presStyleIdx="2" presStyleCnt="5"/>
       <dgm:spPr/>
-      <dgm:t>
-        <a:bodyPr/>
-        <a:lstStyle/>
-        <a:p>
-          <a:endParaRPr lang="en-US"/>
-        </a:p>
-      </dgm:t>
     </dgm:pt>
     <dgm:pt modelId="{D328AB4C-7799-47B7-A8F1-3355D4AEDC1D}" type="pres">
       <dgm:prSet presAssocID="{341A2B66-E7B4-4CCE-A800-2D09F00E988D}" presName="connectorText" presStyleLbl="sibTrans2D1" presStyleIdx="2" presStyleCnt="5"/>
       <dgm:spPr/>
-      <dgm:t>
-        <a:bodyPr/>
-        <a:lstStyle/>
-        <a:p>
-          <a:endParaRPr lang="en-US"/>
-        </a:p>
-      </dgm:t>
     </dgm:pt>
     <dgm:pt modelId="{7865197D-6E8D-4FFF-BEF4-77D19CDA6748}" type="pres">
       <dgm:prSet presAssocID="{1303FBFC-9B1F-43AD-A9CC-01EC7DFCCA63}" presName="node" presStyleLbl="node1" presStyleIdx="3" presStyleCnt="5">
@@ -1255,35 +1185,14 @@
         </dgm:presLayoutVars>
       </dgm:prSet>
       <dgm:spPr/>
-      <dgm:t>
-        <a:bodyPr/>
-        <a:lstStyle/>
-        <a:p>
-          <a:endParaRPr lang="en-US"/>
-        </a:p>
-      </dgm:t>
     </dgm:pt>
     <dgm:pt modelId="{BAAC15F4-9D1D-4DF8-800E-A898ABC0F2AB}" type="pres">
       <dgm:prSet presAssocID="{963AB9C7-534E-4244-8795-2DE50C0AAE1A}" presName="sibTrans" presStyleLbl="sibTrans2D1" presStyleIdx="3" presStyleCnt="5"/>
       <dgm:spPr/>
-      <dgm:t>
-        <a:bodyPr/>
-        <a:lstStyle/>
-        <a:p>
-          <a:endParaRPr lang="en-US"/>
-        </a:p>
-      </dgm:t>
     </dgm:pt>
     <dgm:pt modelId="{1020FBBB-690C-4821-A794-B22748BC07F6}" type="pres">
       <dgm:prSet presAssocID="{963AB9C7-534E-4244-8795-2DE50C0AAE1A}" presName="connectorText" presStyleLbl="sibTrans2D1" presStyleIdx="3" presStyleCnt="5"/>
       <dgm:spPr/>
-      <dgm:t>
-        <a:bodyPr/>
-        <a:lstStyle/>
-        <a:p>
-          <a:endParaRPr lang="en-US"/>
-        </a:p>
-      </dgm:t>
     </dgm:pt>
     <dgm:pt modelId="{7154A4FA-E800-40EB-A87E-5CECCE812433}" type="pres">
       <dgm:prSet presAssocID="{604DED0C-C7D1-44E9-9D91-4EA86CC58132}" presName="node" presStyleLbl="node1" presStyleIdx="4" presStyleCnt="5">
@@ -1292,35 +1201,14 @@
         </dgm:presLayoutVars>
       </dgm:prSet>
       <dgm:spPr/>
-      <dgm:t>
-        <a:bodyPr/>
-        <a:lstStyle/>
-        <a:p>
-          <a:endParaRPr lang="en-US"/>
-        </a:p>
-      </dgm:t>
     </dgm:pt>
     <dgm:pt modelId="{58C57B0B-F787-4E7B-A44C-92F01115E8E7}" type="pres">
       <dgm:prSet presAssocID="{F9D67482-08A8-41D2-A4D4-28EF53768755}" presName="sibTrans" presStyleLbl="sibTrans2D1" presStyleIdx="4" presStyleCnt="5"/>
       <dgm:spPr/>
-      <dgm:t>
-        <a:bodyPr/>
-        <a:lstStyle/>
-        <a:p>
-          <a:endParaRPr lang="en-US"/>
-        </a:p>
-      </dgm:t>
     </dgm:pt>
     <dgm:pt modelId="{0DE8E6C8-D66E-45A0-B23D-743ED7603BE1}" type="pres">
       <dgm:prSet presAssocID="{F9D67482-08A8-41D2-A4D4-28EF53768755}" presName="connectorText" presStyleLbl="sibTrans2D1" presStyleIdx="4" presStyleCnt="5"/>
       <dgm:spPr/>
-      <dgm:t>
-        <a:bodyPr/>
-        <a:lstStyle/>
-        <a:p>
-          <a:endParaRPr lang="en-US"/>
-        </a:p>
-      </dgm:t>
     </dgm:pt>
   </dgm:ptLst>
   <dgm:cxnLst>
@@ -1329,8 +1217,8 @@
     <dgm:cxn modelId="{FB579B80-661A-4626-B61F-E71F4E734262}" type="presOf" srcId="{142584DF-DF37-4E4D-8B12-3F1186ED8A79}" destId="{4CFB935C-7860-4776-A04C-834BDF85D630}" srcOrd="0" destOrd="0" presId="urn:microsoft.com/office/officeart/2005/8/layout/cycle2"/>
     <dgm:cxn modelId="{F708609E-B605-4F54-9CB0-43BFD707546D}" type="presOf" srcId="{DC1518B7-EDD6-4CCF-9688-BF43B6ABDDB5}" destId="{9D1A61A1-B2AA-4F6A-AD68-CA1F7CD1DF22}" srcOrd="0" destOrd="0" presId="urn:microsoft.com/office/officeart/2005/8/layout/cycle2"/>
     <dgm:cxn modelId="{1D8D5F4A-711A-4C36-9FDB-4E9DFB74713E}" type="presOf" srcId="{341A2B66-E7B4-4CCE-A800-2D09F00E988D}" destId="{DA3308EA-AC4F-4F40-B121-EF1B7A77DC44}" srcOrd="0" destOrd="0" presId="urn:microsoft.com/office/officeart/2005/8/layout/cycle2"/>
+    <dgm:cxn modelId="{8000DA2E-31CB-4AD9-AF9B-52BAB5602E59}" srcId="{FD57CCFC-B83B-464C-88F8-BC6450268F97}" destId="{142584DF-DF37-4E4D-8B12-3F1186ED8A79}" srcOrd="1" destOrd="0" parTransId="{ED9FF5C5-2955-4ABE-8CBD-A291C105BC10}" sibTransId="{F9A12A89-8926-472F-A7F2-6C018E0DE993}"/>
     <dgm:cxn modelId="{457A18C9-81F1-4A35-ADA5-3C23816981B3}" type="presOf" srcId="{F9D67482-08A8-41D2-A4D4-28EF53768755}" destId="{58C57B0B-F787-4E7B-A44C-92F01115E8E7}" srcOrd="0" destOrd="0" presId="urn:microsoft.com/office/officeart/2005/8/layout/cycle2"/>
-    <dgm:cxn modelId="{8000DA2E-31CB-4AD9-AF9B-52BAB5602E59}" srcId="{FD57CCFC-B83B-464C-88F8-BC6450268F97}" destId="{142584DF-DF37-4E4D-8B12-3F1186ED8A79}" srcOrd="1" destOrd="0" parTransId="{ED9FF5C5-2955-4ABE-8CBD-A291C105BC10}" sibTransId="{F9A12A89-8926-472F-A7F2-6C018E0DE993}"/>
     <dgm:cxn modelId="{856A50DA-D64A-4647-9709-42A133F935EB}" type="presOf" srcId="{963AB9C7-534E-4244-8795-2DE50C0AAE1A}" destId="{BAAC15F4-9D1D-4DF8-800E-A898ABC0F2AB}" srcOrd="0" destOrd="0" presId="urn:microsoft.com/office/officeart/2005/8/layout/cycle2"/>
     <dgm:cxn modelId="{5BC36940-CB7A-4758-BE58-DC68FE675A98}" type="presOf" srcId="{F9D67482-08A8-41D2-A4D4-28EF53768755}" destId="{0DE8E6C8-D66E-45A0-B23D-743ED7603BE1}" srcOrd="1" destOrd="0" presId="urn:microsoft.com/office/officeart/2005/8/layout/cycle2"/>
     <dgm:cxn modelId="{5BBB9AAA-3A31-48A0-9041-47E02695D120}" type="presOf" srcId="{341A2B66-E7B4-4CCE-A800-2D09F00E988D}" destId="{D328AB4C-7799-47B7-A8F1-3355D4AEDC1D}" srcOrd="1" destOrd="0" presId="urn:microsoft.com/office/officeart/2005/8/layout/cycle2"/>
@@ -1342,8 +1230,8 @@
     <dgm:cxn modelId="{0A57CA8B-CCE8-45FB-ABAA-4658A3B96B41}" srcId="{FD57CCFC-B83B-464C-88F8-BC6450268F97}" destId="{94959A71-8399-4743-A822-4B2822F36EB9}" srcOrd="2" destOrd="0" parTransId="{7B73C905-77F1-455E-8A1E-1C07DA733669}" sibTransId="{341A2B66-E7B4-4CCE-A800-2D09F00E988D}"/>
     <dgm:cxn modelId="{83F18F01-1EBB-4F68-A566-C281ACD257AA}" type="presOf" srcId="{F9A12A89-8926-472F-A7F2-6C018E0DE993}" destId="{194CE3CF-2BF2-4AF5-9CEB-61305F2C5E2D}" srcOrd="0" destOrd="0" presId="urn:microsoft.com/office/officeart/2005/8/layout/cycle2"/>
     <dgm:cxn modelId="{A6CED050-C5D2-4A6A-B3EA-9375EB900D7C}" type="presOf" srcId="{1303FBFC-9B1F-43AD-A9CC-01EC7DFCCA63}" destId="{7865197D-6E8D-4FFF-BEF4-77D19CDA6748}" srcOrd="0" destOrd="0" presId="urn:microsoft.com/office/officeart/2005/8/layout/cycle2"/>
+    <dgm:cxn modelId="{7A19FA8A-9349-4A90-96EE-3F1BEED66291}" type="presOf" srcId="{963AB9C7-534E-4244-8795-2DE50C0AAE1A}" destId="{1020FBBB-690C-4821-A794-B22748BC07F6}" srcOrd="1" destOrd="0" presId="urn:microsoft.com/office/officeart/2005/8/layout/cycle2"/>
     <dgm:cxn modelId="{782EF038-CBD4-42BC-9F87-E70F0C5BA753}" type="presOf" srcId="{604DED0C-C7D1-44E9-9D91-4EA86CC58132}" destId="{7154A4FA-E800-40EB-A87E-5CECCE812433}" srcOrd="0" destOrd="0" presId="urn:microsoft.com/office/officeart/2005/8/layout/cycle2"/>
-    <dgm:cxn modelId="{7A19FA8A-9349-4A90-96EE-3F1BEED66291}" type="presOf" srcId="{963AB9C7-534E-4244-8795-2DE50C0AAE1A}" destId="{1020FBBB-690C-4821-A794-B22748BC07F6}" srcOrd="1" destOrd="0" presId="urn:microsoft.com/office/officeart/2005/8/layout/cycle2"/>
     <dgm:cxn modelId="{8318BC13-B71D-4942-9198-291D21A68FEF}" srcId="{FD57CCFC-B83B-464C-88F8-BC6450268F97}" destId="{604DED0C-C7D1-44E9-9D91-4EA86CC58132}" srcOrd="4" destOrd="0" parTransId="{80FF181E-2F3F-4C95-B016-991B121BE693}" sibTransId="{F9D67482-08A8-41D2-A4D4-28EF53768755}"/>
     <dgm:cxn modelId="{9E0C6E45-BB6E-4222-ABBC-A7113BC40F60}" type="presParOf" srcId="{67A0B1C8-6388-410F-ABFD-B0A6F2F228F7}" destId="{9D1A61A1-B2AA-4F6A-AD68-CA1F7CD1DF22}" srcOrd="0" destOrd="0" presId="urn:microsoft.com/office/officeart/2005/8/layout/cycle2"/>
     <dgm:cxn modelId="{97FEE296-E53E-47B7-988E-0AECC9F987D1}" type="presParOf" srcId="{67A0B1C8-6388-410F-ABFD-B0A6F2F228F7}" destId="{2C793FD2-6A40-488B-8088-8D409044269C}" srcOrd="1" destOrd="0" presId="urn:microsoft.com/office/officeart/2005/8/layout/cycle2"/>
@@ -1379,6 +1267,774 @@
       <dsp:cNvGrpSpPr/>
     </dsp:nvGrpSpPr>
     <dsp:grpSpPr/>
+    <dsp:sp modelId="{9D1A61A1-B2AA-4F6A-AD68-CA1F7CD1DF22}">
+      <dsp:nvSpPr>
+        <dsp:cNvPr id="0" name=""/>
+        <dsp:cNvSpPr/>
+      </dsp:nvSpPr>
+      <dsp:spPr>
+        <a:xfrm>
+          <a:off x="1520465" y="879"/>
+          <a:ext cx="1150069" cy="1150069"/>
+        </a:xfrm>
+        <a:prstGeom prst="ellipse">
+          <a:avLst/>
+        </a:prstGeom>
+        <a:solidFill>
+          <a:schemeClr val="accent1">
+            <a:hueOff val="0"/>
+            <a:satOff val="0"/>
+            <a:lumOff val="0"/>
+            <a:alphaOff val="0"/>
+          </a:schemeClr>
+        </a:solidFill>
+        <a:ln w="25400" cap="flat" cmpd="sng" algn="ctr">
+          <a:solidFill>
+            <a:schemeClr val="lt1">
+              <a:hueOff val="0"/>
+              <a:satOff val="0"/>
+              <a:lumOff val="0"/>
+              <a:alphaOff val="0"/>
+            </a:schemeClr>
+          </a:solidFill>
+          <a:prstDash val="solid"/>
+        </a:ln>
+        <a:effectLst/>
+      </dsp:spPr>
+      <dsp:style>
+        <a:lnRef idx="2">
+          <a:scrgbClr r="0" g="0" b="0"/>
+        </a:lnRef>
+        <a:fillRef idx="1">
+          <a:scrgbClr r="0" g="0" b="0"/>
+        </a:fillRef>
+        <a:effectRef idx="0">
+          <a:scrgbClr r="0" g="0" b="0"/>
+        </a:effectRef>
+        <a:fontRef idx="minor">
+          <a:schemeClr val="lt1"/>
+        </a:fontRef>
+      </dsp:style>
+      <dsp:txBody>
+        <a:bodyPr spcFirstLastPara="0" vert="horz" wrap="square" lIns="36830" tIns="36830" rIns="36830" bIns="36830" numCol="1" spcCol="1270" anchor="ctr" anchorCtr="0">
+          <a:noAutofit/>
+        </a:bodyPr>
+        <a:lstStyle/>
+        <a:p>
+          <a:pPr lvl="0" algn="ctr" defTabSz="1289050">
+            <a:lnSpc>
+              <a:spcPct val="90000"/>
+            </a:lnSpc>
+            <a:spcBef>
+              <a:spcPct val="0"/>
+            </a:spcBef>
+            <a:spcAft>
+              <a:spcPct val="35000"/>
+            </a:spcAft>
+          </a:pPr>
+          <a:r>
+            <a:rPr lang="en-US" sz="2900" kern="1200" dirty="0" smtClean="0"/>
+            <a:t>TSK0</a:t>
+          </a:r>
+          <a:endParaRPr lang="en-US" sz="2900" kern="1200" dirty="0"/>
+        </a:p>
+      </dsp:txBody>
+      <dsp:txXfrm>
+        <a:off x="1520465" y="879"/>
+        <a:ext cx="1150069" cy="1150069"/>
+      </dsp:txXfrm>
+    </dsp:sp>
+    <dsp:sp modelId="{2C793FD2-6A40-488B-8088-8D409044269C}">
+      <dsp:nvSpPr>
+        <dsp:cNvPr id="0" name=""/>
+        <dsp:cNvSpPr/>
+      </dsp:nvSpPr>
+      <dsp:spPr>
+        <a:xfrm rot="2160000">
+          <a:off x="2634247" y="884415"/>
+          <a:ext cx="305977" cy="388148"/>
+        </a:xfrm>
+        <a:prstGeom prst="rightArrow">
+          <a:avLst>
+            <a:gd name="adj1" fmla="val 60000"/>
+            <a:gd name="adj2" fmla="val 50000"/>
+          </a:avLst>
+        </a:prstGeom>
+        <a:solidFill>
+          <a:schemeClr val="accent1">
+            <a:tint val="60000"/>
+            <a:hueOff val="0"/>
+            <a:satOff val="0"/>
+            <a:lumOff val="0"/>
+            <a:alphaOff val="0"/>
+          </a:schemeClr>
+        </a:solidFill>
+        <a:ln>
+          <a:noFill/>
+        </a:ln>
+        <a:effectLst/>
+      </dsp:spPr>
+      <dsp:style>
+        <a:lnRef idx="0">
+          <a:scrgbClr r="0" g="0" b="0"/>
+        </a:lnRef>
+        <a:fillRef idx="1">
+          <a:scrgbClr r="0" g="0" b="0"/>
+        </a:fillRef>
+        <a:effectRef idx="0">
+          <a:scrgbClr r="0" g="0" b="0"/>
+        </a:effectRef>
+        <a:fontRef idx="minor">
+          <a:schemeClr val="lt1"/>
+        </a:fontRef>
+      </dsp:style>
+      <dsp:txBody>
+        <a:bodyPr spcFirstLastPara="0" vert="horz" wrap="square" lIns="0" tIns="0" rIns="0" bIns="0" numCol="1" spcCol="1270" anchor="ctr" anchorCtr="0">
+          <a:noAutofit/>
+        </a:bodyPr>
+        <a:lstStyle/>
+        <a:p>
+          <a:pPr lvl="0" algn="ctr" defTabSz="711200">
+            <a:lnSpc>
+              <a:spcPct val="90000"/>
+            </a:lnSpc>
+            <a:spcBef>
+              <a:spcPct val="0"/>
+            </a:spcBef>
+            <a:spcAft>
+              <a:spcPct val="35000"/>
+            </a:spcAft>
+          </a:pPr>
+          <a:endParaRPr lang="en-US" sz="1600" kern="1200"/>
+        </a:p>
+      </dsp:txBody>
+      <dsp:txXfrm rot="2160000">
+        <a:off x="2634247" y="884415"/>
+        <a:ext cx="305977" cy="388148"/>
+      </dsp:txXfrm>
+    </dsp:sp>
+    <dsp:sp modelId="{4CFB935C-7860-4776-A04C-834BDF85D630}">
+      <dsp:nvSpPr>
+        <dsp:cNvPr id="0" name=""/>
+        <dsp:cNvSpPr/>
+      </dsp:nvSpPr>
+      <dsp:spPr>
+        <a:xfrm>
+          <a:off x="2917948" y="1016210"/>
+          <a:ext cx="1150069" cy="1150069"/>
+        </a:xfrm>
+        <a:prstGeom prst="ellipse">
+          <a:avLst/>
+        </a:prstGeom>
+        <a:gradFill rotWithShape="1">
+          <a:gsLst>
+            <a:gs pos="0">
+              <a:schemeClr val="accent2">
+                <a:tint val="50000"/>
+                <a:satMod val="300000"/>
+              </a:schemeClr>
+            </a:gs>
+            <a:gs pos="35000">
+              <a:schemeClr val="accent2">
+                <a:tint val="37000"/>
+                <a:satMod val="300000"/>
+              </a:schemeClr>
+            </a:gs>
+            <a:gs pos="100000">
+              <a:schemeClr val="accent2">
+                <a:tint val="15000"/>
+                <a:satMod val="350000"/>
+              </a:schemeClr>
+            </a:gs>
+          </a:gsLst>
+          <a:lin ang="16200000" scaled="1"/>
+        </a:gradFill>
+        <a:ln w="9525" cap="flat" cmpd="sng" algn="ctr">
+          <a:solidFill>
+            <a:schemeClr val="accent2">
+              <a:shade val="95000"/>
+              <a:satMod val="105000"/>
+            </a:schemeClr>
+          </a:solidFill>
+          <a:prstDash val="solid"/>
+        </a:ln>
+        <a:effectLst>
+          <a:outerShdw blurRad="40000" dist="20000" dir="5400000" rotWithShape="0">
+            <a:srgbClr val="000000">
+              <a:alpha val="38000"/>
+            </a:srgbClr>
+          </a:outerShdw>
+        </a:effectLst>
+      </dsp:spPr>
+      <dsp:style>
+        <a:lnRef idx="1">
+          <a:schemeClr val="accent2"/>
+        </a:lnRef>
+        <a:fillRef idx="2">
+          <a:schemeClr val="accent2"/>
+        </a:fillRef>
+        <a:effectRef idx="1">
+          <a:schemeClr val="accent2"/>
+        </a:effectRef>
+        <a:fontRef idx="minor">
+          <a:schemeClr val="dk1"/>
+        </a:fontRef>
+      </dsp:style>
+      <dsp:txBody>
+        <a:bodyPr spcFirstLastPara="0" vert="horz" wrap="square" lIns="36830" tIns="36830" rIns="36830" bIns="36830" numCol="1" spcCol="1270" anchor="ctr" anchorCtr="0">
+          <a:noAutofit/>
+        </a:bodyPr>
+        <a:lstStyle/>
+        <a:p>
+          <a:pPr lvl="0" algn="ctr" defTabSz="1289050">
+            <a:lnSpc>
+              <a:spcPct val="90000"/>
+            </a:lnSpc>
+            <a:spcBef>
+              <a:spcPct val="0"/>
+            </a:spcBef>
+            <a:spcAft>
+              <a:spcPct val="35000"/>
+            </a:spcAft>
+          </a:pPr>
+          <a:r>
+            <a:rPr lang="en-US" sz="2900" kern="1200" dirty="0" smtClean="0"/>
+            <a:t>TSK1</a:t>
+          </a:r>
+          <a:endParaRPr lang="en-US" sz="2900" kern="1200" dirty="0"/>
+        </a:p>
+      </dsp:txBody>
+      <dsp:txXfrm>
+        <a:off x="2917948" y="1016210"/>
+        <a:ext cx="1150069" cy="1150069"/>
+      </dsp:txXfrm>
+    </dsp:sp>
+    <dsp:sp modelId="{194CE3CF-2BF2-4AF5-9CEB-61305F2C5E2D}">
+      <dsp:nvSpPr>
+        <dsp:cNvPr id="0" name=""/>
+        <dsp:cNvSpPr/>
+      </dsp:nvSpPr>
+      <dsp:spPr>
+        <a:xfrm rot="6480000">
+          <a:off x="3075775" y="2210355"/>
+          <a:ext cx="305977" cy="388148"/>
+        </a:xfrm>
+        <a:prstGeom prst="rightArrow">
+          <a:avLst>
+            <a:gd name="adj1" fmla="val 60000"/>
+            <a:gd name="adj2" fmla="val 50000"/>
+          </a:avLst>
+        </a:prstGeom>
+        <a:solidFill>
+          <a:schemeClr val="accent1">
+            <a:tint val="60000"/>
+            <a:hueOff val="0"/>
+            <a:satOff val="0"/>
+            <a:lumOff val="0"/>
+            <a:alphaOff val="0"/>
+          </a:schemeClr>
+        </a:solidFill>
+        <a:ln>
+          <a:noFill/>
+        </a:ln>
+        <a:effectLst/>
+      </dsp:spPr>
+      <dsp:style>
+        <a:lnRef idx="0">
+          <a:scrgbClr r="0" g="0" b="0"/>
+        </a:lnRef>
+        <a:fillRef idx="1">
+          <a:scrgbClr r="0" g="0" b="0"/>
+        </a:fillRef>
+        <a:effectRef idx="0">
+          <a:scrgbClr r="0" g="0" b="0"/>
+        </a:effectRef>
+        <a:fontRef idx="minor">
+          <a:schemeClr val="lt1"/>
+        </a:fontRef>
+      </dsp:style>
+      <dsp:txBody>
+        <a:bodyPr spcFirstLastPara="0" vert="horz" wrap="square" lIns="0" tIns="0" rIns="0" bIns="0" numCol="1" spcCol="1270" anchor="ctr" anchorCtr="0">
+          <a:noAutofit/>
+        </a:bodyPr>
+        <a:lstStyle/>
+        <a:p>
+          <a:pPr lvl="0" algn="ctr" defTabSz="711200">
+            <a:lnSpc>
+              <a:spcPct val="90000"/>
+            </a:lnSpc>
+            <a:spcBef>
+              <a:spcPct val="0"/>
+            </a:spcBef>
+            <a:spcAft>
+              <a:spcPct val="35000"/>
+            </a:spcAft>
+          </a:pPr>
+          <a:endParaRPr lang="en-US" sz="1600" kern="1200"/>
+        </a:p>
+      </dsp:txBody>
+      <dsp:txXfrm rot="6480000">
+        <a:off x="3075775" y="2210355"/>
+        <a:ext cx="305977" cy="388148"/>
+      </dsp:txXfrm>
+    </dsp:sp>
+    <dsp:sp modelId="{EA63BA78-DFE1-4E32-B4E3-D3637C87D01A}">
+      <dsp:nvSpPr>
+        <dsp:cNvPr id="0" name=""/>
+        <dsp:cNvSpPr/>
+      </dsp:nvSpPr>
+      <dsp:spPr>
+        <a:xfrm>
+          <a:off x="2384157" y="2659051"/>
+          <a:ext cx="1150069" cy="1150069"/>
+        </a:xfrm>
+        <a:prstGeom prst="ellipse">
+          <a:avLst/>
+        </a:prstGeom>
+        <a:solidFill>
+          <a:schemeClr val="accent1">
+            <a:hueOff val="0"/>
+            <a:satOff val="0"/>
+            <a:lumOff val="0"/>
+            <a:alphaOff val="0"/>
+          </a:schemeClr>
+        </a:solidFill>
+        <a:ln w="25400" cap="flat" cmpd="sng" algn="ctr">
+          <a:solidFill>
+            <a:schemeClr val="lt1">
+              <a:hueOff val="0"/>
+              <a:satOff val="0"/>
+              <a:lumOff val="0"/>
+              <a:alphaOff val="0"/>
+            </a:schemeClr>
+          </a:solidFill>
+          <a:prstDash val="solid"/>
+        </a:ln>
+        <a:effectLst/>
+      </dsp:spPr>
+      <dsp:style>
+        <a:lnRef idx="2">
+          <a:scrgbClr r="0" g="0" b="0"/>
+        </a:lnRef>
+        <a:fillRef idx="1">
+          <a:scrgbClr r="0" g="0" b="0"/>
+        </a:fillRef>
+        <a:effectRef idx="0">
+          <a:scrgbClr r="0" g="0" b="0"/>
+        </a:effectRef>
+        <a:fontRef idx="minor">
+          <a:schemeClr val="lt1"/>
+        </a:fontRef>
+      </dsp:style>
+      <dsp:txBody>
+        <a:bodyPr spcFirstLastPara="0" vert="horz" wrap="square" lIns="36830" tIns="36830" rIns="36830" bIns="36830" numCol="1" spcCol="1270" anchor="ctr" anchorCtr="0">
+          <a:noAutofit/>
+        </a:bodyPr>
+        <a:lstStyle/>
+        <a:p>
+          <a:pPr lvl="0" algn="ctr" defTabSz="1289050">
+            <a:lnSpc>
+              <a:spcPct val="90000"/>
+            </a:lnSpc>
+            <a:spcBef>
+              <a:spcPct val="0"/>
+            </a:spcBef>
+            <a:spcAft>
+              <a:spcPct val="35000"/>
+            </a:spcAft>
+          </a:pPr>
+          <a:r>
+            <a:rPr lang="en-US" sz="2900" kern="1200" dirty="0" smtClean="0"/>
+            <a:t>TSK2</a:t>
+          </a:r>
+          <a:endParaRPr lang="en-US" sz="2900" kern="1200" dirty="0"/>
+        </a:p>
+      </dsp:txBody>
+      <dsp:txXfrm>
+        <a:off x="2384157" y="2659051"/>
+        <a:ext cx="1150069" cy="1150069"/>
+      </dsp:txXfrm>
+    </dsp:sp>
+    <dsp:sp modelId="{DA3308EA-AC4F-4F40-B121-EF1B7A77DC44}">
+      <dsp:nvSpPr>
+        <dsp:cNvPr id="0" name=""/>
+        <dsp:cNvSpPr/>
+      </dsp:nvSpPr>
+      <dsp:spPr>
+        <a:xfrm rot="10800000">
+          <a:off x="1951171" y="3040011"/>
+          <a:ext cx="305977" cy="388148"/>
+        </a:xfrm>
+        <a:prstGeom prst="rightArrow">
+          <a:avLst>
+            <a:gd name="adj1" fmla="val 60000"/>
+            <a:gd name="adj2" fmla="val 50000"/>
+          </a:avLst>
+        </a:prstGeom>
+        <a:solidFill>
+          <a:schemeClr val="accent1">
+            <a:tint val="60000"/>
+            <a:hueOff val="0"/>
+            <a:satOff val="0"/>
+            <a:lumOff val="0"/>
+            <a:alphaOff val="0"/>
+          </a:schemeClr>
+        </a:solidFill>
+        <a:ln>
+          <a:noFill/>
+        </a:ln>
+        <a:effectLst/>
+      </dsp:spPr>
+      <dsp:style>
+        <a:lnRef idx="0">
+          <a:scrgbClr r="0" g="0" b="0"/>
+        </a:lnRef>
+        <a:fillRef idx="1">
+          <a:scrgbClr r="0" g="0" b="0"/>
+        </a:fillRef>
+        <a:effectRef idx="0">
+          <a:scrgbClr r="0" g="0" b="0"/>
+        </a:effectRef>
+        <a:fontRef idx="minor">
+          <a:schemeClr val="lt1"/>
+        </a:fontRef>
+      </dsp:style>
+      <dsp:txBody>
+        <a:bodyPr spcFirstLastPara="0" vert="horz" wrap="square" lIns="0" tIns="0" rIns="0" bIns="0" numCol="1" spcCol="1270" anchor="ctr" anchorCtr="0">
+          <a:noAutofit/>
+        </a:bodyPr>
+        <a:lstStyle/>
+        <a:p>
+          <a:pPr lvl="0" algn="ctr" defTabSz="711200">
+            <a:lnSpc>
+              <a:spcPct val="90000"/>
+            </a:lnSpc>
+            <a:spcBef>
+              <a:spcPct val="0"/>
+            </a:spcBef>
+            <a:spcAft>
+              <a:spcPct val="35000"/>
+            </a:spcAft>
+          </a:pPr>
+          <a:endParaRPr lang="en-US" sz="1600" kern="1200"/>
+        </a:p>
+      </dsp:txBody>
+      <dsp:txXfrm rot="10800000">
+        <a:off x="1951171" y="3040011"/>
+        <a:ext cx="305977" cy="388148"/>
+      </dsp:txXfrm>
+    </dsp:sp>
+    <dsp:sp modelId="{7865197D-6E8D-4FFF-BEF4-77D19CDA6748}">
+      <dsp:nvSpPr>
+        <dsp:cNvPr id="0" name=""/>
+        <dsp:cNvSpPr/>
+      </dsp:nvSpPr>
+      <dsp:spPr>
+        <a:xfrm>
+          <a:off x="656772" y="2659051"/>
+          <a:ext cx="1150069" cy="1150069"/>
+        </a:xfrm>
+        <a:prstGeom prst="ellipse">
+          <a:avLst/>
+        </a:prstGeom>
+        <a:gradFill rotWithShape="1">
+          <a:gsLst>
+            <a:gs pos="0">
+              <a:schemeClr val="accent2">
+                <a:tint val="50000"/>
+                <a:satMod val="300000"/>
+              </a:schemeClr>
+            </a:gs>
+            <a:gs pos="35000">
+              <a:schemeClr val="accent2">
+                <a:tint val="37000"/>
+                <a:satMod val="300000"/>
+              </a:schemeClr>
+            </a:gs>
+            <a:gs pos="100000">
+              <a:schemeClr val="accent2">
+                <a:tint val="15000"/>
+                <a:satMod val="350000"/>
+              </a:schemeClr>
+            </a:gs>
+          </a:gsLst>
+          <a:lin ang="16200000" scaled="1"/>
+        </a:gradFill>
+        <a:ln w="9525" cap="flat" cmpd="sng" algn="ctr">
+          <a:solidFill>
+            <a:schemeClr val="accent2">
+              <a:shade val="95000"/>
+              <a:satMod val="105000"/>
+            </a:schemeClr>
+          </a:solidFill>
+          <a:prstDash val="solid"/>
+        </a:ln>
+        <a:effectLst>
+          <a:outerShdw blurRad="40000" dist="20000" dir="5400000" rotWithShape="0">
+            <a:srgbClr val="000000">
+              <a:alpha val="38000"/>
+            </a:srgbClr>
+          </a:outerShdw>
+        </a:effectLst>
+      </dsp:spPr>
+      <dsp:style>
+        <a:lnRef idx="1">
+          <a:schemeClr val="accent2"/>
+        </a:lnRef>
+        <a:fillRef idx="2">
+          <a:schemeClr val="accent2"/>
+        </a:fillRef>
+        <a:effectRef idx="1">
+          <a:schemeClr val="accent2"/>
+        </a:effectRef>
+        <a:fontRef idx="minor">
+          <a:schemeClr val="dk1"/>
+        </a:fontRef>
+      </dsp:style>
+      <dsp:txBody>
+        <a:bodyPr spcFirstLastPara="0" vert="horz" wrap="square" lIns="36830" tIns="36830" rIns="36830" bIns="36830" numCol="1" spcCol="1270" anchor="ctr" anchorCtr="0">
+          <a:noAutofit/>
+        </a:bodyPr>
+        <a:lstStyle/>
+        <a:p>
+          <a:pPr lvl="0" algn="ctr" defTabSz="1289050">
+            <a:lnSpc>
+              <a:spcPct val="90000"/>
+            </a:lnSpc>
+            <a:spcBef>
+              <a:spcPct val="0"/>
+            </a:spcBef>
+            <a:spcAft>
+              <a:spcPct val="35000"/>
+            </a:spcAft>
+          </a:pPr>
+          <a:r>
+            <a:rPr lang="en-US" sz="2900" kern="1200" dirty="0" smtClean="0"/>
+            <a:t>TSK3</a:t>
+          </a:r>
+          <a:endParaRPr lang="en-US" sz="2900" kern="1200" dirty="0"/>
+        </a:p>
+      </dsp:txBody>
+      <dsp:txXfrm>
+        <a:off x="656772" y="2659051"/>
+        <a:ext cx="1150069" cy="1150069"/>
+      </dsp:txXfrm>
+    </dsp:sp>
+    <dsp:sp modelId="{BAAC15F4-9D1D-4DF8-800E-A898ABC0F2AB}">
+      <dsp:nvSpPr>
+        <dsp:cNvPr id="0" name=""/>
+        <dsp:cNvSpPr/>
+      </dsp:nvSpPr>
+      <dsp:spPr>
+        <a:xfrm rot="15120000">
+          <a:off x="814599" y="2226827"/>
+          <a:ext cx="305977" cy="388148"/>
+        </a:xfrm>
+        <a:prstGeom prst="rightArrow">
+          <a:avLst>
+            <a:gd name="adj1" fmla="val 60000"/>
+            <a:gd name="adj2" fmla="val 50000"/>
+          </a:avLst>
+        </a:prstGeom>
+        <a:solidFill>
+          <a:schemeClr val="accent1">
+            <a:tint val="60000"/>
+            <a:hueOff val="0"/>
+            <a:satOff val="0"/>
+            <a:lumOff val="0"/>
+            <a:alphaOff val="0"/>
+          </a:schemeClr>
+        </a:solidFill>
+        <a:ln>
+          <a:noFill/>
+        </a:ln>
+        <a:effectLst/>
+      </dsp:spPr>
+      <dsp:style>
+        <a:lnRef idx="0">
+          <a:scrgbClr r="0" g="0" b="0"/>
+        </a:lnRef>
+        <a:fillRef idx="1">
+          <a:scrgbClr r="0" g="0" b="0"/>
+        </a:fillRef>
+        <a:effectRef idx="0">
+          <a:scrgbClr r="0" g="0" b="0"/>
+        </a:effectRef>
+        <a:fontRef idx="minor">
+          <a:schemeClr val="lt1"/>
+        </a:fontRef>
+      </dsp:style>
+      <dsp:txBody>
+        <a:bodyPr spcFirstLastPara="0" vert="horz" wrap="square" lIns="0" tIns="0" rIns="0" bIns="0" numCol="1" spcCol="1270" anchor="ctr" anchorCtr="0">
+          <a:noAutofit/>
+        </a:bodyPr>
+        <a:lstStyle/>
+        <a:p>
+          <a:pPr lvl="0" algn="ctr" defTabSz="711200">
+            <a:lnSpc>
+              <a:spcPct val="90000"/>
+            </a:lnSpc>
+            <a:spcBef>
+              <a:spcPct val="0"/>
+            </a:spcBef>
+            <a:spcAft>
+              <a:spcPct val="35000"/>
+            </a:spcAft>
+          </a:pPr>
+          <a:endParaRPr lang="en-US" sz="1600" kern="1200"/>
+        </a:p>
+      </dsp:txBody>
+      <dsp:txXfrm rot="15120000">
+        <a:off x="814599" y="2226827"/>
+        <a:ext cx="305977" cy="388148"/>
+      </dsp:txXfrm>
+    </dsp:sp>
+    <dsp:sp modelId="{7154A4FA-E800-40EB-A87E-5CECCE812433}">
+      <dsp:nvSpPr>
+        <dsp:cNvPr id="0" name=""/>
+        <dsp:cNvSpPr/>
+      </dsp:nvSpPr>
+      <dsp:spPr>
+        <a:xfrm>
+          <a:off x="122981" y="1016210"/>
+          <a:ext cx="1150069" cy="1150069"/>
+        </a:xfrm>
+        <a:prstGeom prst="ellipse">
+          <a:avLst/>
+        </a:prstGeom>
+        <a:solidFill>
+          <a:schemeClr val="accent1">
+            <a:hueOff val="0"/>
+            <a:satOff val="0"/>
+            <a:lumOff val="0"/>
+            <a:alphaOff val="0"/>
+          </a:schemeClr>
+        </a:solidFill>
+        <a:ln w="25400" cap="flat" cmpd="sng" algn="ctr">
+          <a:solidFill>
+            <a:schemeClr val="lt1">
+              <a:hueOff val="0"/>
+              <a:satOff val="0"/>
+              <a:lumOff val="0"/>
+              <a:alphaOff val="0"/>
+            </a:schemeClr>
+          </a:solidFill>
+          <a:prstDash val="solid"/>
+        </a:ln>
+        <a:effectLst/>
+      </dsp:spPr>
+      <dsp:style>
+        <a:lnRef idx="2">
+          <a:scrgbClr r="0" g="0" b="0"/>
+        </a:lnRef>
+        <a:fillRef idx="1">
+          <a:scrgbClr r="0" g="0" b="0"/>
+        </a:fillRef>
+        <a:effectRef idx="0">
+          <a:scrgbClr r="0" g="0" b="0"/>
+        </a:effectRef>
+        <a:fontRef idx="minor">
+          <a:schemeClr val="lt1"/>
+        </a:fontRef>
+      </dsp:style>
+      <dsp:txBody>
+        <a:bodyPr spcFirstLastPara="0" vert="horz" wrap="square" lIns="36830" tIns="36830" rIns="36830" bIns="36830" numCol="1" spcCol="1270" anchor="ctr" anchorCtr="0">
+          <a:noAutofit/>
+        </a:bodyPr>
+        <a:lstStyle/>
+        <a:p>
+          <a:pPr lvl="0" algn="ctr" defTabSz="1289050">
+            <a:lnSpc>
+              <a:spcPct val="90000"/>
+            </a:lnSpc>
+            <a:spcBef>
+              <a:spcPct val="0"/>
+            </a:spcBef>
+            <a:spcAft>
+              <a:spcPct val="35000"/>
+            </a:spcAft>
+          </a:pPr>
+          <a:r>
+            <a:rPr lang="en-US" sz="2900" kern="1200" dirty="0" smtClean="0"/>
+            <a:t>TSK4</a:t>
+          </a:r>
+          <a:endParaRPr lang="en-US" sz="2900" kern="1200" dirty="0"/>
+        </a:p>
+      </dsp:txBody>
+      <dsp:txXfrm>
+        <a:off x="122981" y="1016210"/>
+        <a:ext cx="1150069" cy="1150069"/>
+      </dsp:txXfrm>
+    </dsp:sp>
+    <dsp:sp modelId="{58C57B0B-F787-4E7B-A44C-92F01115E8E7}">
+      <dsp:nvSpPr>
+        <dsp:cNvPr id="0" name=""/>
+        <dsp:cNvSpPr/>
+      </dsp:nvSpPr>
+      <dsp:spPr>
+        <a:xfrm rot="19440000">
+          <a:off x="1236763" y="894595"/>
+          <a:ext cx="305977" cy="388148"/>
+        </a:xfrm>
+        <a:prstGeom prst="rightArrow">
+          <a:avLst>
+            <a:gd name="adj1" fmla="val 60000"/>
+            <a:gd name="adj2" fmla="val 50000"/>
+          </a:avLst>
+        </a:prstGeom>
+        <a:solidFill>
+          <a:schemeClr val="accent1">
+            <a:tint val="60000"/>
+            <a:hueOff val="0"/>
+            <a:satOff val="0"/>
+            <a:lumOff val="0"/>
+            <a:alphaOff val="0"/>
+          </a:schemeClr>
+        </a:solidFill>
+        <a:ln>
+          <a:noFill/>
+        </a:ln>
+        <a:effectLst/>
+      </dsp:spPr>
+      <dsp:style>
+        <a:lnRef idx="0">
+          <a:scrgbClr r="0" g="0" b="0"/>
+        </a:lnRef>
+        <a:fillRef idx="1">
+          <a:scrgbClr r="0" g="0" b="0"/>
+        </a:fillRef>
+        <a:effectRef idx="0">
+          <a:scrgbClr r="0" g="0" b="0"/>
+        </a:effectRef>
+        <a:fontRef idx="minor">
+          <a:schemeClr val="lt1"/>
+        </a:fontRef>
+      </dsp:style>
+      <dsp:txBody>
+        <a:bodyPr spcFirstLastPara="0" vert="horz" wrap="square" lIns="0" tIns="0" rIns="0" bIns="0" numCol="1" spcCol="1270" anchor="ctr" anchorCtr="0">
+          <a:noAutofit/>
+        </a:bodyPr>
+        <a:lstStyle/>
+        <a:p>
+          <a:pPr lvl="0" algn="ctr" defTabSz="711200">
+            <a:lnSpc>
+              <a:spcPct val="90000"/>
+            </a:lnSpc>
+            <a:spcBef>
+              <a:spcPct val="0"/>
+            </a:spcBef>
+            <a:spcAft>
+              <a:spcPct val="35000"/>
+            </a:spcAft>
+          </a:pPr>
+          <a:endParaRPr lang="en-US" sz="1600" kern="1200"/>
+        </a:p>
+      </dsp:txBody>
+      <dsp:txXfrm rot="19440000">
+        <a:off x="1236763" y="894595"/>
+        <a:ext cx="305977" cy="388148"/>
+      </dsp:txXfrm>
+    </dsp:sp>
   </dsp:spTree>
 </dsp:drawing>
 </file>
@@ -2711,7 +3367,7 @@
             <a:fld id="{E168EC2E-7004-4E52-B364-EF7EFD24F792}" type="datetimeFigureOut">
               <a:rPr lang="en-US" smtClean="0"/>
               <a:pPr/>
-              <a:t>5/3/2012</a:t>
+              <a:t>4/30/2012</a:t>
             </a:fld>
             <a:endParaRPr lang="en-US"/>
           </a:p>

</xml_diff>

<commit_message>
Removed extraneous slides at the end.
</commit_message>
<xml_diff>
--- a/slides/KeyStone Advanced Debug.pptx
+++ b/slides/KeyStone Advanced Debug.pptx
@@ -5,7 +5,7 @@
     <p:sldMasterId id="2147483660" r:id="rId1"/>
   </p:sldMasterIdLst>
   <p:notesMasterIdLst>
-    <p:notesMasterId r:id="rId35"/>
+    <p:notesMasterId r:id="rId32"/>
   </p:notesMasterIdLst>
   <p:sldIdLst>
     <p:sldId id="256" r:id="rId2"/>
@@ -38,14 +38,11 @@
     <p:sldId id="282" r:id="rId29"/>
     <p:sldId id="284" r:id="rId30"/>
     <p:sldId id="285" r:id="rId31"/>
-    <p:sldId id="292" r:id="rId32"/>
-    <p:sldId id="295" r:id="rId33"/>
-    <p:sldId id="296" r:id="rId34"/>
   </p:sldIdLst>
   <p:sldSz cx="9144000" cy="6858000" type="screen4x3"/>
   <p:notesSz cx="6858000" cy="9144000"/>
   <p:custDataLst>
-    <p:tags r:id="rId36"/>
+    <p:tags r:id="rId33"/>
   </p:custDataLst>
   <p:defaultTextStyle>
     <a:defPPr>
@@ -145,3257 +142,6 @@
 </p:presentation>
 </file>
 
-<file path=ppt/diagrams/colors1.xml><?xml version="1.0" encoding="utf-8"?>
-<dgm:colorsDef xmlns:dgm="http://schemas.openxmlformats.org/drawingml/2006/diagram" xmlns:a="http://schemas.openxmlformats.org/drawingml/2006/main" uniqueId="urn:microsoft.com/office/officeart/2005/8/colors/accent1_2">
-  <dgm:title val=""/>
-  <dgm:desc val=""/>
-  <dgm:catLst>
-    <dgm:cat type="accent1" pri="11200"/>
-  </dgm:catLst>
-  <dgm:styleLbl name="node0">
-    <dgm:fillClrLst meth="repeat">
-      <a:schemeClr val="accent1"/>
-    </dgm:fillClrLst>
-    <dgm:linClrLst meth="repeat">
-      <a:schemeClr val="lt1"/>
-    </dgm:linClrLst>
-    <dgm:effectClrLst/>
-    <dgm:txLinClrLst/>
-    <dgm:txFillClrLst/>
-    <dgm:txEffectClrLst/>
-  </dgm:styleLbl>
-  <dgm:styleLbl name="alignNode1">
-    <dgm:fillClrLst meth="repeat">
-      <a:schemeClr val="accent1"/>
-    </dgm:fillClrLst>
-    <dgm:linClrLst meth="repeat">
-      <a:schemeClr val="accent1"/>
-    </dgm:linClrLst>
-    <dgm:effectClrLst/>
-    <dgm:txLinClrLst/>
-    <dgm:txFillClrLst/>
-    <dgm:txEffectClrLst/>
-  </dgm:styleLbl>
-  <dgm:styleLbl name="node1">
-    <dgm:fillClrLst meth="repeat">
-      <a:schemeClr val="accent1"/>
-    </dgm:fillClrLst>
-    <dgm:linClrLst meth="repeat">
-      <a:schemeClr val="lt1"/>
-    </dgm:linClrLst>
-    <dgm:effectClrLst/>
-    <dgm:txLinClrLst/>
-    <dgm:txFillClrLst/>
-    <dgm:txEffectClrLst/>
-  </dgm:styleLbl>
-  <dgm:styleLbl name="lnNode1">
-    <dgm:fillClrLst meth="repeat">
-      <a:schemeClr val="accent1"/>
-    </dgm:fillClrLst>
-    <dgm:linClrLst meth="repeat">
-      <a:schemeClr val="lt1"/>
-    </dgm:linClrLst>
-    <dgm:effectClrLst/>
-    <dgm:txLinClrLst/>
-    <dgm:txFillClrLst/>
-    <dgm:txEffectClrLst/>
-  </dgm:styleLbl>
-  <dgm:styleLbl name="vennNode1">
-    <dgm:fillClrLst meth="repeat">
-      <a:schemeClr val="accent1">
-        <a:alpha val="50000"/>
-      </a:schemeClr>
-    </dgm:fillClrLst>
-    <dgm:linClrLst meth="repeat">
-      <a:schemeClr val="lt1"/>
-    </dgm:linClrLst>
-    <dgm:effectClrLst/>
-    <dgm:txLinClrLst/>
-    <dgm:txFillClrLst/>
-    <dgm:txEffectClrLst/>
-  </dgm:styleLbl>
-  <dgm:styleLbl name="node2">
-    <dgm:fillClrLst meth="repeat">
-      <a:schemeClr val="accent1"/>
-    </dgm:fillClrLst>
-    <dgm:linClrLst meth="repeat">
-      <a:schemeClr val="lt1"/>
-    </dgm:linClrLst>
-    <dgm:effectClrLst/>
-    <dgm:txLinClrLst/>
-    <dgm:txFillClrLst/>
-    <dgm:txEffectClrLst/>
-  </dgm:styleLbl>
-  <dgm:styleLbl name="node3">
-    <dgm:fillClrLst meth="repeat">
-      <a:schemeClr val="accent1"/>
-    </dgm:fillClrLst>
-    <dgm:linClrLst meth="repeat">
-      <a:schemeClr val="lt1"/>
-    </dgm:linClrLst>
-    <dgm:effectClrLst/>
-    <dgm:txLinClrLst/>
-    <dgm:txFillClrLst/>
-    <dgm:txEffectClrLst/>
-  </dgm:styleLbl>
-  <dgm:styleLbl name="node4">
-    <dgm:fillClrLst meth="repeat">
-      <a:schemeClr val="accent1"/>
-    </dgm:fillClrLst>
-    <dgm:linClrLst meth="repeat">
-      <a:schemeClr val="lt1"/>
-    </dgm:linClrLst>
-    <dgm:effectClrLst/>
-    <dgm:txLinClrLst/>
-    <dgm:txFillClrLst/>
-    <dgm:txEffectClrLst/>
-  </dgm:styleLbl>
-  <dgm:styleLbl name="fgImgPlace1">
-    <dgm:fillClrLst meth="repeat">
-      <a:schemeClr val="accent1">
-        <a:tint val="50000"/>
-      </a:schemeClr>
-    </dgm:fillClrLst>
-    <dgm:linClrLst meth="repeat">
-      <a:schemeClr val="lt1"/>
-    </dgm:linClrLst>
-    <dgm:effectClrLst/>
-    <dgm:txLinClrLst/>
-    <dgm:txFillClrLst meth="repeat">
-      <a:schemeClr val="lt1"/>
-    </dgm:txFillClrLst>
-    <dgm:txEffectClrLst/>
-  </dgm:styleLbl>
-  <dgm:styleLbl name="alignImgPlace1">
-    <dgm:fillClrLst meth="repeat">
-      <a:schemeClr val="accent1">
-        <a:tint val="50000"/>
-      </a:schemeClr>
-    </dgm:fillClrLst>
-    <dgm:linClrLst meth="repeat">
-      <a:schemeClr val="lt1"/>
-    </dgm:linClrLst>
-    <dgm:effectClrLst/>
-    <dgm:txLinClrLst/>
-    <dgm:txFillClrLst meth="repeat">
-      <a:schemeClr val="lt1"/>
-    </dgm:txFillClrLst>
-    <dgm:txEffectClrLst/>
-  </dgm:styleLbl>
-  <dgm:styleLbl name="bgImgPlace1">
-    <dgm:fillClrLst meth="repeat">
-      <a:schemeClr val="accent1">
-        <a:tint val="50000"/>
-      </a:schemeClr>
-    </dgm:fillClrLst>
-    <dgm:linClrLst meth="repeat">
-      <a:schemeClr val="lt1"/>
-    </dgm:linClrLst>
-    <dgm:effectClrLst/>
-    <dgm:txLinClrLst/>
-    <dgm:txFillClrLst meth="repeat">
-      <a:schemeClr val="lt1"/>
-    </dgm:txFillClrLst>
-    <dgm:txEffectClrLst/>
-  </dgm:styleLbl>
-  <dgm:styleLbl name="sibTrans2D1">
-    <dgm:fillClrLst meth="repeat">
-      <a:schemeClr val="accent1">
-        <a:tint val="60000"/>
-      </a:schemeClr>
-    </dgm:fillClrLst>
-    <dgm:linClrLst meth="repeat">
-      <a:schemeClr val="accent1">
-        <a:tint val="60000"/>
-      </a:schemeClr>
-    </dgm:linClrLst>
-    <dgm:effectClrLst/>
-    <dgm:txLinClrLst/>
-    <dgm:txFillClrLst/>
-    <dgm:txEffectClrLst/>
-  </dgm:styleLbl>
-  <dgm:styleLbl name="fgSibTrans2D1">
-    <dgm:fillClrLst meth="repeat">
-      <a:schemeClr val="accent1">
-        <a:tint val="60000"/>
-      </a:schemeClr>
-    </dgm:fillClrLst>
-    <dgm:linClrLst meth="repeat">
-      <a:schemeClr val="accent1">
-        <a:tint val="60000"/>
-      </a:schemeClr>
-    </dgm:linClrLst>
-    <dgm:effectClrLst/>
-    <dgm:txLinClrLst/>
-    <dgm:txFillClrLst/>
-    <dgm:txEffectClrLst/>
-  </dgm:styleLbl>
-  <dgm:styleLbl name="bgSibTrans2D1">
-    <dgm:fillClrLst meth="repeat">
-      <a:schemeClr val="accent1">
-        <a:tint val="60000"/>
-      </a:schemeClr>
-    </dgm:fillClrLst>
-    <dgm:linClrLst meth="repeat">
-      <a:schemeClr val="accent1">
-        <a:tint val="60000"/>
-      </a:schemeClr>
-    </dgm:linClrLst>
-    <dgm:effectClrLst/>
-    <dgm:txLinClrLst/>
-    <dgm:txFillClrLst/>
-    <dgm:txEffectClrLst/>
-  </dgm:styleLbl>
-  <dgm:styleLbl name="sibTrans1D1">
-    <dgm:fillClrLst meth="repeat">
-      <a:schemeClr val="accent1"/>
-    </dgm:fillClrLst>
-    <dgm:linClrLst meth="repeat">
-      <a:schemeClr val="accent1"/>
-    </dgm:linClrLst>
-    <dgm:effectClrLst/>
-    <dgm:txLinClrLst/>
-    <dgm:txFillClrLst meth="repeat">
-      <a:schemeClr val="tx1"/>
-    </dgm:txFillClrLst>
-    <dgm:txEffectClrLst/>
-  </dgm:styleLbl>
-  <dgm:styleLbl name="callout">
-    <dgm:fillClrLst meth="repeat">
-      <a:schemeClr val="accent1"/>
-    </dgm:fillClrLst>
-    <dgm:linClrLst meth="repeat">
-      <a:schemeClr val="accent1">
-        <a:tint val="50000"/>
-      </a:schemeClr>
-    </dgm:linClrLst>
-    <dgm:effectClrLst/>
-    <dgm:txLinClrLst/>
-    <dgm:txFillClrLst meth="repeat">
-      <a:schemeClr val="tx1"/>
-    </dgm:txFillClrLst>
-    <dgm:txEffectClrLst/>
-  </dgm:styleLbl>
-  <dgm:styleLbl name="asst0">
-    <dgm:fillClrLst meth="repeat">
-      <a:schemeClr val="accent1"/>
-    </dgm:fillClrLst>
-    <dgm:linClrLst meth="repeat">
-      <a:schemeClr val="lt1"/>
-    </dgm:linClrLst>
-    <dgm:effectClrLst/>
-    <dgm:txLinClrLst/>
-    <dgm:txFillClrLst/>
-    <dgm:txEffectClrLst/>
-  </dgm:styleLbl>
-  <dgm:styleLbl name="asst1">
-    <dgm:fillClrLst meth="repeat">
-      <a:schemeClr val="accent1"/>
-    </dgm:fillClrLst>
-    <dgm:linClrLst meth="repeat">
-      <a:schemeClr val="lt1"/>
-    </dgm:linClrLst>
-    <dgm:effectClrLst/>
-    <dgm:txLinClrLst/>
-    <dgm:txFillClrLst/>
-    <dgm:txEffectClrLst/>
-  </dgm:styleLbl>
-  <dgm:styleLbl name="asst2">
-    <dgm:fillClrLst meth="repeat">
-      <a:schemeClr val="accent1"/>
-    </dgm:fillClrLst>
-    <dgm:linClrLst meth="repeat">
-      <a:schemeClr val="lt1"/>
-    </dgm:linClrLst>
-    <dgm:effectClrLst/>
-    <dgm:txLinClrLst/>
-    <dgm:txFillClrLst/>
-    <dgm:txEffectClrLst/>
-  </dgm:styleLbl>
-  <dgm:styleLbl name="asst3">
-    <dgm:fillClrLst meth="repeat">
-      <a:schemeClr val="accent1"/>
-    </dgm:fillClrLst>
-    <dgm:linClrLst meth="repeat">
-      <a:schemeClr val="lt1"/>
-    </dgm:linClrLst>
-    <dgm:effectClrLst/>
-    <dgm:txLinClrLst/>
-    <dgm:txFillClrLst/>
-    <dgm:txEffectClrLst/>
-  </dgm:styleLbl>
-  <dgm:styleLbl name="asst4">
-    <dgm:fillClrLst meth="repeat">
-      <a:schemeClr val="accent1"/>
-    </dgm:fillClrLst>
-    <dgm:linClrLst meth="repeat">
-      <a:schemeClr val="lt1"/>
-    </dgm:linClrLst>
-    <dgm:effectClrLst/>
-    <dgm:txLinClrLst/>
-    <dgm:txFillClrLst/>
-    <dgm:txEffectClrLst/>
-  </dgm:styleLbl>
-  <dgm:styleLbl name="parChTrans2D1">
-    <dgm:fillClrLst meth="repeat">
-      <a:schemeClr val="accent1">
-        <a:tint val="60000"/>
-      </a:schemeClr>
-    </dgm:fillClrLst>
-    <dgm:linClrLst meth="repeat">
-      <a:schemeClr val="accent1">
-        <a:tint val="60000"/>
-      </a:schemeClr>
-    </dgm:linClrLst>
-    <dgm:effectClrLst/>
-    <dgm:txLinClrLst/>
-    <dgm:txFillClrLst meth="repeat">
-      <a:schemeClr val="lt1"/>
-    </dgm:txFillClrLst>
-    <dgm:txEffectClrLst/>
-  </dgm:styleLbl>
-  <dgm:styleLbl name="parChTrans2D2">
-    <dgm:fillClrLst meth="repeat">
-      <a:schemeClr val="accent1"/>
-    </dgm:fillClrLst>
-    <dgm:linClrLst meth="repeat">
-      <a:schemeClr val="accent1"/>
-    </dgm:linClrLst>
-    <dgm:effectClrLst/>
-    <dgm:txLinClrLst/>
-    <dgm:txFillClrLst meth="repeat">
-      <a:schemeClr val="lt1"/>
-    </dgm:txFillClrLst>
-    <dgm:txEffectClrLst/>
-  </dgm:styleLbl>
-  <dgm:styleLbl name="parChTrans2D3">
-    <dgm:fillClrLst meth="repeat">
-      <a:schemeClr val="accent1"/>
-    </dgm:fillClrLst>
-    <dgm:linClrLst meth="repeat">
-      <a:schemeClr val="accent1"/>
-    </dgm:linClrLst>
-    <dgm:effectClrLst/>
-    <dgm:txLinClrLst/>
-    <dgm:txFillClrLst meth="repeat">
-      <a:schemeClr val="lt1"/>
-    </dgm:txFillClrLst>
-    <dgm:txEffectClrLst/>
-  </dgm:styleLbl>
-  <dgm:styleLbl name="parChTrans2D4">
-    <dgm:fillClrLst meth="repeat">
-      <a:schemeClr val="accent1"/>
-    </dgm:fillClrLst>
-    <dgm:linClrLst meth="repeat">
-      <a:schemeClr val="accent1"/>
-    </dgm:linClrLst>
-    <dgm:effectClrLst/>
-    <dgm:txLinClrLst/>
-    <dgm:txFillClrLst meth="repeat">
-      <a:schemeClr val="lt1"/>
-    </dgm:txFillClrLst>
-    <dgm:txEffectClrLst/>
-  </dgm:styleLbl>
-  <dgm:styleLbl name="parChTrans1D1">
-    <dgm:fillClrLst meth="repeat">
-      <a:schemeClr val="accent1"/>
-    </dgm:fillClrLst>
-    <dgm:linClrLst meth="repeat">
-      <a:schemeClr val="accent1">
-        <a:shade val="60000"/>
-      </a:schemeClr>
-    </dgm:linClrLst>
-    <dgm:effectClrLst/>
-    <dgm:txLinClrLst/>
-    <dgm:txFillClrLst meth="repeat">
-      <a:schemeClr val="tx1"/>
-    </dgm:txFillClrLst>
-    <dgm:txEffectClrLst/>
-  </dgm:styleLbl>
-  <dgm:styleLbl name="parChTrans1D2">
-    <dgm:fillClrLst meth="repeat">
-      <a:schemeClr val="accent1"/>
-    </dgm:fillClrLst>
-    <dgm:linClrLst meth="repeat">
-      <a:schemeClr val="accent1">
-        <a:shade val="60000"/>
-      </a:schemeClr>
-    </dgm:linClrLst>
-    <dgm:effectClrLst/>
-    <dgm:txLinClrLst/>
-    <dgm:txFillClrLst meth="repeat">
-      <a:schemeClr val="tx1"/>
-    </dgm:txFillClrLst>
-    <dgm:txEffectClrLst/>
-  </dgm:styleLbl>
-  <dgm:styleLbl name="parChTrans1D3">
-    <dgm:fillClrLst meth="repeat">
-      <a:schemeClr val="accent1"/>
-    </dgm:fillClrLst>
-    <dgm:linClrLst meth="repeat">
-      <a:schemeClr val="accent1">
-        <a:shade val="80000"/>
-      </a:schemeClr>
-    </dgm:linClrLst>
-    <dgm:effectClrLst/>
-    <dgm:txLinClrLst/>
-    <dgm:txFillClrLst meth="repeat">
-      <a:schemeClr val="tx1"/>
-    </dgm:txFillClrLst>
-    <dgm:txEffectClrLst/>
-  </dgm:styleLbl>
-  <dgm:styleLbl name="parChTrans1D4">
-    <dgm:fillClrLst meth="repeat">
-      <a:schemeClr val="accent1"/>
-    </dgm:fillClrLst>
-    <dgm:linClrLst meth="repeat">
-      <a:schemeClr val="accent1">
-        <a:shade val="80000"/>
-      </a:schemeClr>
-    </dgm:linClrLst>
-    <dgm:effectClrLst/>
-    <dgm:txLinClrLst/>
-    <dgm:txFillClrLst meth="repeat">
-      <a:schemeClr val="tx1"/>
-    </dgm:txFillClrLst>
-    <dgm:txEffectClrLst/>
-  </dgm:styleLbl>
-  <dgm:styleLbl name="fgAcc1">
-    <dgm:fillClrLst meth="repeat">
-      <a:schemeClr val="lt1">
-        <a:alpha val="90000"/>
-      </a:schemeClr>
-    </dgm:fillClrLst>
-    <dgm:linClrLst meth="repeat">
-      <a:schemeClr val="accent1"/>
-    </dgm:linClrLst>
-    <dgm:effectClrLst/>
-    <dgm:txLinClrLst/>
-    <dgm:txFillClrLst meth="repeat">
-      <a:schemeClr val="dk1"/>
-    </dgm:txFillClrLst>
-    <dgm:txEffectClrLst/>
-  </dgm:styleLbl>
-  <dgm:styleLbl name="conFgAcc1">
-    <dgm:fillClrLst meth="repeat">
-      <a:schemeClr val="lt1">
-        <a:alpha val="90000"/>
-      </a:schemeClr>
-    </dgm:fillClrLst>
-    <dgm:linClrLst meth="repeat">
-      <a:schemeClr val="accent1"/>
-    </dgm:linClrLst>
-    <dgm:effectClrLst/>
-    <dgm:txLinClrLst/>
-    <dgm:txFillClrLst meth="repeat">
-      <a:schemeClr val="dk1"/>
-    </dgm:txFillClrLst>
-    <dgm:txEffectClrLst/>
-  </dgm:styleLbl>
-  <dgm:styleLbl name="alignAcc1">
-    <dgm:fillClrLst meth="repeat">
-      <a:schemeClr val="lt1">
-        <a:alpha val="90000"/>
-      </a:schemeClr>
-    </dgm:fillClrLst>
-    <dgm:linClrLst meth="repeat">
-      <a:schemeClr val="accent1"/>
-    </dgm:linClrLst>
-    <dgm:effectClrLst/>
-    <dgm:txLinClrLst/>
-    <dgm:txFillClrLst meth="repeat">
-      <a:schemeClr val="dk1"/>
-    </dgm:txFillClrLst>
-    <dgm:txEffectClrLst/>
-  </dgm:styleLbl>
-  <dgm:styleLbl name="trAlignAcc1">
-    <dgm:fillClrLst meth="repeat">
-      <a:schemeClr val="lt1">
-        <a:alpha val="40000"/>
-      </a:schemeClr>
-    </dgm:fillClrLst>
-    <dgm:linClrLst meth="repeat">
-      <a:schemeClr val="accent1"/>
-    </dgm:linClrLst>
-    <dgm:effectClrLst/>
-    <dgm:txLinClrLst/>
-    <dgm:txFillClrLst meth="repeat">
-      <a:schemeClr val="dk1"/>
-    </dgm:txFillClrLst>
-    <dgm:txEffectClrLst/>
-  </dgm:styleLbl>
-  <dgm:styleLbl name="bgAcc1">
-    <dgm:fillClrLst meth="repeat">
-      <a:schemeClr val="lt1">
-        <a:alpha val="90000"/>
-      </a:schemeClr>
-    </dgm:fillClrLst>
-    <dgm:linClrLst meth="repeat">
-      <a:schemeClr val="accent1"/>
-    </dgm:linClrLst>
-    <dgm:effectClrLst/>
-    <dgm:txLinClrLst/>
-    <dgm:txFillClrLst meth="repeat">
-      <a:schemeClr val="dk1"/>
-    </dgm:txFillClrLst>
-    <dgm:txEffectClrLst/>
-  </dgm:styleLbl>
-  <dgm:styleLbl name="solidFgAcc1">
-    <dgm:fillClrLst meth="repeat">
-      <a:schemeClr val="lt1"/>
-    </dgm:fillClrLst>
-    <dgm:linClrLst meth="repeat">
-      <a:schemeClr val="accent1"/>
-    </dgm:linClrLst>
-    <dgm:effectClrLst/>
-    <dgm:txLinClrLst/>
-    <dgm:txFillClrLst meth="repeat">
-      <a:schemeClr val="dk1"/>
-    </dgm:txFillClrLst>
-    <dgm:txEffectClrLst/>
-  </dgm:styleLbl>
-  <dgm:styleLbl name="solidAlignAcc1">
-    <dgm:fillClrLst meth="repeat">
-      <a:schemeClr val="lt1"/>
-    </dgm:fillClrLst>
-    <dgm:linClrLst meth="repeat">
-      <a:schemeClr val="accent1"/>
-    </dgm:linClrLst>
-    <dgm:effectClrLst/>
-    <dgm:txLinClrLst/>
-    <dgm:txFillClrLst meth="repeat">
-      <a:schemeClr val="dk1"/>
-    </dgm:txFillClrLst>
-    <dgm:txEffectClrLst/>
-  </dgm:styleLbl>
-  <dgm:styleLbl name="solidBgAcc1">
-    <dgm:fillClrLst meth="repeat">
-      <a:schemeClr val="lt1"/>
-    </dgm:fillClrLst>
-    <dgm:linClrLst meth="repeat">
-      <a:schemeClr val="accent1"/>
-    </dgm:linClrLst>
-    <dgm:effectClrLst/>
-    <dgm:txLinClrLst/>
-    <dgm:txFillClrLst meth="repeat">
-      <a:schemeClr val="dk1"/>
-    </dgm:txFillClrLst>
-    <dgm:txEffectClrLst/>
-  </dgm:styleLbl>
-  <dgm:styleLbl name="fgAccFollowNode1">
-    <dgm:fillClrLst meth="repeat">
-      <a:schemeClr val="accent1">
-        <a:alpha val="90000"/>
-        <a:tint val="40000"/>
-      </a:schemeClr>
-    </dgm:fillClrLst>
-    <dgm:linClrLst meth="repeat">
-      <a:schemeClr val="accent1">
-        <a:alpha val="90000"/>
-        <a:tint val="40000"/>
-      </a:schemeClr>
-    </dgm:linClrLst>
-    <dgm:effectClrLst/>
-    <dgm:txLinClrLst/>
-    <dgm:txFillClrLst meth="repeat">
-      <a:schemeClr val="dk1"/>
-    </dgm:txFillClrLst>
-    <dgm:txEffectClrLst/>
-  </dgm:styleLbl>
-  <dgm:styleLbl name="alignAccFollowNode1">
-    <dgm:fillClrLst meth="repeat">
-      <a:schemeClr val="accent1">
-        <a:alpha val="90000"/>
-        <a:tint val="40000"/>
-      </a:schemeClr>
-    </dgm:fillClrLst>
-    <dgm:linClrLst meth="repeat">
-      <a:schemeClr val="accent1">
-        <a:alpha val="90000"/>
-        <a:tint val="40000"/>
-      </a:schemeClr>
-    </dgm:linClrLst>
-    <dgm:effectClrLst/>
-    <dgm:txLinClrLst/>
-    <dgm:txFillClrLst meth="repeat">
-      <a:schemeClr val="dk1"/>
-    </dgm:txFillClrLst>
-    <dgm:txEffectClrLst/>
-  </dgm:styleLbl>
-  <dgm:styleLbl name="bgAccFollowNode1">
-    <dgm:fillClrLst meth="repeat">
-      <a:schemeClr val="accent1">
-        <a:alpha val="90000"/>
-        <a:tint val="40000"/>
-      </a:schemeClr>
-    </dgm:fillClrLst>
-    <dgm:linClrLst meth="repeat">
-      <a:schemeClr val="accent1">
-        <a:alpha val="90000"/>
-        <a:tint val="40000"/>
-      </a:schemeClr>
-    </dgm:linClrLst>
-    <dgm:effectClrLst/>
-    <dgm:txLinClrLst/>
-    <dgm:txFillClrLst meth="repeat">
-      <a:schemeClr val="dk1"/>
-    </dgm:txFillClrLst>
-    <dgm:txEffectClrLst/>
-  </dgm:styleLbl>
-  <dgm:styleLbl name="fgAcc0">
-    <dgm:fillClrLst meth="repeat">
-      <a:schemeClr val="lt1">
-        <a:alpha val="90000"/>
-      </a:schemeClr>
-    </dgm:fillClrLst>
-    <dgm:linClrLst meth="repeat">
-      <a:schemeClr val="accent1"/>
-    </dgm:linClrLst>
-    <dgm:effectClrLst/>
-    <dgm:txLinClrLst/>
-    <dgm:txFillClrLst meth="repeat">
-      <a:schemeClr val="dk1"/>
-    </dgm:txFillClrLst>
-    <dgm:txEffectClrLst/>
-  </dgm:styleLbl>
-  <dgm:styleLbl name="fgAcc2">
-    <dgm:fillClrLst meth="repeat">
-      <a:schemeClr val="lt1">
-        <a:alpha val="90000"/>
-      </a:schemeClr>
-    </dgm:fillClrLst>
-    <dgm:linClrLst meth="repeat">
-      <a:schemeClr val="accent1"/>
-    </dgm:linClrLst>
-    <dgm:effectClrLst/>
-    <dgm:txLinClrLst/>
-    <dgm:txFillClrLst meth="repeat">
-      <a:schemeClr val="dk1"/>
-    </dgm:txFillClrLst>
-    <dgm:txEffectClrLst/>
-  </dgm:styleLbl>
-  <dgm:styleLbl name="fgAcc3">
-    <dgm:fillClrLst meth="repeat">
-      <a:schemeClr val="lt1">
-        <a:alpha val="90000"/>
-      </a:schemeClr>
-    </dgm:fillClrLst>
-    <dgm:linClrLst meth="repeat">
-      <a:schemeClr val="accent1"/>
-    </dgm:linClrLst>
-    <dgm:effectClrLst/>
-    <dgm:txLinClrLst/>
-    <dgm:txFillClrLst meth="repeat">
-      <a:schemeClr val="dk1"/>
-    </dgm:txFillClrLst>
-    <dgm:txEffectClrLst/>
-  </dgm:styleLbl>
-  <dgm:styleLbl name="fgAcc4">
-    <dgm:fillClrLst meth="repeat">
-      <a:schemeClr val="lt1">
-        <a:alpha val="90000"/>
-      </a:schemeClr>
-    </dgm:fillClrLst>
-    <dgm:linClrLst meth="repeat">
-      <a:schemeClr val="accent1"/>
-    </dgm:linClrLst>
-    <dgm:effectClrLst/>
-    <dgm:txLinClrLst/>
-    <dgm:txFillClrLst meth="repeat">
-      <a:schemeClr val="dk1"/>
-    </dgm:txFillClrLst>
-    <dgm:txEffectClrLst/>
-  </dgm:styleLbl>
-  <dgm:styleLbl name="bgShp">
-    <dgm:fillClrLst meth="repeat">
-      <a:schemeClr val="accent1">
-        <a:tint val="40000"/>
-      </a:schemeClr>
-    </dgm:fillClrLst>
-    <dgm:linClrLst meth="repeat">
-      <a:schemeClr val="accent1"/>
-    </dgm:linClrLst>
-    <dgm:effectClrLst/>
-    <dgm:txLinClrLst/>
-    <dgm:txFillClrLst meth="repeat">
-      <a:schemeClr val="dk1"/>
-    </dgm:txFillClrLst>
-    <dgm:txEffectClrLst/>
-  </dgm:styleLbl>
-  <dgm:styleLbl name="dkBgShp">
-    <dgm:fillClrLst meth="repeat">
-      <a:schemeClr val="accent1">
-        <a:shade val="80000"/>
-      </a:schemeClr>
-    </dgm:fillClrLst>
-    <dgm:linClrLst meth="repeat">
-      <a:schemeClr val="accent1"/>
-    </dgm:linClrLst>
-    <dgm:effectClrLst/>
-    <dgm:txLinClrLst/>
-    <dgm:txFillClrLst meth="repeat">
-      <a:schemeClr val="lt1"/>
-    </dgm:txFillClrLst>
-    <dgm:txEffectClrLst/>
-  </dgm:styleLbl>
-  <dgm:styleLbl name="trBgShp">
-    <dgm:fillClrLst meth="repeat">
-      <a:schemeClr val="accent1">
-        <a:tint val="50000"/>
-        <a:alpha val="40000"/>
-      </a:schemeClr>
-    </dgm:fillClrLst>
-    <dgm:linClrLst meth="repeat">
-      <a:schemeClr val="accent1"/>
-    </dgm:linClrLst>
-    <dgm:effectClrLst/>
-    <dgm:txLinClrLst/>
-    <dgm:txFillClrLst meth="repeat">
-      <a:schemeClr val="lt1"/>
-    </dgm:txFillClrLst>
-    <dgm:txEffectClrLst/>
-  </dgm:styleLbl>
-  <dgm:styleLbl name="fgShp">
-    <dgm:fillClrLst meth="repeat">
-      <a:schemeClr val="accent1">
-        <a:tint val="60000"/>
-      </a:schemeClr>
-    </dgm:fillClrLst>
-    <dgm:linClrLst meth="repeat">
-      <a:schemeClr val="lt1"/>
-    </dgm:linClrLst>
-    <dgm:effectClrLst/>
-    <dgm:txLinClrLst/>
-    <dgm:txFillClrLst meth="repeat">
-      <a:schemeClr val="dk1"/>
-    </dgm:txFillClrLst>
-    <dgm:txEffectClrLst/>
-  </dgm:styleLbl>
-  <dgm:styleLbl name="revTx">
-    <dgm:fillClrLst meth="repeat">
-      <a:schemeClr val="lt1">
-        <a:alpha val="0"/>
-      </a:schemeClr>
-    </dgm:fillClrLst>
-    <dgm:linClrLst meth="repeat">
-      <a:schemeClr val="dk1">
-        <a:alpha val="0"/>
-      </a:schemeClr>
-    </dgm:linClrLst>
-    <dgm:effectClrLst/>
-    <dgm:txLinClrLst/>
-    <dgm:txFillClrLst meth="repeat">
-      <a:schemeClr val="tx1"/>
-    </dgm:txFillClrLst>
-    <dgm:txEffectClrLst/>
-  </dgm:styleLbl>
-</dgm:colorsDef>
-</file>
-
-<file path=ppt/diagrams/data1.xml><?xml version="1.0" encoding="utf-8"?>
-<dgm:dataModel xmlns:dgm="http://schemas.openxmlformats.org/drawingml/2006/diagram" xmlns:a="http://schemas.openxmlformats.org/drawingml/2006/main">
-  <dgm:ptLst>
-    <dgm:pt modelId="{FD57CCFC-B83B-464C-88F8-BC6450268F97}" type="doc">
-      <dgm:prSet loTypeId="urn:microsoft.com/office/officeart/2005/8/layout/cycle2" loCatId="cycle" qsTypeId="urn:microsoft.com/office/officeart/2005/8/quickstyle/simple1" qsCatId="simple" csTypeId="urn:microsoft.com/office/officeart/2005/8/colors/accent1_2" csCatId="accent1" phldr="1"/>
-      <dgm:spPr/>
-      <dgm:t>
-        <a:bodyPr/>
-        <a:lstStyle/>
-        <a:p>
-          <a:endParaRPr lang="en-US"/>
-        </a:p>
-      </dgm:t>
-    </dgm:pt>
-    <dgm:pt modelId="{DC1518B7-EDD6-4CCF-9688-BF43B6ABDDB5}">
-      <dgm:prSet phldrT="[Text]"/>
-      <dgm:spPr/>
-      <dgm:t>
-        <a:bodyPr/>
-        <a:lstStyle/>
-        <a:p>
-          <a:r>
-            <a:rPr lang="en-US" dirty="0" smtClean="0"/>
-            <a:t>TSK0</a:t>
-          </a:r>
-          <a:endParaRPr lang="en-US" dirty="0"/>
-        </a:p>
-      </dgm:t>
-    </dgm:pt>
-    <dgm:pt modelId="{130A9095-4CCA-4C97-87A2-565F02EAAB50}" type="parTrans" cxnId="{E1FC6E72-F33D-4BB9-A274-4220C286B861}">
-      <dgm:prSet/>
-      <dgm:spPr/>
-      <dgm:t>
-        <a:bodyPr/>
-        <a:lstStyle/>
-        <a:p>
-          <a:endParaRPr lang="en-US"/>
-        </a:p>
-      </dgm:t>
-    </dgm:pt>
-    <dgm:pt modelId="{3E71EEED-B8A8-41CA-92B7-5F1CDAF3BE2F}" type="sibTrans" cxnId="{E1FC6E72-F33D-4BB9-A274-4220C286B861}">
-      <dgm:prSet/>
-      <dgm:spPr/>
-      <dgm:t>
-        <a:bodyPr/>
-        <a:lstStyle/>
-        <a:p>
-          <a:endParaRPr lang="en-US"/>
-        </a:p>
-      </dgm:t>
-    </dgm:pt>
-    <dgm:pt modelId="{142584DF-DF37-4E4D-8B12-3F1186ED8A79}">
-      <dgm:prSet phldrT="[Text]">
-        <dgm:style>
-          <a:lnRef idx="1">
-            <a:schemeClr val="accent2"/>
-          </a:lnRef>
-          <a:fillRef idx="2">
-            <a:schemeClr val="accent2"/>
-          </a:fillRef>
-          <a:effectRef idx="1">
-            <a:schemeClr val="accent2"/>
-          </a:effectRef>
-          <a:fontRef idx="minor">
-            <a:schemeClr val="dk1"/>
-          </a:fontRef>
-        </dgm:style>
-      </dgm:prSet>
-      <dgm:spPr/>
-      <dgm:t>
-        <a:bodyPr/>
-        <a:lstStyle/>
-        <a:p>
-          <a:r>
-            <a:rPr lang="en-US" dirty="0" smtClean="0"/>
-            <a:t>TSK1</a:t>
-          </a:r>
-          <a:endParaRPr lang="en-US" dirty="0"/>
-        </a:p>
-      </dgm:t>
-    </dgm:pt>
-    <dgm:pt modelId="{ED9FF5C5-2955-4ABE-8CBD-A291C105BC10}" type="parTrans" cxnId="{8000DA2E-31CB-4AD9-AF9B-52BAB5602E59}">
-      <dgm:prSet/>
-      <dgm:spPr/>
-      <dgm:t>
-        <a:bodyPr/>
-        <a:lstStyle/>
-        <a:p>
-          <a:endParaRPr lang="en-US"/>
-        </a:p>
-      </dgm:t>
-    </dgm:pt>
-    <dgm:pt modelId="{F9A12A89-8926-472F-A7F2-6C018E0DE993}" type="sibTrans" cxnId="{8000DA2E-31CB-4AD9-AF9B-52BAB5602E59}">
-      <dgm:prSet/>
-      <dgm:spPr/>
-      <dgm:t>
-        <a:bodyPr/>
-        <a:lstStyle/>
-        <a:p>
-          <a:endParaRPr lang="en-US"/>
-        </a:p>
-      </dgm:t>
-    </dgm:pt>
-    <dgm:pt modelId="{94959A71-8399-4743-A822-4B2822F36EB9}">
-      <dgm:prSet phldrT="[Text]"/>
-      <dgm:spPr/>
-      <dgm:t>
-        <a:bodyPr/>
-        <a:lstStyle/>
-        <a:p>
-          <a:r>
-            <a:rPr lang="en-US" dirty="0" smtClean="0"/>
-            <a:t>TSK2</a:t>
-          </a:r>
-          <a:endParaRPr lang="en-US" dirty="0"/>
-        </a:p>
-      </dgm:t>
-    </dgm:pt>
-    <dgm:pt modelId="{7B73C905-77F1-455E-8A1E-1C07DA733669}" type="parTrans" cxnId="{0A57CA8B-CCE8-45FB-ABAA-4658A3B96B41}">
-      <dgm:prSet/>
-      <dgm:spPr/>
-      <dgm:t>
-        <a:bodyPr/>
-        <a:lstStyle/>
-        <a:p>
-          <a:endParaRPr lang="en-US"/>
-        </a:p>
-      </dgm:t>
-    </dgm:pt>
-    <dgm:pt modelId="{341A2B66-E7B4-4CCE-A800-2D09F00E988D}" type="sibTrans" cxnId="{0A57CA8B-CCE8-45FB-ABAA-4658A3B96B41}">
-      <dgm:prSet/>
-      <dgm:spPr/>
-      <dgm:t>
-        <a:bodyPr/>
-        <a:lstStyle/>
-        <a:p>
-          <a:endParaRPr lang="en-US"/>
-        </a:p>
-      </dgm:t>
-    </dgm:pt>
-    <dgm:pt modelId="{1303FBFC-9B1F-43AD-A9CC-01EC7DFCCA63}">
-      <dgm:prSet phldrT="[Text]">
-        <dgm:style>
-          <a:lnRef idx="1">
-            <a:schemeClr val="accent2"/>
-          </a:lnRef>
-          <a:fillRef idx="2">
-            <a:schemeClr val="accent2"/>
-          </a:fillRef>
-          <a:effectRef idx="1">
-            <a:schemeClr val="accent2"/>
-          </a:effectRef>
-          <a:fontRef idx="minor">
-            <a:schemeClr val="dk1"/>
-          </a:fontRef>
-        </dgm:style>
-      </dgm:prSet>
-      <dgm:spPr/>
-      <dgm:t>
-        <a:bodyPr/>
-        <a:lstStyle/>
-        <a:p>
-          <a:r>
-            <a:rPr lang="en-US" dirty="0" smtClean="0"/>
-            <a:t>TSK3</a:t>
-          </a:r>
-          <a:endParaRPr lang="en-US" dirty="0"/>
-        </a:p>
-      </dgm:t>
-    </dgm:pt>
-    <dgm:pt modelId="{DF56F91D-EBF4-453D-B293-713DA3B7BAE8}" type="parTrans" cxnId="{26FA7A0A-3EAB-4761-BA2E-5E038B9C08EC}">
-      <dgm:prSet/>
-      <dgm:spPr/>
-      <dgm:t>
-        <a:bodyPr/>
-        <a:lstStyle/>
-        <a:p>
-          <a:endParaRPr lang="en-US"/>
-        </a:p>
-      </dgm:t>
-    </dgm:pt>
-    <dgm:pt modelId="{963AB9C7-534E-4244-8795-2DE50C0AAE1A}" type="sibTrans" cxnId="{26FA7A0A-3EAB-4761-BA2E-5E038B9C08EC}">
-      <dgm:prSet/>
-      <dgm:spPr/>
-      <dgm:t>
-        <a:bodyPr/>
-        <a:lstStyle/>
-        <a:p>
-          <a:endParaRPr lang="en-US"/>
-        </a:p>
-      </dgm:t>
-    </dgm:pt>
-    <dgm:pt modelId="{604DED0C-C7D1-44E9-9D91-4EA86CC58132}">
-      <dgm:prSet phldrT="[Text]"/>
-      <dgm:spPr/>
-      <dgm:t>
-        <a:bodyPr/>
-        <a:lstStyle/>
-        <a:p>
-          <a:r>
-            <a:rPr lang="en-US" dirty="0" smtClean="0"/>
-            <a:t>TSK4</a:t>
-          </a:r>
-          <a:endParaRPr lang="en-US" dirty="0"/>
-        </a:p>
-      </dgm:t>
-    </dgm:pt>
-    <dgm:pt modelId="{80FF181E-2F3F-4C95-B016-991B121BE693}" type="parTrans" cxnId="{8318BC13-B71D-4942-9198-291D21A68FEF}">
-      <dgm:prSet/>
-      <dgm:spPr/>
-      <dgm:t>
-        <a:bodyPr/>
-        <a:lstStyle/>
-        <a:p>
-          <a:endParaRPr lang="en-US"/>
-        </a:p>
-      </dgm:t>
-    </dgm:pt>
-    <dgm:pt modelId="{F9D67482-08A8-41D2-A4D4-28EF53768755}" type="sibTrans" cxnId="{8318BC13-B71D-4942-9198-291D21A68FEF}">
-      <dgm:prSet/>
-      <dgm:spPr/>
-      <dgm:t>
-        <a:bodyPr/>
-        <a:lstStyle/>
-        <a:p>
-          <a:endParaRPr lang="en-US"/>
-        </a:p>
-      </dgm:t>
-    </dgm:pt>
-    <dgm:pt modelId="{67A0B1C8-6388-410F-ABFD-B0A6F2F228F7}" type="pres">
-      <dgm:prSet presAssocID="{FD57CCFC-B83B-464C-88F8-BC6450268F97}" presName="cycle" presStyleCnt="0">
-        <dgm:presLayoutVars>
-          <dgm:dir/>
-          <dgm:resizeHandles val="exact"/>
-        </dgm:presLayoutVars>
-      </dgm:prSet>
-      <dgm:spPr/>
-      <dgm:t>
-        <a:bodyPr/>
-        <a:lstStyle/>
-        <a:p>
-          <a:endParaRPr lang="en-US"/>
-        </a:p>
-      </dgm:t>
-    </dgm:pt>
-    <dgm:pt modelId="{9D1A61A1-B2AA-4F6A-AD68-CA1F7CD1DF22}" type="pres">
-      <dgm:prSet presAssocID="{DC1518B7-EDD6-4CCF-9688-BF43B6ABDDB5}" presName="node" presStyleLbl="node1" presStyleIdx="0" presStyleCnt="5">
-        <dgm:presLayoutVars>
-          <dgm:bulletEnabled val="1"/>
-        </dgm:presLayoutVars>
-      </dgm:prSet>
-      <dgm:spPr/>
-      <dgm:t>
-        <a:bodyPr/>
-        <a:lstStyle/>
-        <a:p>
-          <a:endParaRPr lang="en-US"/>
-        </a:p>
-      </dgm:t>
-    </dgm:pt>
-    <dgm:pt modelId="{2C793FD2-6A40-488B-8088-8D409044269C}" type="pres">
-      <dgm:prSet presAssocID="{3E71EEED-B8A8-41CA-92B7-5F1CDAF3BE2F}" presName="sibTrans" presStyleLbl="sibTrans2D1" presStyleIdx="0" presStyleCnt="5"/>
-      <dgm:spPr/>
-      <dgm:t>
-        <a:bodyPr/>
-        <a:lstStyle/>
-        <a:p>
-          <a:endParaRPr lang="en-US"/>
-        </a:p>
-      </dgm:t>
-    </dgm:pt>
-    <dgm:pt modelId="{586AA159-1625-454D-A036-99A7A81CC350}" type="pres">
-      <dgm:prSet presAssocID="{3E71EEED-B8A8-41CA-92B7-5F1CDAF3BE2F}" presName="connectorText" presStyleLbl="sibTrans2D1" presStyleIdx="0" presStyleCnt="5"/>
-      <dgm:spPr/>
-      <dgm:t>
-        <a:bodyPr/>
-        <a:lstStyle/>
-        <a:p>
-          <a:endParaRPr lang="en-US"/>
-        </a:p>
-      </dgm:t>
-    </dgm:pt>
-    <dgm:pt modelId="{4CFB935C-7860-4776-A04C-834BDF85D630}" type="pres">
-      <dgm:prSet presAssocID="{142584DF-DF37-4E4D-8B12-3F1186ED8A79}" presName="node" presStyleLbl="node1" presStyleIdx="1" presStyleCnt="5">
-        <dgm:presLayoutVars>
-          <dgm:bulletEnabled val="1"/>
-        </dgm:presLayoutVars>
-      </dgm:prSet>
-      <dgm:spPr/>
-      <dgm:t>
-        <a:bodyPr/>
-        <a:lstStyle/>
-        <a:p>
-          <a:endParaRPr lang="en-US"/>
-        </a:p>
-      </dgm:t>
-    </dgm:pt>
-    <dgm:pt modelId="{194CE3CF-2BF2-4AF5-9CEB-61305F2C5E2D}" type="pres">
-      <dgm:prSet presAssocID="{F9A12A89-8926-472F-A7F2-6C018E0DE993}" presName="sibTrans" presStyleLbl="sibTrans2D1" presStyleIdx="1" presStyleCnt="5"/>
-      <dgm:spPr/>
-      <dgm:t>
-        <a:bodyPr/>
-        <a:lstStyle/>
-        <a:p>
-          <a:endParaRPr lang="en-US"/>
-        </a:p>
-      </dgm:t>
-    </dgm:pt>
-    <dgm:pt modelId="{CFCBAE3F-24A5-4178-8FA4-D975A8B7374E}" type="pres">
-      <dgm:prSet presAssocID="{F9A12A89-8926-472F-A7F2-6C018E0DE993}" presName="connectorText" presStyleLbl="sibTrans2D1" presStyleIdx="1" presStyleCnt="5"/>
-      <dgm:spPr/>
-      <dgm:t>
-        <a:bodyPr/>
-        <a:lstStyle/>
-        <a:p>
-          <a:endParaRPr lang="en-US"/>
-        </a:p>
-      </dgm:t>
-    </dgm:pt>
-    <dgm:pt modelId="{EA63BA78-DFE1-4E32-B4E3-D3637C87D01A}" type="pres">
-      <dgm:prSet presAssocID="{94959A71-8399-4743-A822-4B2822F36EB9}" presName="node" presStyleLbl="node1" presStyleIdx="2" presStyleCnt="5">
-        <dgm:presLayoutVars>
-          <dgm:bulletEnabled val="1"/>
-        </dgm:presLayoutVars>
-      </dgm:prSet>
-      <dgm:spPr/>
-      <dgm:t>
-        <a:bodyPr/>
-        <a:lstStyle/>
-        <a:p>
-          <a:endParaRPr lang="en-US"/>
-        </a:p>
-      </dgm:t>
-    </dgm:pt>
-    <dgm:pt modelId="{DA3308EA-AC4F-4F40-B121-EF1B7A77DC44}" type="pres">
-      <dgm:prSet presAssocID="{341A2B66-E7B4-4CCE-A800-2D09F00E988D}" presName="sibTrans" presStyleLbl="sibTrans2D1" presStyleIdx="2" presStyleCnt="5"/>
-      <dgm:spPr/>
-      <dgm:t>
-        <a:bodyPr/>
-        <a:lstStyle/>
-        <a:p>
-          <a:endParaRPr lang="en-US"/>
-        </a:p>
-      </dgm:t>
-    </dgm:pt>
-    <dgm:pt modelId="{D328AB4C-7799-47B7-A8F1-3355D4AEDC1D}" type="pres">
-      <dgm:prSet presAssocID="{341A2B66-E7B4-4CCE-A800-2D09F00E988D}" presName="connectorText" presStyleLbl="sibTrans2D1" presStyleIdx="2" presStyleCnt="5"/>
-      <dgm:spPr/>
-      <dgm:t>
-        <a:bodyPr/>
-        <a:lstStyle/>
-        <a:p>
-          <a:endParaRPr lang="en-US"/>
-        </a:p>
-      </dgm:t>
-    </dgm:pt>
-    <dgm:pt modelId="{7865197D-6E8D-4FFF-BEF4-77D19CDA6748}" type="pres">
-      <dgm:prSet presAssocID="{1303FBFC-9B1F-43AD-A9CC-01EC7DFCCA63}" presName="node" presStyleLbl="node1" presStyleIdx="3" presStyleCnt="5">
-        <dgm:presLayoutVars>
-          <dgm:bulletEnabled val="1"/>
-        </dgm:presLayoutVars>
-      </dgm:prSet>
-      <dgm:spPr/>
-      <dgm:t>
-        <a:bodyPr/>
-        <a:lstStyle/>
-        <a:p>
-          <a:endParaRPr lang="en-US"/>
-        </a:p>
-      </dgm:t>
-    </dgm:pt>
-    <dgm:pt modelId="{BAAC15F4-9D1D-4DF8-800E-A898ABC0F2AB}" type="pres">
-      <dgm:prSet presAssocID="{963AB9C7-534E-4244-8795-2DE50C0AAE1A}" presName="sibTrans" presStyleLbl="sibTrans2D1" presStyleIdx="3" presStyleCnt="5"/>
-      <dgm:spPr/>
-      <dgm:t>
-        <a:bodyPr/>
-        <a:lstStyle/>
-        <a:p>
-          <a:endParaRPr lang="en-US"/>
-        </a:p>
-      </dgm:t>
-    </dgm:pt>
-    <dgm:pt modelId="{1020FBBB-690C-4821-A794-B22748BC07F6}" type="pres">
-      <dgm:prSet presAssocID="{963AB9C7-534E-4244-8795-2DE50C0AAE1A}" presName="connectorText" presStyleLbl="sibTrans2D1" presStyleIdx="3" presStyleCnt="5"/>
-      <dgm:spPr/>
-      <dgm:t>
-        <a:bodyPr/>
-        <a:lstStyle/>
-        <a:p>
-          <a:endParaRPr lang="en-US"/>
-        </a:p>
-      </dgm:t>
-    </dgm:pt>
-    <dgm:pt modelId="{7154A4FA-E800-40EB-A87E-5CECCE812433}" type="pres">
-      <dgm:prSet presAssocID="{604DED0C-C7D1-44E9-9D91-4EA86CC58132}" presName="node" presStyleLbl="node1" presStyleIdx="4" presStyleCnt="5">
-        <dgm:presLayoutVars>
-          <dgm:bulletEnabled val="1"/>
-        </dgm:presLayoutVars>
-      </dgm:prSet>
-      <dgm:spPr/>
-      <dgm:t>
-        <a:bodyPr/>
-        <a:lstStyle/>
-        <a:p>
-          <a:endParaRPr lang="en-US"/>
-        </a:p>
-      </dgm:t>
-    </dgm:pt>
-    <dgm:pt modelId="{58C57B0B-F787-4E7B-A44C-92F01115E8E7}" type="pres">
-      <dgm:prSet presAssocID="{F9D67482-08A8-41D2-A4D4-28EF53768755}" presName="sibTrans" presStyleLbl="sibTrans2D1" presStyleIdx="4" presStyleCnt="5"/>
-      <dgm:spPr/>
-      <dgm:t>
-        <a:bodyPr/>
-        <a:lstStyle/>
-        <a:p>
-          <a:endParaRPr lang="en-US"/>
-        </a:p>
-      </dgm:t>
-    </dgm:pt>
-    <dgm:pt modelId="{0DE8E6C8-D66E-45A0-B23D-743ED7603BE1}" type="pres">
-      <dgm:prSet presAssocID="{F9D67482-08A8-41D2-A4D4-28EF53768755}" presName="connectorText" presStyleLbl="sibTrans2D1" presStyleIdx="4" presStyleCnt="5"/>
-      <dgm:spPr/>
-      <dgm:t>
-        <a:bodyPr/>
-        <a:lstStyle/>
-        <a:p>
-          <a:endParaRPr lang="en-US"/>
-        </a:p>
-      </dgm:t>
-    </dgm:pt>
-  </dgm:ptLst>
-  <dgm:cxnLst>
-    <dgm:cxn modelId="{267E9567-00E8-4CF5-AC3F-C4B78015D95D}" type="presOf" srcId="{3E71EEED-B8A8-41CA-92B7-5F1CDAF3BE2F}" destId="{2C793FD2-6A40-488B-8088-8D409044269C}" srcOrd="0" destOrd="0" presId="urn:microsoft.com/office/officeart/2005/8/layout/cycle2"/>
-    <dgm:cxn modelId="{E1FC6E72-F33D-4BB9-A274-4220C286B861}" srcId="{FD57CCFC-B83B-464C-88F8-BC6450268F97}" destId="{DC1518B7-EDD6-4CCF-9688-BF43B6ABDDB5}" srcOrd="0" destOrd="0" parTransId="{130A9095-4CCA-4C97-87A2-565F02EAAB50}" sibTransId="{3E71EEED-B8A8-41CA-92B7-5F1CDAF3BE2F}"/>
-    <dgm:cxn modelId="{FB579B80-661A-4626-B61F-E71F4E734262}" type="presOf" srcId="{142584DF-DF37-4E4D-8B12-3F1186ED8A79}" destId="{4CFB935C-7860-4776-A04C-834BDF85D630}" srcOrd="0" destOrd="0" presId="urn:microsoft.com/office/officeart/2005/8/layout/cycle2"/>
-    <dgm:cxn modelId="{F708609E-B605-4F54-9CB0-43BFD707546D}" type="presOf" srcId="{DC1518B7-EDD6-4CCF-9688-BF43B6ABDDB5}" destId="{9D1A61A1-B2AA-4F6A-AD68-CA1F7CD1DF22}" srcOrd="0" destOrd="0" presId="urn:microsoft.com/office/officeart/2005/8/layout/cycle2"/>
-    <dgm:cxn modelId="{1D8D5F4A-711A-4C36-9FDB-4E9DFB74713E}" type="presOf" srcId="{341A2B66-E7B4-4CCE-A800-2D09F00E988D}" destId="{DA3308EA-AC4F-4F40-B121-EF1B7A77DC44}" srcOrd="0" destOrd="0" presId="urn:microsoft.com/office/officeart/2005/8/layout/cycle2"/>
-    <dgm:cxn modelId="{457A18C9-81F1-4A35-ADA5-3C23816981B3}" type="presOf" srcId="{F9D67482-08A8-41D2-A4D4-28EF53768755}" destId="{58C57B0B-F787-4E7B-A44C-92F01115E8E7}" srcOrd="0" destOrd="0" presId="urn:microsoft.com/office/officeart/2005/8/layout/cycle2"/>
-    <dgm:cxn modelId="{8000DA2E-31CB-4AD9-AF9B-52BAB5602E59}" srcId="{FD57CCFC-B83B-464C-88F8-BC6450268F97}" destId="{142584DF-DF37-4E4D-8B12-3F1186ED8A79}" srcOrd="1" destOrd="0" parTransId="{ED9FF5C5-2955-4ABE-8CBD-A291C105BC10}" sibTransId="{F9A12A89-8926-472F-A7F2-6C018E0DE993}"/>
-    <dgm:cxn modelId="{856A50DA-D64A-4647-9709-42A133F935EB}" type="presOf" srcId="{963AB9C7-534E-4244-8795-2DE50C0AAE1A}" destId="{BAAC15F4-9D1D-4DF8-800E-A898ABC0F2AB}" srcOrd="0" destOrd="0" presId="urn:microsoft.com/office/officeart/2005/8/layout/cycle2"/>
-    <dgm:cxn modelId="{5BC36940-CB7A-4758-BE58-DC68FE675A98}" type="presOf" srcId="{F9D67482-08A8-41D2-A4D4-28EF53768755}" destId="{0DE8E6C8-D66E-45A0-B23D-743ED7603BE1}" srcOrd="1" destOrd="0" presId="urn:microsoft.com/office/officeart/2005/8/layout/cycle2"/>
-    <dgm:cxn modelId="{5BBB9AAA-3A31-48A0-9041-47E02695D120}" type="presOf" srcId="{341A2B66-E7B4-4CCE-A800-2D09F00E988D}" destId="{D328AB4C-7799-47B7-A8F1-3355D4AEDC1D}" srcOrd="1" destOrd="0" presId="urn:microsoft.com/office/officeart/2005/8/layout/cycle2"/>
-    <dgm:cxn modelId="{91D587B0-152F-4A17-97F4-8D81198DFDFF}" type="presOf" srcId="{F9A12A89-8926-472F-A7F2-6C018E0DE993}" destId="{CFCBAE3F-24A5-4178-8FA4-D975A8B7374E}" srcOrd="1" destOrd="0" presId="urn:microsoft.com/office/officeart/2005/8/layout/cycle2"/>
-    <dgm:cxn modelId="{71816249-CFA6-4CD1-B78B-39BBBE938AC5}" type="presOf" srcId="{FD57CCFC-B83B-464C-88F8-BC6450268F97}" destId="{67A0B1C8-6388-410F-ABFD-B0A6F2F228F7}" srcOrd="0" destOrd="0" presId="urn:microsoft.com/office/officeart/2005/8/layout/cycle2"/>
-    <dgm:cxn modelId="{8398DB34-75A0-4DB4-AB43-23767ADDD401}" type="presOf" srcId="{94959A71-8399-4743-A822-4B2822F36EB9}" destId="{EA63BA78-DFE1-4E32-B4E3-D3637C87D01A}" srcOrd="0" destOrd="0" presId="urn:microsoft.com/office/officeart/2005/8/layout/cycle2"/>
-    <dgm:cxn modelId="{425C4B2F-664D-4B86-B9DD-52F7B516C9B3}" type="presOf" srcId="{3E71EEED-B8A8-41CA-92B7-5F1CDAF3BE2F}" destId="{586AA159-1625-454D-A036-99A7A81CC350}" srcOrd="1" destOrd="0" presId="urn:microsoft.com/office/officeart/2005/8/layout/cycle2"/>
-    <dgm:cxn modelId="{26FA7A0A-3EAB-4761-BA2E-5E038B9C08EC}" srcId="{FD57CCFC-B83B-464C-88F8-BC6450268F97}" destId="{1303FBFC-9B1F-43AD-A9CC-01EC7DFCCA63}" srcOrd="3" destOrd="0" parTransId="{DF56F91D-EBF4-453D-B293-713DA3B7BAE8}" sibTransId="{963AB9C7-534E-4244-8795-2DE50C0AAE1A}"/>
-    <dgm:cxn modelId="{0A57CA8B-CCE8-45FB-ABAA-4658A3B96B41}" srcId="{FD57CCFC-B83B-464C-88F8-BC6450268F97}" destId="{94959A71-8399-4743-A822-4B2822F36EB9}" srcOrd="2" destOrd="0" parTransId="{7B73C905-77F1-455E-8A1E-1C07DA733669}" sibTransId="{341A2B66-E7B4-4CCE-A800-2D09F00E988D}"/>
-    <dgm:cxn modelId="{83F18F01-1EBB-4F68-A566-C281ACD257AA}" type="presOf" srcId="{F9A12A89-8926-472F-A7F2-6C018E0DE993}" destId="{194CE3CF-2BF2-4AF5-9CEB-61305F2C5E2D}" srcOrd="0" destOrd="0" presId="urn:microsoft.com/office/officeart/2005/8/layout/cycle2"/>
-    <dgm:cxn modelId="{A6CED050-C5D2-4A6A-B3EA-9375EB900D7C}" type="presOf" srcId="{1303FBFC-9B1F-43AD-A9CC-01EC7DFCCA63}" destId="{7865197D-6E8D-4FFF-BEF4-77D19CDA6748}" srcOrd="0" destOrd="0" presId="urn:microsoft.com/office/officeart/2005/8/layout/cycle2"/>
-    <dgm:cxn modelId="{7A19FA8A-9349-4A90-96EE-3F1BEED66291}" type="presOf" srcId="{963AB9C7-534E-4244-8795-2DE50C0AAE1A}" destId="{1020FBBB-690C-4821-A794-B22748BC07F6}" srcOrd="1" destOrd="0" presId="urn:microsoft.com/office/officeart/2005/8/layout/cycle2"/>
-    <dgm:cxn modelId="{782EF038-CBD4-42BC-9F87-E70F0C5BA753}" type="presOf" srcId="{604DED0C-C7D1-44E9-9D91-4EA86CC58132}" destId="{7154A4FA-E800-40EB-A87E-5CECCE812433}" srcOrd="0" destOrd="0" presId="urn:microsoft.com/office/officeart/2005/8/layout/cycle2"/>
-    <dgm:cxn modelId="{8318BC13-B71D-4942-9198-291D21A68FEF}" srcId="{FD57CCFC-B83B-464C-88F8-BC6450268F97}" destId="{604DED0C-C7D1-44E9-9D91-4EA86CC58132}" srcOrd="4" destOrd="0" parTransId="{80FF181E-2F3F-4C95-B016-991B121BE693}" sibTransId="{F9D67482-08A8-41D2-A4D4-28EF53768755}"/>
-    <dgm:cxn modelId="{9E0C6E45-BB6E-4222-ABBC-A7113BC40F60}" type="presParOf" srcId="{67A0B1C8-6388-410F-ABFD-B0A6F2F228F7}" destId="{9D1A61A1-B2AA-4F6A-AD68-CA1F7CD1DF22}" srcOrd="0" destOrd="0" presId="urn:microsoft.com/office/officeart/2005/8/layout/cycle2"/>
-    <dgm:cxn modelId="{97FEE296-E53E-47B7-988E-0AECC9F987D1}" type="presParOf" srcId="{67A0B1C8-6388-410F-ABFD-B0A6F2F228F7}" destId="{2C793FD2-6A40-488B-8088-8D409044269C}" srcOrd="1" destOrd="0" presId="urn:microsoft.com/office/officeart/2005/8/layout/cycle2"/>
-    <dgm:cxn modelId="{97A2F2E4-513E-460D-A237-6B19E8F238BA}" type="presParOf" srcId="{2C793FD2-6A40-488B-8088-8D409044269C}" destId="{586AA159-1625-454D-A036-99A7A81CC350}" srcOrd="0" destOrd="0" presId="urn:microsoft.com/office/officeart/2005/8/layout/cycle2"/>
-    <dgm:cxn modelId="{F7CA3780-5DF1-48F3-843E-F4F879F5C759}" type="presParOf" srcId="{67A0B1C8-6388-410F-ABFD-B0A6F2F228F7}" destId="{4CFB935C-7860-4776-A04C-834BDF85D630}" srcOrd="2" destOrd="0" presId="urn:microsoft.com/office/officeart/2005/8/layout/cycle2"/>
-    <dgm:cxn modelId="{FF9406BD-16AA-4919-BBC8-75972D5BA36F}" type="presParOf" srcId="{67A0B1C8-6388-410F-ABFD-B0A6F2F228F7}" destId="{194CE3CF-2BF2-4AF5-9CEB-61305F2C5E2D}" srcOrd="3" destOrd="0" presId="urn:microsoft.com/office/officeart/2005/8/layout/cycle2"/>
-    <dgm:cxn modelId="{2D35B151-448D-4328-83E5-D87A03AD46EA}" type="presParOf" srcId="{194CE3CF-2BF2-4AF5-9CEB-61305F2C5E2D}" destId="{CFCBAE3F-24A5-4178-8FA4-D975A8B7374E}" srcOrd="0" destOrd="0" presId="urn:microsoft.com/office/officeart/2005/8/layout/cycle2"/>
-    <dgm:cxn modelId="{B0BB0BE7-EDC0-48B8-A484-FDF192073E95}" type="presParOf" srcId="{67A0B1C8-6388-410F-ABFD-B0A6F2F228F7}" destId="{EA63BA78-DFE1-4E32-B4E3-D3637C87D01A}" srcOrd="4" destOrd="0" presId="urn:microsoft.com/office/officeart/2005/8/layout/cycle2"/>
-    <dgm:cxn modelId="{910A3337-BB42-41C5-A9F2-2806E20F02AB}" type="presParOf" srcId="{67A0B1C8-6388-410F-ABFD-B0A6F2F228F7}" destId="{DA3308EA-AC4F-4F40-B121-EF1B7A77DC44}" srcOrd="5" destOrd="0" presId="urn:microsoft.com/office/officeart/2005/8/layout/cycle2"/>
-    <dgm:cxn modelId="{8E7120A3-F797-48EA-8F3D-D9C6EDB76E75}" type="presParOf" srcId="{DA3308EA-AC4F-4F40-B121-EF1B7A77DC44}" destId="{D328AB4C-7799-47B7-A8F1-3355D4AEDC1D}" srcOrd="0" destOrd="0" presId="urn:microsoft.com/office/officeart/2005/8/layout/cycle2"/>
-    <dgm:cxn modelId="{08A4744D-F2DC-4604-BCB7-7DC7A2058B13}" type="presParOf" srcId="{67A0B1C8-6388-410F-ABFD-B0A6F2F228F7}" destId="{7865197D-6E8D-4FFF-BEF4-77D19CDA6748}" srcOrd="6" destOrd="0" presId="urn:microsoft.com/office/officeart/2005/8/layout/cycle2"/>
-    <dgm:cxn modelId="{9FB1DF67-DC35-490C-8AB2-A33C061A7BEE}" type="presParOf" srcId="{67A0B1C8-6388-410F-ABFD-B0A6F2F228F7}" destId="{BAAC15F4-9D1D-4DF8-800E-A898ABC0F2AB}" srcOrd="7" destOrd="0" presId="urn:microsoft.com/office/officeart/2005/8/layout/cycle2"/>
-    <dgm:cxn modelId="{C7861779-FB35-490E-83EC-C254260DE849}" type="presParOf" srcId="{BAAC15F4-9D1D-4DF8-800E-A898ABC0F2AB}" destId="{1020FBBB-690C-4821-A794-B22748BC07F6}" srcOrd="0" destOrd="0" presId="urn:microsoft.com/office/officeart/2005/8/layout/cycle2"/>
-    <dgm:cxn modelId="{C94EAF0F-566A-4441-ACD5-C4E53E5876EC}" type="presParOf" srcId="{67A0B1C8-6388-410F-ABFD-B0A6F2F228F7}" destId="{7154A4FA-E800-40EB-A87E-5CECCE812433}" srcOrd="8" destOrd="0" presId="urn:microsoft.com/office/officeart/2005/8/layout/cycle2"/>
-    <dgm:cxn modelId="{843CC2F5-A1A3-494E-B97A-D0FF86E48E2E}" type="presParOf" srcId="{67A0B1C8-6388-410F-ABFD-B0A6F2F228F7}" destId="{58C57B0B-F787-4E7B-A44C-92F01115E8E7}" srcOrd="9" destOrd="0" presId="urn:microsoft.com/office/officeart/2005/8/layout/cycle2"/>
-    <dgm:cxn modelId="{D97C588D-5945-4088-94C6-F4CE99953C80}" type="presParOf" srcId="{58C57B0B-F787-4E7B-A44C-92F01115E8E7}" destId="{0DE8E6C8-D66E-45A0-B23D-743ED7603BE1}" srcOrd="0" destOrd="0" presId="urn:microsoft.com/office/officeart/2005/8/layout/cycle2"/>
-  </dgm:cxnLst>
-  <dgm:bg/>
-  <dgm:whole/>
-  <dgm:extLst>
-    <a:ext uri="http://schemas.microsoft.com/office/drawing/2008/diagram">
-      <dsp:dataModelExt xmlns:dsp="http://schemas.microsoft.com/office/drawing/2008/diagram" xmlns="" relId="rId7" minVer="http://schemas.openxmlformats.org/drawingml/2006/diagram"/>
-    </a:ext>
-  </dgm:extLst>
-</dgm:dataModel>
-</file>
-
-<file path=ppt/diagrams/drawing1.xml><?xml version="1.0" encoding="utf-8"?>
-<dsp:drawing xmlns:dgm="http://schemas.openxmlformats.org/drawingml/2006/diagram" xmlns:a="http://schemas.openxmlformats.org/drawingml/2006/main" xmlns:dsp="http://schemas.microsoft.com/office/drawing/2008/diagram">
-  <dsp:spTree>
-    <dsp:nvGrpSpPr>
-      <dsp:cNvPr id="0" name=""/>
-      <dsp:cNvGrpSpPr/>
-    </dsp:nvGrpSpPr>
-    <dsp:grpSpPr/>
-    <dsp:sp modelId="{9D1A61A1-B2AA-4F6A-AD68-CA1F7CD1DF22}">
-      <dsp:nvSpPr>
-        <dsp:cNvPr id="0" name=""/>
-        <dsp:cNvSpPr/>
-      </dsp:nvSpPr>
-      <dsp:spPr>
-        <a:xfrm>
-          <a:off x="1520465" y="879"/>
-          <a:ext cx="1150069" cy="1150069"/>
-        </a:xfrm>
-        <a:prstGeom prst="ellipse">
-          <a:avLst/>
-        </a:prstGeom>
-        <a:solidFill>
-          <a:schemeClr val="accent1">
-            <a:hueOff val="0"/>
-            <a:satOff val="0"/>
-            <a:lumOff val="0"/>
-            <a:alphaOff val="0"/>
-          </a:schemeClr>
-        </a:solidFill>
-        <a:ln w="25400" cap="flat" cmpd="sng" algn="ctr">
-          <a:solidFill>
-            <a:schemeClr val="lt1">
-              <a:hueOff val="0"/>
-              <a:satOff val="0"/>
-              <a:lumOff val="0"/>
-              <a:alphaOff val="0"/>
-            </a:schemeClr>
-          </a:solidFill>
-          <a:prstDash val="solid"/>
-        </a:ln>
-        <a:effectLst/>
-      </dsp:spPr>
-      <dsp:style>
-        <a:lnRef idx="2">
-          <a:scrgbClr r="0" g="0" b="0"/>
-        </a:lnRef>
-        <a:fillRef idx="1">
-          <a:scrgbClr r="0" g="0" b="0"/>
-        </a:fillRef>
-        <a:effectRef idx="0">
-          <a:scrgbClr r="0" g="0" b="0"/>
-        </a:effectRef>
-        <a:fontRef idx="minor">
-          <a:schemeClr val="lt1"/>
-        </a:fontRef>
-      </dsp:style>
-      <dsp:txBody>
-        <a:bodyPr spcFirstLastPara="0" vert="horz" wrap="square" lIns="36830" tIns="36830" rIns="36830" bIns="36830" numCol="1" spcCol="1270" anchor="ctr" anchorCtr="0">
-          <a:noAutofit/>
-        </a:bodyPr>
-        <a:lstStyle/>
-        <a:p>
-          <a:pPr lvl="0" algn="ctr" defTabSz="1289050">
-            <a:lnSpc>
-              <a:spcPct val="90000"/>
-            </a:lnSpc>
-            <a:spcBef>
-              <a:spcPct val="0"/>
-            </a:spcBef>
-            <a:spcAft>
-              <a:spcPct val="35000"/>
-            </a:spcAft>
-          </a:pPr>
-          <a:r>
-            <a:rPr lang="en-US" sz="2900" kern="1200" dirty="0" smtClean="0"/>
-            <a:t>TSK0</a:t>
-          </a:r>
-          <a:endParaRPr lang="en-US" sz="2900" kern="1200" dirty="0"/>
-        </a:p>
-      </dsp:txBody>
-      <dsp:txXfrm>
-        <a:off x="1520465" y="879"/>
-        <a:ext cx="1150069" cy="1150069"/>
-      </dsp:txXfrm>
-    </dsp:sp>
-    <dsp:sp modelId="{2C793FD2-6A40-488B-8088-8D409044269C}">
-      <dsp:nvSpPr>
-        <dsp:cNvPr id="0" name=""/>
-        <dsp:cNvSpPr/>
-      </dsp:nvSpPr>
-      <dsp:spPr>
-        <a:xfrm rot="2160000">
-          <a:off x="2634247" y="884415"/>
-          <a:ext cx="305977" cy="388148"/>
-        </a:xfrm>
-        <a:prstGeom prst="rightArrow">
-          <a:avLst>
-            <a:gd name="adj1" fmla="val 60000"/>
-            <a:gd name="adj2" fmla="val 50000"/>
-          </a:avLst>
-        </a:prstGeom>
-        <a:solidFill>
-          <a:schemeClr val="accent1">
-            <a:tint val="60000"/>
-            <a:hueOff val="0"/>
-            <a:satOff val="0"/>
-            <a:lumOff val="0"/>
-            <a:alphaOff val="0"/>
-          </a:schemeClr>
-        </a:solidFill>
-        <a:ln>
-          <a:noFill/>
-        </a:ln>
-        <a:effectLst/>
-      </dsp:spPr>
-      <dsp:style>
-        <a:lnRef idx="0">
-          <a:scrgbClr r="0" g="0" b="0"/>
-        </a:lnRef>
-        <a:fillRef idx="1">
-          <a:scrgbClr r="0" g="0" b="0"/>
-        </a:fillRef>
-        <a:effectRef idx="0">
-          <a:scrgbClr r="0" g="0" b="0"/>
-        </a:effectRef>
-        <a:fontRef idx="minor">
-          <a:schemeClr val="lt1"/>
-        </a:fontRef>
-      </dsp:style>
-      <dsp:txBody>
-        <a:bodyPr spcFirstLastPara="0" vert="horz" wrap="square" lIns="0" tIns="0" rIns="0" bIns="0" numCol="1" spcCol="1270" anchor="ctr" anchorCtr="0">
-          <a:noAutofit/>
-        </a:bodyPr>
-        <a:lstStyle/>
-        <a:p>
-          <a:pPr lvl="0" algn="ctr" defTabSz="711200">
-            <a:lnSpc>
-              <a:spcPct val="90000"/>
-            </a:lnSpc>
-            <a:spcBef>
-              <a:spcPct val="0"/>
-            </a:spcBef>
-            <a:spcAft>
-              <a:spcPct val="35000"/>
-            </a:spcAft>
-          </a:pPr>
-          <a:endParaRPr lang="en-US" sz="1600" kern="1200"/>
-        </a:p>
-      </dsp:txBody>
-      <dsp:txXfrm rot="2160000">
-        <a:off x="2634247" y="884415"/>
-        <a:ext cx="305977" cy="388148"/>
-      </dsp:txXfrm>
-    </dsp:sp>
-    <dsp:sp modelId="{4CFB935C-7860-4776-A04C-834BDF85D630}">
-      <dsp:nvSpPr>
-        <dsp:cNvPr id="0" name=""/>
-        <dsp:cNvSpPr/>
-      </dsp:nvSpPr>
-      <dsp:spPr>
-        <a:xfrm>
-          <a:off x="2917948" y="1016210"/>
-          <a:ext cx="1150069" cy="1150069"/>
-        </a:xfrm>
-        <a:prstGeom prst="ellipse">
-          <a:avLst/>
-        </a:prstGeom>
-        <a:gradFill rotWithShape="1">
-          <a:gsLst>
-            <a:gs pos="0">
-              <a:schemeClr val="accent2">
-                <a:tint val="50000"/>
-                <a:satMod val="300000"/>
-              </a:schemeClr>
-            </a:gs>
-            <a:gs pos="35000">
-              <a:schemeClr val="accent2">
-                <a:tint val="37000"/>
-                <a:satMod val="300000"/>
-              </a:schemeClr>
-            </a:gs>
-            <a:gs pos="100000">
-              <a:schemeClr val="accent2">
-                <a:tint val="15000"/>
-                <a:satMod val="350000"/>
-              </a:schemeClr>
-            </a:gs>
-          </a:gsLst>
-          <a:lin ang="16200000" scaled="1"/>
-        </a:gradFill>
-        <a:ln w="9525" cap="flat" cmpd="sng" algn="ctr">
-          <a:solidFill>
-            <a:schemeClr val="accent2">
-              <a:shade val="95000"/>
-              <a:satMod val="105000"/>
-            </a:schemeClr>
-          </a:solidFill>
-          <a:prstDash val="solid"/>
-        </a:ln>
-        <a:effectLst>
-          <a:outerShdw blurRad="40000" dist="20000" dir="5400000" rotWithShape="0">
-            <a:srgbClr val="000000">
-              <a:alpha val="38000"/>
-            </a:srgbClr>
-          </a:outerShdw>
-        </a:effectLst>
-      </dsp:spPr>
-      <dsp:style>
-        <a:lnRef idx="1">
-          <a:schemeClr val="accent2"/>
-        </a:lnRef>
-        <a:fillRef idx="2">
-          <a:schemeClr val="accent2"/>
-        </a:fillRef>
-        <a:effectRef idx="1">
-          <a:schemeClr val="accent2"/>
-        </a:effectRef>
-        <a:fontRef idx="minor">
-          <a:schemeClr val="dk1"/>
-        </a:fontRef>
-      </dsp:style>
-      <dsp:txBody>
-        <a:bodyPr spcFirstLastPara="0" vert="horz" wrap="square" lIns="36830" tIns="36830" rIns="36830" bIns="36830" numCol="1" spcCol="1270" anchor="ctr" anchorCtr="0">
-          <a:noAutofit/>
-        </a:bodyPr>
-        <a:lstStyle/>
-        <a:p>
-          <a:pPr lvl="0" algn="ctr" defTabSz="1289050">
-            <a:lnSpc>
-              <a:spcPct val="90000"/>
-            </a:lnSpc>
-            <a:spcBef>
-              <a:spcPct val="0"/>
-            </a:spcBef>
-            <a:spcAft>
-              <a:spcPct val="35000"/>
-            </a:spcAft>
-          </a:pPr>
-          <a:r>
-            <a:rPr lang="en-US" sz="2900" kern="1200" dirty="0" smtClean="0"/>
-            <a:t>TSK1</a:t>
-          </a:r>
-          <a:endParaRPr lang="en-US" sz="2900" kern="1200" dirty="0"/>
-        </a:p>
-      </dsp:txBody>
-      <dsp:txXfrm>
-        <a:off x="2917948" y="1016210"/>
-        <a:ext cx="1150069" cy="1150069"/>
-      </dsp:txXfrm>
-    </dsp:sp>
-    <dsp:sp modelId="{194CE3CF-2BF2-4AF5-9CEB-61305F2C5E2D}">
-      <dsp:nvSpPr>
-        <dsp:cNvPr id="0" name=""/>
-        <dsp:cNvSpPr/>
-      </dsp:nvSpPr>
-      <dsp:spPr>
-        <a:xfrm rot="6480000">
-          <a:off x="3075775" y="2210355"/>
-          <a:ext cx="305977" cy="388148"/>
-        </a:xfrm>
-        <a:prstGeom prst="rightArrow">
-          <a:avLst>
-            <a:gd name="adj1" fmla="val 60000"/>
-            <a:gd name="adj2" fmla="val 50000"/>
-          </a:avLst>
-        </a:prstGeom>
-        <a:solidFill>
-          <a:schemeClr val="accent1">
-            <a:tint val="60000"/>
-            <a:hueOff val="0"/>
-            <a:satOff val="0"/>
-            <a:lumOff val="0"/>
-            <a:alphaOff val="0"/>
-          </a:schemeClr>
-        </a:solidFill>
-        <a:ln>
-          <a:noFill/>
-        </a:ln>
-        <a:effectLst/>
-      </dsp:spPr>
-      <dsp:style>
-        <a:lnRef idx="0">
-          <a:scrgbClr r="0" g="0" b="0"/>
-        </a:lnRef>
-        <a:fillRef idx="1">
-          <a:scrgbClr r="0" g="0" b="0"/>
-        </a:fillRef>
-        <a:effectRef idx="0">
-          <a:scrgbClr r="0" g="0" b="0"/>
-        </a:effectRef>
-        <a:fontRef idx="minor">
-          <a:schemeClr val="lt1"/>
-        </a:fontRef>
-      </dsp:style>
-      <dsp:txBody>
-        <a:bodyPr spcFirstLastPara="0" vert="horz" wrap="square" lIns="0" tIns="0" rIns="0" bIns="0" numCol="1" spcCol="1270" anchor="ctr" anchorCtr="0">
-          <a:noAutofit/>
-        </a:bodyPr>
-        <a:lstStyle/>
-        <a:p>
-          <a:pPr lvl="0" algn="ctr" defTabSz="711200">
-            <a:lnSpc>
-              <a:spcPct val="90000"/>
-            </a:lnSpc>
-            <a:spcBef>
-              <a:spcPct val="0"/>
-            </a:spcBef>
-            <a:spcAft>
-              <a:spcPct val="35000"/>
-            </a:spcAft>
-          </a:pPr>
-          <a:endParaRPr lang="en-US" sz="1600" kern="1200"/>
-        </a:p>
-      </dsp:txBody>
-      <dsp:txXfrm rot="6480000">
-        <a:off x="3075775" y="2210355"/>
-        <a:ext cx="305977" cy="388148"/>
-      </dsp:txXfrm>
-    </dsp:sp>
-    <dsp:sp modelId="{EA63BA78-DFE1-4E32-B4E3-D3637C87D01A}">
-      <dsp:nvSpPr>
-        <dsp:cNvPr id="0" name=""/>
-        <dsp:cNvSpPr/>
-      </dsp:nvSpPr>
-      <dsp:spPr>
-        <a:xfrm>
-          <a:off x="2384157" y="2659051"/>
-          <a:ext cx="1150069" cy="1150069"/>
-        </a:xfrm>
-        <a:prstGeom prst="ellipse">
-          <a:avLst/>
-        </a:prstGeom>
-        <a:solidFill>
-          <a:schemeClr val="accent1">
-            <a:hueOff val="0"/>
-            <a:satOff val="0"/>
-            <a:lumOff val="0"/>
-            <a:alphaOff val="0"/>
-          </a:schemeClr>
-        </a:solidFill>
-        <a:ln w="25400" cap="flat" cmpd="sng" algn="ctr">
-          <a:solidFill>
-            <a:schemeClr val="lt1">
-              <a:hueOff val="0"/>
-              <a:satOff val="0"/>
-              <a:lumOff val="0"/>
-              <a:alphaOff val="0"/>
-            </a:schemeClr>
-          </a:solidFill>
-          <a:prstDash val="solid"/>
-        </a:ln>
-        <a:effectLst/>
-      </dsp:spPr>
-      <dsp:style>
-        <a:lnRef idx="2">
-          <a:scrgbClr r="0" g="0" b="0"/>
-        </a:lnRef>
-        <a:fillRef idx="1">
-          <a:scrgbClr r="0" g="0" b="0"/>
-        </a:fillRef>
-        <a:effectRef idx="0">
-          <a:scrgbClr r="0" g="0" b="0"/>
-        </a:effectRef>
-        <a:fontRef idx="minor">
-          <a:schemeClr val="lt1"/>
-        </a:fontRef>
-      </dsp:style>
-      <dsp:txBody>
-        <a:bodyPr spcFirstLastPara="0" vert="horz" wrap="square" lIns="36830" tIns="36830" rIns="36830" bIns="36830" numCol="1" spcCol="1270" anchor="ctr" anchorCtr="0">
-          <a:noAutofit/>
-        </a:bodyPr>
-        <a:lstStyle/>
-        <a:p>
-          <a:pPr lvl="0" algn="ctr" defTabSz="1289050">
-            <a:lnSpc>
-              <a:spcPct val="90000"/>
-            </a:lnSpc>
-            <a:spcBef>
-              <a:spcPct val="0"/>
-            </a:spcBef>
-            <a:spcAft>
-              <a:spcPct val="35000"/>
-            </a:spcAft>
-          </a:pPr>
-          <a:r>
-            <a:rPr lang="en-US" sz="2900" kern="1200" dirty="0" smtClean="0"/>
-            <a:t>TSK2</a:t>
-          </a:r>
-          <a:endParaRPr lang="en-US" sz="2900" kern="1200" dirty="0"/>
-        </a:p>
-      </dsp:txBody>
-      <dsp:txXfrm>
-        <a:off x="2384157" y="2659051"/>
-        <a:ext cx="1150069" cy="1150069"/>
-      </dsp:txXfrm>
-    </dsp:sp>
-    <dsp:sp modelId="{DA3308EA-AC4F-4F40-B121-EF1B7A77DC44}">
-      <dsp:nvSpPr>
-        <dsp:cNvPr id="0" name=""/>
-        <dsp:cNvSpPr/>
-      </dsp:nvSpPr>
-      <dsp:spPr>
-        <a:xfrm rot="10800000">
-          <a:off x="1951171" y="3040011"/>
-          <a:ext cx="305977" cy="388148"/>
-        </a:xfrm>
-        <a:prstGeom prst="rightArrow">
-          <a:avLst>
-            <a:gd name="adj1" fmla="val 60000"/>
-            <a:gd name="adj2" fmla="val 50000"/>
-          </a:avLst>
-        </a:prstGeom>
-        <a:solidFill>
-          <a:schemeClr val="accent1">
-            <a:tint val="60000"/>
-            <a:hueOff val="0"/>
-            <a:satOff val="0"/>
-            <a:lumOff val="0"/>
-            <a:alphaOff val="0"/>
-          </a:schemeClr>
-        </a:solidFill>
-        <a:ln>
-          <a:noFill/>
-        </a:ln>
-        <a:effectLst/>
-      </dsp:spPr>
-      <dsp:style>
-        <a:lnRef idx="0">
-          <a:scrgbClr r="0" g="0" b="0"/>
-        </a:lnRef>
-        <a:fillRef idx="1">
-          <a:scrgbClr r="0" g="0" b="0"/>
-        </a:fillRef>
-        <a:effectRef idx="0">
-          <a:scrgbClr r="0" g="0" b="0"/>
-        </a:effectRef>
-        <a:fontRef idx="minor">
-          <a:schemeClr val="lt1"/>
-        </a:fontRef>
-      </dsp:style>
-      <dsp:txBody>
-        <a:bodyPr spcFirstLastPara="0" vert="horz" wrap="square" lIns="0" tIns="0" rIns="0" bIns="0" numCol="1" spcCol="1270" anchor="ctr" anchorCtr="0">
-          <a:noAutofit/>
-        </a:bodyPr>
-        <a:lstStyle/>
-        <a:p>
-          <a:pPr lvl="0" algn="ctr" defTabSz="711200">
-            <a:lnSpc>
-              <a:spcPct val="90000"/>
-            </a:lnSpc>
-            <a:spcBef>
-              <a:spcPct val="0"/>
-            </a:spcBef>
-            <a:spcAft>
-              <a:spcPct val="35000"/>
-            </a:spcAft>
-          </a:pPr>
-          <a:endParaRPr lang="en-US" sz="1600" kern="1200"/>
-        </a:p>
-      </dsp:txBody>
-      <dsp:txXfrm rot="10800000">
-        <a:off x="1951171" y="3040011"/>
-        <a:ext cx="305977" cy="388148"/>
-      </dsp:txXfrm>
-    </dsp:sp>
-    <dsp:sp modelId="{7865197D-6E8D-4FFF-BEF4-77D19CDA6748}">
-      <dsp:nvSpPr>
-        <dsp:cNvPr id="0" name=""/>
-        <dsp:cNvSpPr/>
-      </dsp:nvSpPr>
-      <dsp:spPr>
-        <a:xfrm>
-          <a:off x="656772" y="2659051"/>
-          <a:ext cx="1150069" cy="1150069"/>
-        </a:xfrm>
-        <a:prstGeom prst="ellipse">
-          <a:avLst/>
-        </a:prstGeom>
-        <a:gradFill rotWithShape="1">
-          <a:gsLst>
-            <a:gs pos="0">
-              <a:schemeClr val="accent2">
-                <a:tint val="50000"/>
-                <a:satMod val="300000"/>
-              </a:schemeClr>
-            </a:gs>
-            <a:gs pos="35000">
-              <a:schemeClr val="accent2">
-                <a:tint val="37000"/>
-                <a:satMod val="300000"/>
-              </a:schemeClr>
-            </a:gs>
-            <a:gs pos="100000">
-              <a:schemeClr val="accent2">
-                <a:tint val="15000"/>
-                <a:satMod val="350000"/>
-              </a:schemeClr>
-            </a:gs>
-          </a:gsLst>
-          <a:lin ang="16200000" scaled="1"/>
-        </a:gradFill>
-        <a:ln w="9525" cap="flat" cmpd="sng" algn="ctr">
-          <a:solidFill>
-            <a:schemeClr val="accent2">
-              <a:shade val="95000"/>
-              <a:satMod val="105000"/>
-            </a:schemeClr>
-          </a:solidFill>
-          <a:prstDash val="solid"/>
-        </a:ln>
-        <a:effectLst>
-          <a:outerShdw blurRad="40000" dist="20000" dir="5400000" rotWithShape="0">
-            <a:srgbClr val="000000">
-              <a:alpha val="38000"/>
-            </a:srgbClr>
-          </a:outerShdw>
-        </a:effectLst>
-      </dsp:spPr>
-      <dsp:style>
-        <a:lnRef idx="1">
-          <a:schemeClr val="accent2"/>
-        </a:lnRef>
-        <a:fillRef idx="2">
-          <a:schemeClr val="accent2"/>
-        </a:fillRef>
-        <a:effectRef idx="1">
-          <a:schemeClr val="accent2"/>
-        </a:effectRef>
-        <a:fontRef idx="minor">
-          <a:schemeClr val="dk1"/>
-        </a:fontRef>
-      </dsp:style>
-      <dsp:txBody>
-        <a:bodyPr spcFirstLastPara="0" vert="horz" wrap="square" lIns="36830" tIns="36830" rIns="36830" bIns="36830" numCol="1" spcCol="1270" anchor="ctr" anchorCtr="0">
-          <a:noAutofit/>
-        </a:bodyPr>
-        <a:lstStyle/>
-        <a:p>
-          <a:pPr lvl="0" algn="ctr" defTabSz="1289050">
-            <a:lnSpc>
-              <a:spcPct val="90000"/>
-            </a:lnSpc>
-            <a:spcBef>
-              <a:spcPct val="0"/>
-            </a:spcBef>
-            <a:spcAft>
-              <a:spcPct val="35000"/>
-            </a:spcAft>
-          </a:pPr>
-          <a:r>
-            <a:rPr lang="en-US" sz="2900" kern="1200" dirty="0" smtClean="0"/>
-            <a:t>TSK3</a:t>
-          </a:r>
-          <a:endParaRPr lang="en-US" sz="2900" kern="1200" dirty="0"/>
-        </a:p>
-      </dsp:txBody>
-      <dsp:txXfrm>
-        <a:off x="656772" y="2659051"/>
-        <a:ext cx="1150069" cy="1150069"/>
-      </dsp:txXfrm>
-    </dsp:sp>
-    <dsp:sp modelId="{BAAC15F4-9D1D-4DF8-800E-A898ABC0F2AB}">
-      <dsp:nvSpPr>
-        <dsp:cNvPr id="0" name=""/>
-        <dsp:cNvSpPr/>
-      </dsp:nvSpPr>
-      <dsp:spPr>
-        <a:xfrm rot="15120000">
-          <a:off x="814599" y="2226827"/>
-          <a:ext cx="305977" cy="388148"/>
-        </a:xfrm>
-        <a:prstGeom prst="rightArrow">
-          <a:avLst>
-            <a:gd name="adj1" fmla="val 60000"/>
-            <a:gd name="adj2" fmla="val 50000"/>
-          </a:avLst>
-        </a:prstGeom>
-        <a:solidFill>
-          <a:schemeClr val="accent1">
-            <a:tint val="60000"/>
-            <a:hueOff val="0"/>
-            <a:satOff val="0"/>
-            <a:lumOff val="0"/>
-            <a:alphaOff val="0"/>
-          </a:schemeClr>
-        </a:solidFill>
-        <a:ln>
-          <a:noFill/>
-        </a:ln>
-        <a:effectLst/>
-      </dsp:spPr>
-      <dsp:style>
-        <a:lnRef idx="0">
-          <a:scrgbClr r="0" g="0" b="0"/>
-        </a:lnRef>
-        <a:fillRef idx="1">
-          <a:scrgbClr r="0" g="0" b="0"/>
-        </a:fillRef>
-        <a:effectRef idx="0">
-          <a:scrgbClr r="0" g="0" b="0"/>
-        </a:effectRef>
-        <a:fontRef idx="minor">
-          <a:schemeClr val="lt1"/>
-        </a:fontRef>
-      </dsp:style>
-      <dsp:txBody>
-        <a:bodyPr spcFirstLastPara="0" vert="horz" wrap="square" lIns="0" tIns="0" rIns="0" bIns="0" numCol="1" spcCol="1270" anchor="ctr" anchorCtr="0">
-          <a:noAutofit/>
-        </a:bodyPr>
-        <a:lstStyle/>
-        <a:p>
-          <a:pPr lvl="0" algn="ctr" defTabSz="711200">
-            <a:lnSpc>
-              <a:spcPct val="90000"/>
-            </a:lnSpc>
-            <a:spcBef>
-              <a:spcPct val="0"/>
-            </a:spcBef>
-            <a:spcAft>
-              <a:spcPct val="35000"/>
-            </a:spcAft>
-          </a:pPr>
-          <a:endParaRPr lang="en-US" sz="1600" kern="1200"/>
-        </a:p>
-      </dsp:txBody>
-      <dsp:txXfrm rot="15120000">
-        <a:off x="814599" y="2226827"/>
-        <a:ext cx="305977" cy="388148"/>
-      </dsp:txXfrm>
-    </dsp:sp>
-    <dsp:sp modelId="{7154A4FA-E800-40EB-A87E-5CECCE812433}">
-      <dsp:nvSpPr>
-        <dsp:cNvPr id="0" name=""/>
-        <dsp:cNvSpPr/>
-      </dsp:nvSpPr>
-      <dsp:spPr>
-        <a:xfrm>
-          <a:off x="122981" y="1016210"/>
-          <a:ext cx="1150069" cy="1150069"/>
-        </a:xfrm>
-        <a:prstGeom prst="ellipse">
-          <a:avLst/>
-        </a:prstGeom>
-        <a:solidFill>
-          <a:schemeClr val="accent1">
-            <a:hueOff val="0"/>
-            <a:satOff val="0"/>
-            <a:lumOff val="0"/>
-            <a:alphaOff val="0"/>
-          </a:schemeClr>
-        </a:solidFill>
-        <a:ln w="25400" cap="flat" cmpd="sng" algn="ctr">
-          <a:solidFill>
-            <a:schemeClr val="lt1">
-              <a:hueOff val="0"/>
-              <a:satOff val="0"/>
-              <a:lumOff val="0"/>
-              <a:alphaOff val="0"/>
-            </a:schemeClr>
-          </a:solidFill>
-          <a:prstDash val="solid"/>
-        </a:ln>
-        <a:effectLst/>
-      </dsp:spPr>
-      <dsp:style>
-        <a:lnRef idx="2">
-          <a:scrgbClr r="0" g="0" b="0"/>
-        </a:lnRef>
-        <a:fillRef idx="1">
-          <a:scrgbClr r="0" g="0" b="0"/>
-        </a:fillRef>
-        <a:effectRef idx="0">
-          <a:scrgbClr r="0" g="0" b="0"/>
-        </a:effectRef>
-        <a:fontRef idx="minor">
-          <a:schemeClr val="lt1"/>
-        </a:fontRef>
-      </dsp:style>
-      <dsp:txBody>
-        <a:bodyPr spcFirstLastPara="0" vert="horz" wrap="square" lIns="36830" tIns="36830" rIns="36830" bIns="36830" numCol="1" spcCol="1270" anchor="ctr" anchorCtr="0">
-          <a:noAutofit/>
-        </a:bodyPr>
-        <a:lstStyle/>
-        <a:p>
-          <a:pPr lvl="0" algn="ctr" defTabSz="1289050">
-            <a:lnSpc>
-              <a:spcPct val="90000"/>
-            </a:lnSpc>
-            <a:spcBef>
-              <a:spcPct val="0"/>
-            </a:spcBef>
-            <a:spcAft>
-              <a:spcPct val="35000"/>
-            </a:spcAft>
-          </a:pPr>
-          <a:r>
-            <a:rPr lang="en-US" sz="2900" kern="1200" dirty="0" smtClean="0"/>
-            <a:t>TSK4</a:t>
-          </a:r>
-          <a:endParaRPr lang="en-US" sz="2900" kern="1200" dirty="0"/>
-        </a:p>
-      </dsp:txBody>
-      <dsp:txXfrm>
-        <a:off x="122981" y="1016210"/>
-        <a:ext cx="1150069" cy="1150069"/>
-      </dsp:txXfrm>
-    </dsp:sp>
-    <dsp:sp modelId="{58C57B0B-F787-4E7B-A44C-92F01115E8E7}">
-      <dsp:nvSpPr>
-        <dsp:cNvPr id="0" name=""/>
-        <dsp:cNvSpPr/>
-      </dsp:nvSpPr>
-      <dsp:spPr>
-        <a:xfrm rot="19440000">
-          <a:off x="1236763" y="894595"/>
-          <a:ext cx="305977" cy="388148"/>
-        </a:xfrm>
-        <a:prstGeom prst="rightArrow">
-          <a:avLst>
-            <a:gd name="adj1" fmla="val 60000"/>
-            <a:gd name="adj2" fmla="val 50000"/>
-          </a:avLst>
-        </a:prstGeom>
-        <a:solidFill>
-          <a:schemeClr val="accent1">
-            <a:tint val="60000"/>
-            <a:hueOff val="0"/>
-            <a:satOff val="0"/>
-            <a:lumOff val="0"/>
-            <a:alphaOff val="0"/>
-          </a:schemeClr>
-        </a:solidFill>
-        <a:ln>
-          <a:noFill/>
-        </a:ln>
-        <a:effectLst/>
-      </dsp:spPr>
-      <dsp:style>
-        <a:lnRef idx="0">
-          <a:scrgbClr r="0" g="0" b="0"/>
-        </a:lnRef>
-        <a:fillRef idx="1">
-          <a:scrgbClr r="0" g="0" b="0"/>
-        </a:fillRef>
-        <a:effectRef idx="0">
-          <a:scrgbClr r="0" g="0" b="0"/>
-        </a:effectRef>
-        <a:fontRef idx="minor">
-          <a:schemeClr val="lt1"/>
-        </a:fontRef>
-      </dsp:style>
-      <dsp:txBody>
-        <a:bodyPr spcFirstLastPara="0" vert="horz" wrap="square" lIns="0" tIns="0" rIns="0" bIns="0" numCol="1" spcCol="1270" anchor="ctr" anchorCtr="0">
-          <a:noAutofit/>
-        </a:bodyPr>
-        <a:lstStyle/>
-        <a:p>
-          <a:pPr lvl="0" algn="ctr" defTabSz="711200">
-            <a:lnSpc>
-              <a:spcPct val="90000"/>
-            </a:lnSpc>
-            <a:spcBef>
-              <a:spcPct val="0"/>
-            </a:spcBef>
-            <a:spcAft>
-              <a:spcPct val="35000"/>
-            </a:spcAft>
-          </a:pPr>
-          <a:endParaRPr lang="en-US" sz="1600" kern="1200"/>
-        </a:p>
-      </dsp:txBody>
-      <dsp:txXfrm rot="19440000">
-        <a:off x="1236763" y="894595"/>
-        <a:ext cx="305977" cy="388148"/>
-      </dsp:txXfrm>
-    </dsp:sp>
-  </dsp:spTree>
-</dsp:drawing>
-</file>
-
-<file path=ppt/diagrams/layout1.xml><?xml version="1.0" encoding="utf-8"?>
-<dgm:layoutDef xmlns:dgm="http://schemas.openxmlformats.org/drawingml/2006/diagram" xmlns:a="http://schemas.openxmlformats.org/drawingml/2006/main" uniqueId="urn:microsoft.com/office/officeart/2005/8/layout/cycle2">
-  <dgm:title val=""/>
-  <dgm:desc val=""/>
-  <dgm:catLst>
-    <dgm:cat type="cycle" pri="1000"/>
-    <dgm:cat type="convert" pri="10000"/>
-  </dgm:catLst>
-  <dgm:sampData>
-    <dgm:dataModel>
-      <dgm:ptLst>
-        <dgm:pt modelId="0" type="doc"/>
-        <dgm:pt modelId="1">
-          <dgm:prSet phldr="1"/>
-        </dgm:pt>
-        <dgm:pt modelId="2">
-          <dgm:prSet phldr="1"/>
-        </dgm:pt>
-        <dgm:pt modelId="3">
-          <dgm:prSet phldr="1"/>
-        </dgm:pt>
-        <dgm:pt modelId="4">
-          <dgm:prSet phldr="1"/>
-        </dgm:pt>
-        <dgm:pt modelId="5">
-          <dgm:prSet phldr="1"/>
-        </dgm:pt>
-      </dgm:ptLst>
-      <dgm:cxnLst>
-        <dgm:cxn modelId="6" srcId="0" destId="1" srcOrd="0" destOrd="0"/>
-        <dgm:cxn modelId="7" srcId="0" destId="2" srcOrd="1" destOrd="0"/>
-        <dgm:cxn modelId="8" srcId="0" destId="3" srcOrd="2" destOrd="0"/>
-        <dgm:cxn modelId="9" srcId="0" destId="4" srcOrd="3" destOrd="0"/>
-        <dgm:cxn modelId="10" srcId="0" destId="5" srcOrd="4" destOrd="0"/>
-      </dgm:cxnLst>
-      <dgm:bg/>
-      <dgm:whole/>
-    </dgm:dataModel>
-  </dgm:sampData>
-  <dgm:styleData>
-    <dgm:dataModel>
-      <dgm:ptLst>
-        <dgm:pt modelId="0" type="doc"/>
-        <dgm:pt modelId="1"/>
-        <dgm:pt modelId="2"/>
-        <dgm:pt modelId="3"/>
-      </dgm:ptLst>
-      <dgm:cxnLst>
-        <dgm:cxn modelId="4" srcId="0" destId="1" srcOrd="0" destOrd="0"/>
-        <dgm:cxn modelId="5" srcId="0" destId="2" srcOrd="1" destOrd="0"/>
-        <dgm:cxn modelId="6" srcId="0" destId="3" srcOrd="2" destOrd="0"/>
-      </dgm:cxnLst>
-      <dgm:bg/>
-      <dgm:whole/>
-    </dgm:dataModel>
-  </dgm:styleData>
-  <dgm:clrData>
-    <dgm:dataModel>
-      <dgm:ptLst>
-        <dgm:pt modelId="0" type="doc"/>
-        <dgm:pt modelId="1"/>
-        <dgm:pt modelId="2"/>
-        <dgm:pt modelId="3"/>
-        <dgm:pt modelId="4"/>
-        <dgm:pt modelId="5"/>
-        <dgm:pt modelId="6"/>
-      </dgm:ptLst>
-      <dgm:cxnLst>
-        <dgm:cxn modelId="7" srcId="0" destId="1" srcOrd="0" destOrd="0"/>
-        <dgm:cxn modelId="8" srcId="0" destId="2" srcOrd="1" destOrd="0"/>
-        <dgm:cxn modelId="9" srcId="0" destId="3" srcOrd="2" destOrd="0"/>
-        <dgm:cxn modelId="10" srcId="0" destId="4" srcOrd="3" destOrd="0"/>
-        <dgm:cxn modelId="11" srcId="0" destId="5" srcOrd="4" destOrd="0"/>
-        <dgm:cxn modelId="12" srcId="0" destId="6" srcOrd="5" destOrd="0"/>
-      </dgm:cxnLst>
-      <dgm:bg/>
-      <dgm:whole/>
-    </dgm:dataModel>
-  </dgm:clrData>
-  <dgm:layoutNode name="cycle">
-    <dgm:varLst>
-      <dgm:dir/>
-      <dgm:resizeHandles val="exact"/>
-    </dgm:varLst>
-    <dgm:choose name="Name0">
-      <dgm:if name="Name1" func="var" arg="dir" op="equ" val="norm">
-        <dgm:choose name="Name2">
-          <dgm:if name="Name3" axis="ch" ptType="node" func="cnt" op="gt" val="2">
-            <dgm:alg type="cycle">
-              <dgm:param type="stAng" val="0"/>
-              <dgm:param type="spanAng" val="360"/>
-            </dgm:alg>
-          </dgm:if>
-          <dgm:else name="Name4">
-            <dgm:alg type="cycle">
-              <dgm:param type="stAng" val="-90"/>
-              <dgm:param type="spanAng" val="360"/>
-            </dgm:alg>
-          </dgm:else>
-        </dgm:choose>
-      </dgm:if>
-      <dgm:else name="Name5">
-        <dgm:choose name="Name6">
-          <dgm:if name="Name7" axis="ch" ptType="node" func="cnt" op="gt" val="2">
-            <dgm:alg type="cycle">
-              <dgm:param type="stAng" val="0"/>
-              <dgm:param type="spanAng" val="-360"/>
-            </dgm:alg>
-          </dgm:if>
-          <dgm:else name="Name8">
-            <dgm:alg type="cycle">
-              <dgm:param type="stAng" val="90"/>
-              <dgm:param type="spanAng" val="-360"/>
-            </dgm:alg>
-          </dgm:else>
-        </dgm:choose>
-      </dgm:else>
-    </dgm:choose>
-    <dgm:shape xmlns:r="http://schemas.openxmlformats.org/officeDocument/2006/relationships" r:blip="">
-      <dgm:adjLst/>
-    </dgm:shape>
-    <dgm:presOf/>
-    <dgm:constrLst>
-      <dgm:constr type="w" for="ch" ptType="node" refType="w"/>
-      <dgm:constr type="w" for="ch" ptType="sibTrans" refType="w" refFor="ch" refPtType="node" op="equ" fact="0.25"/>
-      <dgm:constr type="sibSp" refType="w" refFor="ch" refPtType="node" fact="0.5"/>
-      <dgm:constr type="primFontSz" for="ch" ptType="node" op="equ" val="65"/>
-      <dgm:constr type="primFontSz" for="des" forName="connectorText" op="equ" val="55"/>
-      <dgm:constr type="primFontSz" for="des" forName="connectorText" refType="primFontSz" refFor="ch" refPtType="node" op="lte" fact="0.8"/>
-    </dgm:constrLst>
-    <dgm:ruleLst/>
-    <dgm:forEach name="nodesForEach" axis="ch" ptType="node">
-      <dgm:layoutNode name="node">
-        <dgm:varLst>
-          <dgm:bulletEnabled val="1"/>
-        </dgm:varLst>
-        <dgm:alg type="tx">
-          <dgm:param type="txAnchorVertCh" val="mid"/>
-        </dgm:alg>
-        <dgm:shape xmlns:r="http://schemas.openxmlformats.org/officeDocument/2006/relationships" type="ellipse" r:blip="">
-          <dgm:adjLst/>
-        </dgm:shape>
-        <dgm:presOf axis="desOrSelf" ptType="node"/>
-        <dgm:constrLst>
-          <dgm:constr type="h" refType="w"/>
-          <dgm:constr type="lMarg" refType="primFontSz" fact="0.1"/>
-          <dgm:constr type="rMarg" refType="primFontSz" fact="0.1"/>
-          <dgm:constr type="tMarg" refType="primFontSz" fact="0.1"/>
-          <dgm:constr type="bMarg" refType="primFontSz" fact="0.1"/>
-        </dgm:constrLst>
-        <dgm:ruleLst>
-          <dgm:rule type="primFontSz" val="5" fact="NaN" max="NaN"/>
-        </dgm:ruleLst>
-      </dgm:layoutNode>
-      <dgm:choose name="Name9">
-        <dgm:if name="Name10" axis="par ch" ptType="doc node" func="cnt" op="gt" val="1">
-          <dgm:forEach name="sibTransForEach" axis="followSib" ptType="sibTrans" hideLastTrans="0" cnt="1">
-            <dgm:layoutNode name="sibTrans">
-              <dgm:choose name="Name11">
-                <dgm:if name="Name12" axis="par ch" ptType="doc node" func="cnt" op="lt" val="3">
-                  <dgm:alg type="conn">
-                    <dgm:param type="begPts" val="radial"/>
-                    <dgm:param type="endPts" val="radial"/>
-                  </dgm:alg>
-                </dgm:if>
-                <dgm:else name="Name13">
-                  <dgm:alg type="conn">
-                    <dgm:param type="begPts" val="auto"/>
-                    <dgm:param type="endPts" val="auto"/>
-                  </dgm:alg>
-                </dgm:else>
-              </dgm:choose>
-              <dgm:shape xmlns:r="http://schemas.openxmlformats.org/officeDocument/2006/relationships" type="conn" r:blip="">
-                <dgm:adjLst/>
-              </dgm:shape>
-              <dgm:presOf axis="self"/>
-              <dgm:constrLst>
-                <dgm:constr type="h" refType="w" fact="1.35"/>
-                <dgm:constr type="connDist"/>
-                <dgm:constr type="w" for="ch" refType="connDist" fact="0.45"/>
-                <dgm:constr type="h" for="ch" refType="h"/>
-              </dgm:constrLst>
-              <dgm:ruleLst/>
-              <dgm:layoutNode name="connectorText">
-                <dgm:alg type="tx">
-                  <dgm:param type="autoTxRot" val="grav"/>
-                </dgm:alg>
-                <dgm:shape xmlns:r="http://schemas.openxmlformats.org/officeDocument/2006/relationships" type="conn" r:blip="" hideGeom="1">
-                  <dgm:adjLst/>
-                </dgm:shape>
-                <dgm:presOf axis="self"/>
-                <dgm:constrLst>
-                  <dgm:constr type="lMarg"/>
-                  <dgm:constr type="rMarg"/>
-                  <dgm:constr type="tMarg"/>
-                  <dgm:constr type="bMarg"/>
-                </dgm:constrLst>
-                <dgm:ruleLst>
-                  <dgm:rule type="primFontSz" val="5" fact="NaN" max="NaN"/>
-                </dgm:ruleLst>
-              </dgm:layoutNode>
-            </dgm:layoutNode>
-          </dgm:forEach>
-        </dgm:if>
-        <dgm:else name="Name14"/>
-      </dgm:choose>
-    </dgm:forEach>
-  </dgm:layoutNode>
-</dgm:layoutDef>
-</file>
-
-<file path=ppt/diagrams/quickStyle1.xml><?xml version="1.0" encoding="utf-8"?>
-<dgm:styleDef xmlns:dgm="http://schemas.openxmlformats.org/drawingml/2006/diagram" xmlns:a="http://schemas.openxmlformats.org/drawingml/2006/main" uniqueId="urn:microsoft.com/office/officeart/2005/8/quickstyle/simple1">
-  <dgm:title val=""/>
-  <dgm:desc val=""/>
-  <dgm:catLst>
-    <dgm:cat type="simple" pri="10100"/>
-  </dgm:catLst>
-  <dgm:scene3d>
-    <a:camera prst="orthographicFront"/>
-    <a:lightRig rig="threePt" dir="t"/>
-  </dgm:scene3d>
-  <dgm:styleLbl name="node0">
-    <dgm:scene3d>
-      <a:camera prst="orthographicFront"/>
-      <a:lightRig rig="threePt" dir="t"/>
-    </dgm:scene3d>
-    <dgm:sp3d/>
-    <dgm:txPr/>
-    <dgm:style>
-      <a:lnRef idx="2">
-        <a:scrgbClr r="0" g="0" b="0"/>
-      </a:lnRef>
-      <a:fillRef idx="1">
-        <a:scrgbClr r="0" g="0" b="0"/>
-      </a:fillRef>
-      <a:effectRef idx="0">
-        <a:scrgbClr r="0" g="0" b="0"/>
-      </a:effectRef>
-      <a:fontRef idx="minor">
-        <a:schemeClr val="lt1"/>
-      </a:fontRef>
-    </dgm:style>
-  </dgm:styleLbl>
-  <dgm:styleLbl name="lnNode1">
-    <dgm:scene3d>
-      <a:camera prst="orthographicFront"/>
-      <a:lightRig rig="threePt" dir="t"/>
-    </dgm:scene3d>
-    <dgm:sp3d/>
-    <dgm:txPr/>
-    <dgm:style>
-      <a:lnRef idx="2">
-        <a:scrgbClr r="0" g="0" b="0"/>
-      </a:lnRef>
-      <a:fillRef idx="1">
-        <a:scrgbClr r="0" g="0" b="0"/>
-      </a:fillRef>
-      <a:effectRef idx="0">
-        <a:scrgbClr r="0" g="0" b="0"/>
-      </a:effectRef>
-      <a:fontRef idx="minor">
-        <a:schemeClr val="lt1"/>
-      </a:fontRef>
-    </dgm:style>
-  </dgm:styleLbl>
-  <dgm:styleLbl name="vennNode1">
-    <dgm:scene3d>
-      <a:camera prst="orthographicFront"/>
-      <a:lightRig rig="threePt" dir="t"/>
-    </dgm:scene3d>
-    <dgm:sp3d/>
-    <dgm:txPr/>
-    <dgm:style>
-      <a:lnRef idx="2">
-        <a:scrgbClr r="0" g="0" b="0"/>
-      </a:lnRef>
-      <a:fillRef idx="1">
-        <a:scrgbClr r="0" g="0" b="0"/>
-      </a:fillRef>
-      <a:effectRef idx="0">
-        <a:scrgbClr r="0" g="0" b="0"/>
-      </a:effectRef>
-      <a:fontRef idx="minor">
-        <a:schemeClr val="tx1"/>
-      </a:fontRef>
-    </dgm:style>
-  </dgm:styleLbl>
-  <dgm:styleLbl name="alignNode1">
-    <dgm:scene3d>
-      <a:camera prst="orthographicFront"/>
-      <a:lightRig rig="threePt" dir="t"/>
-    </dgm:scene3d>
-    <dgm:sp3d/>
-    <dgm:txPr/>
-    <dgm:style>
-      <a:lnRef idx="2">
-        <a:scrgbClr r="0" g="0" b="0"/>
-      </a:lnRef>
-      <a:fillRef idx="1">
-        <a:scrgbClr r="0" g="0" b="0"/>
-      </a:fillRef>
-      <a:effectRef idx="0">
-        <a:scrgbClr r="0" g="0" b="0"/>
-      </a:effectRef>
-      <a:fontRef idx="minor">
-        <a:schemeClr val="lt1"/>
-      </a:fontRef>
-    </dgm:style>
-  </dgm:styleLbl>
-  <dgm:styleLbl name="node1">
-    <dgm:scene3d>
-      <a:camera prst="orthographicFront"/>
-      <a:lightRig rig="threePt" dir="t"/>
-    </dgm:scene3d>
-    <dgm:sp3d/>
-    <dgm:txPr/>
-    <dgm:style>
-      <a:lnRef idx="2">
-        <a:scrgbClr r="0" g="0" b="0"/>
-      </a:lnRef>
-      <a:fillRef idx="1">
-        <a:scrgbClr r="0" g="0" b="0"/>
-      </a:fillRef>
-      <a:effectRef idx="0">
-        <a:scrgbClr r="0" g="0" b="0"/>
-      </a:effectRef>
-      <a:fontRef idx="minor">
-        <a:schemeClr val="lt1"/>
-      </a:fontRef>
-    </dgm:style>
-  </dgm:styleLbl>
-  <dgm:styleLbl name="node2">
-    <dgm:scene3d>
-      <a:camera prst="orthographicFront"/>
-      <a:lightRig rig="threePt" dir="t"/>
-    </dgm:scene3d>
-    <dgm:sp3d/>
-    <dgm:txPr/>
-    <dgm:style>
-      <a:lnRef idx="2">
-        <a:scrgbClr r="0" g="0" b="0"/>
-      </a:lnRef>
-      <a:fillRef idx="1">
-        <a:scrgbClr r="0" g="0" b="0"/>
-      </a:fillRef>
-      <a:effectRef idx="0">
-        <a:scrgbClr r="0" g="0" b="0"/>
-      </a:effectRef>
-      <a:fontRef idx="minor">
-        <a:schemeClr val="lt1"/>
-      </a:fontRef>
-    </dgm:style>
-  </dgm:styleLbl>
-  <dgm:styleLbl name="node3">
-    <dgm:scene3d>
-      <a:camera prst="orthographicFront"/>
-      <a:lightRig rig="threePt" dir="t"/>
-    </dgm:scene3d>
-    <dgm:sp3d/>
-    <dgm:txPr/>
-    <dgm:style>
-      <a:lnRef idx="2">
-        <a:scrgbClr r="0" g="0" b="0"/>
-      </a:lnRef>
-      <a:fillRef idx="1">
-        <a:scrgbClr r="0" g="0" b="0"/>
-      </a:fillRef>
-      <a:effectRef idx="0">
-        <a:scrgbClr r="0" g="0" b="0"/>
-      </a:effectRef>
-      <a:fontRef idx="minor">
-        <a:schemeClr val="lt1"/>
-      </a:fontRef>
-    </dgm:style>
-  </dgm:styleLbl>
-  <dgm:styleLbl name="node4">
-    <dgm:scene3d>
-      <a:camera prst="orthographicFront"/>
-      <a:lightRig rig="threePt" dir="t"/>
-    </dgm:scene3d>
-    <dgm:sp3d/>
-    <dgm:txPr/>
-    <dgm:style>
-      <a:lnRef idx="2">
-        <a:scrgbClr r="0" g="0" b="0"/>
-      </a:lnRef>
-      <a:fillRef idx="1">
-        <a:scrgbClr r="0" g="0" b="0"/>
-      </a:fillRef>
-      <a:effectRef idx="0">
-        <a:scrgbClr r="0" g="0" b="0"/>
-      </a:effectRef>
-      <a:fontRef idx="minor">
-        <a:schemeClr val="lt1"/>
-      </a:fontRef>
-    </dgm:style>
-  </dgm:styleLbl>
-  <dgm:styleLbl name="fgImgPlace1">
-    <dgm:scene3d>
-      <a:camera prst="orthographicFront"/>
-      <a:lightRig rig="threePt" dir="t"/>
-    </dgm:scene3d>
-    <dgm:sp3d/>
-    <dgm:txPr/>
-    <dgm:style>
-      <a:lnRef idx="2">
-        <a:scrgbClr r="0" g="0" b="0"/>
-      </a:lnRef>
-      <a:fillRef idx="1">
-        <a:scrgbClr r="0" g="0" b="0"/>
-      </a:fillRef>
-      <a:effectRef idx="0">
-        <a:scrgbClr r="0" g="0" b="0"/>
-      </a:effectRef>
-      <a:fontRef idx="minor"/>
-    </dgm:style>
-  </dgm:styleLbl>
-  <dgm:styleLbl name="alignImgPlace1">
-    <dgm:scene3d>
-      <a:camera prst="orthographicFront"/>
-      <a:lightRig rig="threePt" dir="t"/>
-    </dgm:scene3d>
-    <dgm:sp3d/>
-    <dgm:txPr/>
-    <dgm:style>
-      <a:lnRef idx="2">
-        <a:scrgbClr r="0" g="0" b="0"/>
-      </a:lnRef>
-      <a:fillRef idx="1">
-        <a:scrgbClr r="0" g="0" b="0"/>
-      </a:fillRef>
-      <a:effectRef idx="0">
-        <a:scrgbClr r="0" g="0" b="0"/>
-      </a:effectRef>
-      <a:fontRef idx="minor"/>
-    </dgm:style>
-  </dgm:styleLbl>
-  <dgm:styleLbl name="bgImgPlace1">
-    <dgm:scene3d>
-      <a:camera prst="orthographicFront"/>
-      <a:lightRig rig="threePt" dir="t"/>
-    </dgm:scene3d>
-    <dgm:sp3d/>
-    <dgm:txPr/>
-    <dgm:style>
-      <a:lnRef idx="2">
-        <a:scrgbClr r="0" g="0" b="0"/>
-      </a:lnRef>
-      <a:fillRef idx="1">
-        <a:scrgbClr r="0" g="0" b="0"/>
-      </a:fillRef>
-      <a:effectRef idx="0">
-        <a:scrgbClr r="0" g="0" b="0"/>
-      </a:effectRef>
-      <a:fontRef idx="minor"/>
-    </dgm:style>
-  </dgm:styleLbl>
-  <dgm:styleLbl name="sibTrans2D1">
-    <dgm:scene3d>
-      <a:camera prst="orthographicFront"/>
-      <a:lightRig rig="threePt" dir="t"/>
-    </dgm:scene3d>
-    <dgm:sp3d/>
-    <dgm:txPr/>
-    <dgm:style>
-      <a:lnRef idx="0">
-        <a:scrgbClr r="0" g="0" b="0"/>
-      </a:lnRef>
-      <a:fillRef idx="1">
-        <a:scrgbClr r="0" g="0" b="0"/>
-      </a:fillRef>
-      <a:effectRef idx="0">
-        <a:scrgbClr r="0" g="0" b="0"/>
-      </a:effectRef>
-      <a:fontRef idx="minor">
-        <a:schemeClr val="lt1"/>
-      </a:fontRef>
-    </dgm:style>
-  </dgm:styleLbl>
-  <dgm:styleLbl name="fgSibTrans2D1">
-    <dgm:scene3d>
-      <a:camera prst="orthographicFront"/>
-      <a:lightRig rig="threePt" dir="t"/>
-    </dgm:scene3d>
-    <dgm:sp3d/>
-    <dgm:txPr/>
-    <dgm:style>
-      <a:lnRef idx="0">
-        <a:scrgbClr r="0" g="0" b="0"/>
-      </a:lnRef>
-      <a:fillRef idx="1">
-        <a:scrgbClr r="0" g="0" b="0"/>
-      </a:fillRef>
-      <a:effectRef idx="0">
-        <a:scrgbClr r="0" g="0" b="0"/>
-      </a:effectRef>
-      <a:fontRef idx="minor">
-        <a:schemeClr val="lt1"/>
-      </a:fontRef>
-    </dgm:style>
-  </dgm:styleLbl>
-  <dgm:styleLbl name="bgSibTrans2D1">
-    <dgm:scene3d>
-      <a:camera prst="orthographicFront"/>
-      <a:lightRig rig="threePt" dir="t"/>
-    </dgm:scene3d>
-    <dgm:sp3d/>
-    <dgm:txPr/>
-    <dgm:style>
-      <a:lnRef idx="0">
-        <a:scrgbClr r="0" g="0" b="0"/>
-      </a:lnRef>
-      <a:fillRef idx="1">
-        <a:scrgbClr r="0" g="0" b="0"/>
-      </a:fillRef>
-      <a:effectRef idx="0">
-        <a:scrgbClr r="0" g="0" b="0"/>
-      </a:effectRef>
-      <a:fontRef idx="minor">
-        <a:schemeClr val="lt1"/>
-      </a:fontRef>
-    </dgm:style>
-  </dgm:styleLbl>
-  <dgm:styleLbl name="sibTrans1D1">
-    <dgm:scene3d>
-      <a:camera prst="orthographicFront"/>
-      <a:lightRig rig="threePt" dir="t"/>
-    </dgm:scene3d>
-    <dgm:sp3d/>
-    <dgm:txPr/>
-    <dgm:style>
-      <a:lnRef idx="1">
-        <a:scrgbClr r="0" g="0" b="0"/>
-      </a:lnRef>
-      <a:fillRef idx="0">
-        <a:scrgbClr r="0" g="0" b="0"/>
-      </a:fillRef>
-      <a:effectRef idx="0">
-        <a:scrgbClr r="0" g="0" b="0"/>
-      </a:effectRef>
-      <a:fontRef idx="minor"/>
-    </dgm:style>
-  </dgm:styleLbl>
-  <dgm:styleLbl name="callout">
-    <dgm:scene3d>
-      <a:camera prst="orthographicFront"/>
-      <a:lightRig rig="threePt" dir="t"/>
-    </dgm:scene3d>
-    <dgm:sp3d/>
-    <dgm:txPr/>
-    <dgm:style>
-      <a:lnRef idx="2">
-        <a:scrgbClr r="0" g="0" b="0"/>
-      </a:lnRef>
-      <a:fillRef idx="1">
-        <a:scrgbClr r="0" g="0" b="0"/>
-      </a:fillRef>
-      <a:effectRef idx="0">
-        <a:scrgbClr r="0" g="0" b="0"/>
-      </a:effectRef>
-      <a:fontRef idx="minor"/>
-    </dgm:style>
-  </dgm:styleLbl>
-  <dgm:styleLbl name="asst0">
-    <dgm:scene3d>
-      <a:camera prst="orthographicFront"/>
-      <a:lightRig rig="threePt" dir="t"/>
-    </dgm:scene3d>
-    <dgm:sp3d/>
-    <dgm:txPr/>
-    <dgm:style>
-      <a:lnRef idx="2">
-        <a:scrgbClr r="0" g="0" b="0"/>
-      </a:lnRef>
-      <a:fillRef idx="1">
-        <a:scrgbClr r="0" g="0" b="0"/>
-      </a:fillRef>
-      <a:effectRef idx="0">
-        <a:scrgbClr r="0" g="0" b="0"/>
-      </a:effectRef>
-      <a:fontRef idx="minor">
-        <a:schemeClr val="lt1"/>
-      </a:fontRef>
-    </dgm:style>
-  </dgm:styleLbl>
-  <dgm:styleLbl name="asst1">
-    <dgm:scene3d>
-      <a:camera prst="orthographicFront"/>
-      <a:lightRig rig="threePt" dir="t"/>
-    </dgm:scene3d>
-    <dgm:sp3d/>
-    <dgm:txPr/>
-    <dgm:style>
-      <a:lnRef idx="2">
-        <a:scrgbClr r="0" g="0" b="0"/>
-      </a:lnRef>
-      <a:fillRef idx="1">
-        <a:scrgbClr r="0" g="0" b="0"/>
-      </a:fillRef>
-      <a:effectRef idx="0">
-        <a:scrgbClr r="0" g="0" b="0"/>
-      </a:effectRef>
-      <a:fontRef idx="minor">
-        <a:schemeClr val="lt1"/>
-      </a:fontRef>
-    </dgm:style>
-  </dgm:styleLbl>
-  <dgm:styleLbl name="asst2">
-    <dgm:scene3d>
-      <a:camera prst="orthographicFront"/>
-      <a:lightRig rig="threePt" dir="t"/>
-    </dgm:scene3d>
-    <dgm:sp3d/>
-    <dgm:txPr/>
-    <dgm:style>
-      <a:lnRef idx="2">
-        <a:scrgbClr r="0" g="0" b="0"/>
-      </a:lnRef>
-      <a:fillRef idx="1">
-        <a:scrgbClr r="0" g="0" b="0"/>
-      </a:fillRef>
-      <a:effectRef idx="0">
-        <a:scrgbClr r="0" g="0" b="0"/>
-      </a:effectRef>
-      <a:fontRef idx="minor">
-        <a:schemeClr val="lt1"/>
-      </a:fontRef>
-    </dgm:style>
-  </dgm:styleLbl>
-  <dgm:styleLbl name="asst3">
-    <dgm:scene3d>
-      <a:camera prst="orthographicFront"/>
-      <a:lightRig rig="threePt" dir="t"/>
-    </dgm:scene3d>
-    <dgm:sp3d/>
-    <dgm:txPr/>
-    <dgm:style>
-      <a:lnRef idx="2">
-        <a:scrgbClr r="0" g="0" b="0"/>
-      </a:lnRef>
-      <a:fillRef idx="1">
-        <a:scrgbClr r="0" g="0" b="0"/>
-      </a:fillRef>
-      <a:effectRef idx="0">
-        <a:scrgbClr r="0" g="0" b="0"/>
-      </a:effectRef>
-      <a:fontRef idx="minor">
-        <a:schemeClr val="lt1"/>
-      </a:fontRef>
-    </dgm:style>
-  </dgm:styleLbl>
-  <dgm:styleLbl name="asst4">
-    <dgm:scene3d>
-      <a:camera prst="orthographicFront"/>
-      <a:lightRig rig="threePt" dir="t"/>
-    </dgm:scene3d>
-    <dgm:sp3d/>
-    <dgm:txPr/>
-    <dgm:style>
-      <a:lnRef idx="2">
-        <a:scrgbClr r="0" g="0" b="0"/>
-      </a:lnRef>
-      <a:fillRef idx="1">
-        <a:scrgbClr r="0" g="0" b="0"/>
-      </a:fillRef>
-      <a:effectRef idx="0">
-        <a:scrgbClr r="0" g="0" b="0"/>
-      </a:effectRef>
-      <a:fontRef idx="minor">
-        <a:schemeClr val="lt1"/>
-      </a:fontRef>
-    </dgm:style>
-  </dgm:styleLbl>
-  <dgm:styleLbl name="parChTrans2D1">
-    <dgm:scene3d>
-      <a:camera prst="orthographicFront"/>
-      <a:lightRig rig="threePt" dir="t"/>
-    </dgm:scene3d>
-    <dgm:sp3d/>
-    <dgm:txPr/>
-    <dgm:style>
-      <a:lnRef idx="2">
-        <a:scrgbClr r="0" g="0" b="0"/>
-      </a:lnRef>
-      <a:fillRef idx="1">
-        <a:scrgbClr r="0" g="0" b="0"/>
-      </a:fillRef>
-      <a:effectRef idx="0">
-        <a:scrgbClr r="0" g="0" b="0"/>
-      </a:effectRef>
-      <a:fontRef idx="minor">
-        <a:schemeClr val="lt1"/>
-      </a:fontRef>
-    </dgm:style>
-  </dgm:styleLbl>
-  <dgm:styleLbl name="parChTrans2D2">
-    <dgm:scene3d>
-      <a:camera prst="orthographicFront"/>
-      <a:lightRig rig="threePt" dir="t"/>
-    </dgm:scene3d>
-    <dgm:sp3d/>
-    <dgm:txPr/>
-    <dgm:style>
-      <a:lnRef idx="2">
-        <a:scrgbClr r="0" g="0" b="0"/>
-      </a:lnRef>
-      <a:fillRef idx="1">
-        <a:scrgbClr r="0" g="0" b="0"/>
-      </a:fillRef>
-      <a:effectRef idx="0">
-        <a:scrgbClr r="0" g="0" b="0"/>
-      </a:effectRef>
-      <a:fontRef idx="minor">
-        <a:schemeClr val="lt1"/>
-      </a:fontRef>
-    </dgm:style>
-  </dgm:styleLbl>
-  <dgm:styleLbl name="parChTrans2D3">
-    <dgm:scene3d>
-      <a:camera prst="orthographicFront"/>
-      <a:lightRig rig="threePt" dir="t"/>
-    </dgm:scene3d>
-    <dgm:sp3d/>
-    <dgm:txPr/>
-    <dgm:style>
-      <a:lnRef idx="2">
-        <a:scrgbClr r="0" g="0" b="0"/>
-      </a:lnRef>
-      <a:fillRef idx="1">
-        <a:scrgbClr r="0" g="0" b="0"/>
-      </a:fillRef>
-      <a:effectRef idx="0">
-        <a:scrgbClr r="0" g="0" b="0"/>
-      </a:effectRef>
-      <a:fontRef idx="minor">
-        <a:schemeClr val="lt1"/>
-      </a:fontRef>
-    </dgm:style>
-  </dgm:styleLbl>
-  <dgm:styleLbl name="parChTrans2D4">
-    <dgm:scene3d>
-      <a:camera prst="orthographicFront"/>
-      <a:lightRig rig="threePt" dir="t"/>
-    </dgm:scene3d>
-    <dgm:sp3d/>
-    <dgm:txPr/>
-    <dgm:style>
-      <a:lnRef idx="2">
-        <a:scrgbClr r="0" g="0" b="0"/>
-      </a:lnRef>
-      <a:fillRef idx="1">
-        <a:scrgbClr r="0" g="0" b="0"/>
-      </a:fillRef>
-      <a:effectRef idx="0">
-        <a:scrgbClr r="0" g="0" b="0"/>
-      </a:effectRef>
-      <a:fontRef idx="minor">
-        <a:schemeClr val="lt1"/>
-      </a:fontRef>
-    </dgm:style>
-  </dgm:styleLbl>
-  <dgm:styleLbl name="parChTrans1D1">
-    <dgm:scene3d>
-      <a:camera prst="orthographicFront"/>
-      <a:lightRig rig="threePt" dir="t"/>
-    </dgm:scene3d>
-    <dgm:sp3d/>
-    <dgm:txPr/>
-    <dgm:style>
-      <a:lnRef idx="2">
-        <a:scrgbClr r="0" g="0" b="0"/>
-      </a:lnRef>
-      <a:fillRef idx="0">
-        <a:scrgbClr r="0" g="0" b="0"/>
-      </a:fillRef>
-      <a:effectRef idx="0">
-        <a:scrgbClr r="0" g="0" b="0"/>
-      </a:effectRef>
-      <a:fontRef idx="minor"/>
-    </dgm:style>
-  </dgm:styleLbl>
-  <dgm:styleLbl name="parChTrans1D2">
-    <dgm:scene3d>
-      <a:camera prst="orthographicFront"/>
-      <a:lightRig rig="threePt" dir="t"/>
-    </dgm:scene3d>
-    <dgm:sp3d/>
-    <dgm:txPr/>
-    <dgm:style>
-      <a:lnRef idx="2">
-        <a:scrgbClr r="0" g="0" b="0"/>
-      </a:lnRef>
-      <a:fillRef idx="0">
-        <a:scrgbClr r="0" g="0" b="0"/>
-      </a:fillRef>
-      <a:effectRef idx="0">
-        <a:scrgbClr r="0" g="0" b="0"/>
-      </a:effectRef>
-      <a:fontRef idx="minor"/>
-    </dgm:style>
-  </dgm:styleLbl>
-  <dgm:styleLbl name="parChTrans1D3">
-    <dgm:scene3d>
-      <a:camera prst="orthographicFront"/>
-      <a:lightRig rig="threePt" dir="t"/>
-    </dgm:scene3d>
-    <dgm:sp3d/>
-    <dgm:txPr/>
-    <dgm:style>
-      <a:lnRef idx="2">
-        <a:scrgbClr r="0" g="0" b="0"/>
-      </a:lnRef>
-      <a:fillRef idx="0">
-        <a:scrgbClr r="0" g="0" b="0"/>
-      </a:fillRef>
-      <a:effectRef idx="0">
-        <a:scrgbClr r="0" g="0" b="0"/>
-      </a:effectRef>
-      <a:fontRef idx="minor"/>
-    </dgm:style>
-  </dgm:styleLbl>
-  <dgm:styleLbl name="parChTrans1D4">
-    <dgm:scene3d>
-      <a:camera prst="orthographicFront"/>
-      <a:lightRig rig="threePt" dir="t"/>
-    </dgm:scene3d>
-    <dgm:sp3d/>
-    <dgm:txPr/>
-    <dgm:style>
-      <a:lnRef idx="2">
-        <a:scrgbClr r="0" g="0" b="0"/>
-      </a:lnRef>
-      <a:fillRef idx="0">
-        <a:scrgbClr r="0" g="0" b="0"/>
-      </a:fillRef>
-      <a:effectRef idx="0">
-        <a:scrgbClr r="0" g="0" b="0"/>
-      </a:effectRef>
-      <a:fontRef idx="minor"/>
-    </dgm:style>
-  </dgm:styleLbl>
-  <dgm:styleLbl name="fgAcc1">
-    <dgm:scene3d>
-      <a:camera prst="orthographicFront"/>
-      <a:lightRig rig="threePt" dir="t"/>
-    </dgm:scene3d>
-    <dgm:sp3d/>
-    <dgm:txPr/>
-    <dgm:style>
-      <a:lnRef idx="2">
-        <a:scrgbClr r="0" g="0" b="0"/>
-      </a:lnRef>
-      <a:fillRef idx="1">
-        <a:scrgbClr r="0" g="0" b="0"/>
-      </a:fillRef>
-      <a:effectRef idx="0">
-        <a:scrgbClr r="0" g="0" b="0"/>
-      </a:effectRef>
-      <a:fontRef idx="minor"/>
-    </dgm:style>
-  </dgm:styleLbl>
-  <dgm:styleLbl name="conFgAcc1">
-    <dgm:scene3d>
-      <a:camera prst="orthographicFront"/>
-      <a:lightRig rig="threePt" dir="t"/>
-    </dgm:scene3d>
-    <dgm:sp3d/>
-    <dgm:txPr/>
-    <dgm:style>
-      <a:lnRef idx="2">
-        <a:scrgbClr r="0" g="0" b="0"/>
-      </a:lnRef>
-      <a:fillRef idx="1">
-        <a:scrgbClr r="0" g="0" b="0"/>
-      </a:fillRef>
-      <a:effectRef idx="0">
-        <a:scrgbClr r="0" g="0" b="0"/>
-      </a:effectRef>
-      <a:fontRef idx="minor"/>
-    </dgm:style>
-  </dgm:styleLbl>
-  <dgm:styleLbl name="alignAcc1">
-    <dgm:scene3d>
-      <a:camera prst="orthographicFront"/>
-      <a:lightRig rig="threePt" dir="t"/>
-    </dgm:scene3d>
-    <dgm:sp3d/>
-    <dgm:txPr/>
-    <dgm:style>
-      <a:lnRef idx="2">
-        <a:scrgbClr r="0" g="0" b="0"/>
-      </a:lnRef>
-      <a:fillRef idx="1">
-        <a:scrgbClr r="0" g="0" b="0"/>
-      </a:fillRef>
-      <a:effectRef idx="0">
-        <a:scrgbClr r="0" g="0" b="0"/>
-      </a:effectRef>
-      <a:fontRef idx="minor"/>
-    </dgm:style>
-  </dgm:styleLbl>
-  <dgm:styleLbl name="trAlignAcc1">
-    <dgm:scene3d>
-      <a:camera prst="orthographicFront"/>
-      <a:lightRig rig="threePt" dir="t"/>
-    </dgm:scene3d>
-    <dgm:sp3d/>
-    <dgm:txPr/>
-    <dgm:style>
-      <a:lnRef idx="1">
-        <a:scrgbClr r="0" g="0" b="0"/>
-      </a:lnRef>
-      <a:fillRef idx="1">
-        <a:scrgbClr r="0" g="0" b="0"/>
-      </a:fillRef>
-      <a:effectRef idx="0">
-        <a:scrgbClr r="0" g="0" b="0"/>
-      </a:effectRef>
-      <a:fontRef idx="minor"/>
-    </dgm:style>
-  </dgm:styleLbl>
-  <dgm:styleLbl name="bgAcc1">
-    <dgm:scene3d>
-      <a:camera prst="orthographicFront"/>
-      <a:lightRig rig="threePt" dir="t"/>
-    </dgm:scene3d>
-    <dgm:sp3d/>
-    <dgm:txPr/>
-    <dgm:style>
-      <a:lnRef idx="2">
-        <a:scrgbClr r="0" g="0" b="0"/>
-      </a:lnRef>
-      <a:fillRef idx="1">
-        <a:scrgbClr r="0" g="0" b="0"/>
-      </a:fillRef>
-      <a:effectRef idx="0">
-        <a:scrgbClr r="0" g="0" b="0"/>
-      </a:effectRef>
-      <a:fontRef idx="minor"/>
-    </dgm:style>
-  </dgm:styleLbl>
-  <dgm:styleLbl name="solidFgAcc1">
-    <dgm:scene3d>
-      <a:camera prst="orthographicFront"/>
-      <a:lightRig rig="threePt" dir="t"/>
-    </dgm:scene3d>
-    <dgm:sp3d/>
-    <dgm:txPr/>
-    <dgm:style>
-      <a:lnRef idx="2">
-        <a:scrgbClr r="0" g="0" b="0"/>
-      </a:lnRef>
-      <a:fillRef idx="1">
-        <a:scrgbClr r="0" g="0" b="0"/>
-      </a:fillRef>
-      <a:effectRef idx="0">
-        <a:scrgbClr r="0" g="0" b="0"/>
-      </a:effectRef>
-      <a:fontRef idx="minor"/>
-    </dgm:style>
-  </dgm:styleLbl>
-  <dgm:styleLbl name="solidAlignAcc1">
-    <dgm:scene3d>
-      <a:camera prst="orthographicFront"/>
-      <a:lightRig rig="threePt" dir="t"/>
-    </dgm:scene3d>
-    <dgm:sp3d/>
-    <dgm:txPr/>
-    <dgm:style>
-      <a:lnRef idx="2">
-        <a:scrgbClr r="0" g="0" b="0"/>
-      </a:lnRef>
-      <a:fillRef idx="1">
-        <a:scrgbClr r="0" g="0" b="0"/>
-      </a:fillRef>
-      <a:effectRef idx="0">
-        <a:scrgbClr r="0" g="0" b="0"/>
-      </a:effectRef>
-      <a:fontRef idx="minor"/>
-    </dgm:style>
-  </dgm:styleLbl>
-  <dgm:styleLbl name="solidBgAcc1">
-    <dgm:scene3d>
-      <a:camera prst="orthographicFront"/>
-      <a:lightRig rig="threePt" dir="t"/>
-    </dgm:scene3d>
-    <dgm:sp3d/>
-    <dgm:txPr/>
-    <dgm:style>
-      <a:lnRef idx="2">
-        <a:scrgbClr r="0" g="0" b="0"/>
-      </a:lnRef>
-      <a:fillRef idx="1">
-        <a:scrgbClr r="0" g="0" b="0"/>
-      </a:fillRef>
-      <a:effectRef idx="0">
-        <a:scrgbClr r="0" g="0" b="0"/>
-      </a:effectRef>
-      <a:fontRef idx="minor"/>
-    </dgm:style>
-  </dgm:styleLbl>
-  <dgm:styleLbl name="fgAccFollowNode1">
-    <dgm:scene3d>
-      <a:camera prst="orthographicFront"/>
-      <a:lightRig rig="threePt" dir="t"/>
-    </dgm:scene3d>
-    <dgm:sp3d/>
-    <dgm:txPr/>
-    <dgm:style>
-      <a:lnRef idx="2">
-        <a:scrgbClr r="0" g="0" b="0"/>
-      </a:lnRef>
-      <a:fillRef idx="1">
-        <a:scrgbClr r="0" g="0" b="0"/>
-      </a:fillRef>
-      <a:effectRef idx="0">
-        <a:scrgbClr r="0" g="0" b="0"/>
-      </a:effectRef>
-      <a:fontRef idx="minor"/>
-    </dgm:style>
-  </dgm:styleLbl>
-  <dgm:styleLbl name="alignAccFollowNode1">
-    <dgm:scene3d>
-      <a:camera prst="orthographicFront"/>
-      <a:lightRig rig="threePt" dir="t"/>
-    </dgm:scene3d>
-    <dgm:sp3d/>
-    <dgm:txPr/>
-    <dgm:style>
-      <a:lnRef idx="2">
-        <a:scrgbClr r="0" g="0" b="0"/>
-      </a:lnRef>
-      <a:fillRef idx="1">
-        <a:scrgbClr r="0" g="0" b="0"/>
-      </a:fillRef>
-      <a:effectRef idx="0">
-        <a:scrgbClr r="0" g="0" b="0"/>
-      </a:effectRef>
-      <a:fontRef idx="minor"/>
-    </dgm:style>
-  </dgm:styleLbl>
-  <dgm:styleLbl name="bgAccFollowNode1">
-    <dgm:scene3d>
-      <a:camera prst="orthographicFront"/>
-      <a:lightRig rig="threePt" dir="t"/>
-    </dgm:scene3d>
-    <dgm:sp3d/>
-    <dgm:txPr/>
-    <dgm:style>
-      <a:lnRef idx="2">
-        <a:scrgbClr r="0" g="0" b="0"/>
-      </a:lnRef>
-      <a:fillRef idx="1">
-        <a:scrgbClr r="0" g="0" b="0"/>
-      </a:fillRef>
-      <a:effectRef idx="0">
-        <a:scrgbClr r="0" g="0" b="0"/>
-      </a:effectRef>
-      <a:fontRef idx="minor"/>
-    </dgm:style>
-  </dgm:styleLbl>
-  <dgm:styleLbl name="fgAcc0">
-    <dgm:scene3d>
-      <a:camera prst="orthographicFront"/>
-      <a:lightRig rig="threePt" dir="t"/>
-    </dgm:scene3d>
-    <dgm:sp3d/>
-    <dgm:txPr/>
-    <dgm:style>
-      <a:lnRef idx="2">
-        <a:scrgbClr r="0" g="0" b="0"/>
-      </a:lnRef>
-      <a:fillRef idx="1">
-        <a:scrgbClr r="0" g="0" b="0"/>
-      </a:fillRef>
-      <a:effectRef idx="0">
-        <a:scrgbClr r="0" g="0" b="0"/>
-      </a:effectRef>
-      <a:fontRef idx="minor"/>
-    </dgm:style>
-  </dgm:styleLbl>
-  <dgm:styleLbl name="fgAcc2">
-    <dgm:scene3d>
-      <a:camera prst="orthographicFront"/>
-      <a:lightRig rig="threePt" dir="t"/>
-    </dgm:scene3d>
-    <dgm:sp3d/>
-    <dgm:txPr/>
-    <dgm:style>
-      <a:lnRef idx="2">
-        <a:scrgbClr r="0" g="0" b="0"/>
-      </a:lnRef>
-      <a:fillRef idx="1">
-        <a:scrgbClr r="0" g="0" b="0"/>
-      </a:fillRef>
-      <a:effectRef idx="0">
-        <a:scrgbClr r="0" g="0" b="0"/>
-      </a:effectRef>
-      <a:fontRef idx="minor"/>
-    </dgm:style>
-  </dgm:styleLbl>
-  <dgm:styleLbl name="fgAcc3">
-    <dgm:scene3d>
-      <a:camera prst="orthographicFront"/>
-      <a:lightRig rig="threePt" dir="t"/>
-    </dgm:scene3d>
-    <dgm:sp3d/>
-    <dgm:txPr/>
-    <dgm:style>
-      <a:lnRef idx="2">
-        <a:scrgbClr r="0" g="0" b="0"/>
-      </a:lnRef>
-      <a:fillRef idx="1">
-        <a:scrgbClr r="0" g="0" b="0"/>
-      </a:fillRef>
-      <a:effectRef idx="0">
-        <a:scrgbClr r="0" g="0" b="0"/>
-      </a:effectRef>
-      <a:fontRef idx="minor"/>
-    </dgm:style>
-  </dgm:styleLbl>
-  <dgm:styleLbl name="fgAcc4">
-    <dgm:scene3d>
-      <a:camera prst="orthographicFront"/>
-      <a:lightRig rig="threePt" dir="t"/>
-    </dgm:scene3d>
-    <dgm:sp3d/>
-    <dgm:txPr/>
-    <dgm:style>
-      <a:lnRef idx="2">
-        <a:scrgbClr r="0" g="0" b="0"/>
-      </a:lnRef>
-      <a:fillRef idx="1">
-        <a:scrgbClr r="0" g="0" b="0"/>
-      </a:fillRef>
-      <a:effectRef idx="0">
-        <a:scrgbClr r="0" g="0" b="0"/>
-      </a:effectRef>
-      <a:fontRef idx="minor"/>
-    </dgm:style>
-  </dgm:styleLbl>
-  <dgm:styleLbl name="bgShp">
-    <dgm:scene3d>
-      <a:camera prst="orthographicFront"/>
-      <a:lightRig rig="threePt" dir="t"/>
-    </dgm:scene3d>
-    <dgm:sp3d/>
-    <dgm:txPr/>
-    <dgm:style>
-      <a:lnRef idx="0">
-        <a:scrgbClr r="0" g="0" b="0"/>
-      </a:lnRef>
-      <a:fillRef idx="1">
-        <a:scrgbClr r="0" g="0" b="0"/>
-      </a:fillRef>
-      <a:effectRef idx="0">
-        <a:scrgbClr r="0" g="0" b="0"/>
-      </a:effectRef>
-      <a:fontRef idx="minor"/>
-    </dgm:style>
-  </dgm:styleLbl>
-  <dgm:styleLbl name="dkBgShp">
-    <dgm:scene3d>
-      <a:camera prst="orthographicFront"/>
-      <a:lightRig rig="threePt" dir="t"/>
-    </dgm:scene3d>
-    <dgm:sp3d/>
-    <dgm:txPr/>
-    <dgm:style>
-      <a:lnRef idx="0">
-        <a:scrgbClr r="0" g="0" b="0"/>
-      </a:lnRef>
-      <a:fillRef idx="1">
-        <a:scrgbClr r="0" g="0" b="0"/>
-      </a:fillRef>
-      <a:effectRef idx="0">
-        <a:scrgbClr r="0" g="0" b="0"/>
-      </a:effectRef>
-      <a:fontRef idx="minor"/>
-    </dgm:style>
-  </dgm:styleLbl>
-  <dgm:styleLbl name="trBgShp">
-    <dgm:scene3d>
-      <a:camera prst="orthographicFront"/>
-      <a:lightRig rig="threePt" dir="t"/>
-    </dgm:scene3d>
-    <dgm:sp3d/>
-    <dgm:txPr/>
-    <dgm:style>
-      <a:lnRef idx="0">
-        <a:scrgbClr r="0" g="0" b="0"/>
-      </a:lnRef>
-      <a:fillRef idx="1">
-        <a:scrgbClr r="0" g="0" b="0"/>
-      </a:fillRef>
-      <a:effectRef idx="0">
-        <a:scrgbClr r="0" g="0" b="0"/>
-      </a:effectRef>
-      <a:fontRef idx="minor"/>
-    </dgm:style>
-  </dgm:styleLbl>
-  <dgm:styleLbl name="fgShp">
-    <dgm:scene3d>
-      <a:camera prst="orthographicFront"/>
-      <a:lightRig rig="threePt" dir="t"/>
-    </dgm:scene3d>
-    <dgm:sp3d/>
-    <dgm:txPr/>
-    <dgm:style>
-      <a:lnRef idx="2">
-        <a:scrgbClr r="0" g="0" b="0"/>
-      </a:lnRef>
-      <a:fillRef idx="1">
-        <a:scrgbClr r="0" g="0" b="0"/>
-      </a:fillRef>
-      <a:effectRef idx="0">
-        <a:scrgbClr r="0" g="0" b="0"/>
-      </a:effectRef>
-      <a:fontRef idx="minor"/>
-    </dgm:style>
-  </dgm:styleLbl>
-  <dgm:styleLbl name="revTx">
-    <dgm:scene3d>
-      <a:camera prst="orthographicFront"/>
-      <a:lightRig rig="threePt" dir="t"/>
-    </dgm:scene3d>
-    <dgm:sp3d/>
-    <dgm:txPr/>
-    <dgm:style>
-      <a:lnRef idx="0">
-        <a:scrgbClr r="0" g="0" b="0"/>
-      </a:lnRef>
-      <a:fillRef idx="0">
-        <a:scrgbClr r="0" g="0" b="0"/>
-      </a:fillRef>
-      <a:effectRef idx="0">
-        <a:scrgbClr r="0" g="0" b="0"/>
-      </a:effectRef>
-      <a:fontRef idx="minor"/>
-    </dgm:style>
-  </dgm:styleLbl>
-</dgm:styleDef>
-</file>
-
 <file path=ppt/notesMasters/notesMaster1.xml><?xml version="1.0" encoding="utf-8"?>
 <p:notesMaster xmlns:a="http://schemas.openxmlformats.org/drawingml/2006/main" xmlns:r="http://schemas.openxmlformats.org/officeDocument/2006/relationships" xmlns:p="http://schemas.openxmlformats.org/presentationml/2006/main">
   <p:cSld>
@@ -3479,7 +225,7 @@
             <a:fld id="{E168EC2E-7004-4E52-B364-EF7EFD24F792}" type="datetimeFigureOut">
               <a:rPr lang="en-US" smtClean="0"/>
               <a:pPr/>
-              <a:t>9/13/2012</a:t>
+              <a:t>9/21/2012</a:t>
             </a:fld>
             <a:endParaRPr lang="en-US"/>
           </a:p>
@@ -6322,252 +3068,6 @@
               <a:rPr lang="en-US" smtClean="0"/>
               <a:pPr/>
               <a:t>30</a:t>
-            </a:fld>
-            <a:endParaRPr lang="en-US"/>
-          </a:p>
-        </p:txBody>
-      </p:sp>
-    </p:spTree>
-  </p:cSld>
-  <p:clrMapOvr>
-    <a:masterClrMapping/>
-  </p:clrMapOvr>
-</p:notes>
-</file>
-
-<file path=ppt/notesSlides/notesSlide31.xml><?xml version="1.0" encoding="utf-8"?>
-<p:notes xmlns:a="http://schemas.openxmlformats.org/drawingml/2006/main" xmlns:r="http://schemas.openxmlformats.org/officeDocument/2006/relationships" xmlns:p="http://schemas.openxmlformats.org/presentationml/2006/main">
-  <p:cSld>
-    <p:spTree>
-      <p:nvGrpSpPr>
-        <p:cNvPr id="1" name=""/>
-        <p:cNvGrpSpPr/>
-        <p:nvPr/>
-      </p:nvGrpSpPr>
-      <p:grpSpPr>
-        <a:xfrm>
-          <a:off x="0" y="0"/>
-          <a:ext cx="0" cy="0"/>
-          <a:chOff x="0" y="0"/>
-          <a:chExt cx="0" cy="0"/>
-        </a:xfrm>
-      </p:grpSpPr>
-      <p:sp>
-        <p:nvSpPr>
-          <p:cNvPr id="2" name="Slide Image Placeholder 1"/>
-          <p:cNvSpPr>
-            <a:spLocks noGrp="1" noRot="1" noChangeAspect="1"/>
-          </p:cNvSpPr>
-          <p:nvPr>
-            <p:ph type="sldImg"/>
-          </p:nvPr>
-        </p:nvSpPr>
-        <p:spPr/>
-      </p:sp>
-      <p:sp>
-        <p:nvSpPr>
-          <p:cNvPr id="3" name="Notes Placeholder 2"/>
-          <p:cNvSpPr>
-            <a:spLocks noGrp="1"/>
-          </p:cNvSpPr>
-          <p:nvPr>
-            <p:ph type="body" idx="1"/>
-          </p:nvPr>
-        </p:nvSpPr>
-        <p:spPr/>
-        <p:txBody>
-          <a:bodyPr>
-            <a:normAutofit/>
-          </a:bodyPr>
-          <a:lstStyle/>
-          <a:p>
-            <a:endParaRPr lang="en-US"/>
-          </a:p>
-        </p:txBody>
-      </p:sp>
-      <p:sp>
-        <p:nvSpPr>
-          <p:cNvPr id="4" name="Slide Number Placeholder 3"/>
-          <p:cNvSpPr>
-            <a:spLocks noGrp="1"/>
-          </p:cNvSpPr>
-          <p:nvPr>
-            <p:ph type="sldNum" sz="quarter" idx="10"/>
-          </p:nvPr>
-        </p:nvSpPr>
-        <p:spPr/>
-        <p:txBody>
-          <a:bodyPr/>
-          <a:lstStyle/>
-          <a:p>
-            <a:fld id="{08DBBD94-F691-4E8C-B563-F4811306E3CB}" type="slidenum">
-              <a:rPr lang="en-US" smtClean="0"/>
-              <a:pPr/>
-              <a:t>31</a:t>
-            </a:fld>
-            <a:endParaRPr lang="en-US"/>
-          </a:p>
-        </p:txBody>
-      </p:sp>
-    </p:spTree>
-  </p:cSld>
-  <p:clrMapOvr>
-    <a:masterClrMapping/>
-  </p:clrMapOvr>
-</p:notes>
-</file>
-
-<file path=ppt/notesSlides/notesSlide32.xml><?xml version="1.0" encoding="utf-8"?>
-<p:notes xmlns:a="http://schemas.openxmlformats.org/drawingml/2006/main" xmlns:r="http://schemas.openxmlformats.org/officeDocument/2006/relationships" xmlns:p="http://schemas.openxmlformats.org/presentationml/2006/main">
-  <p:cSld>
-    <p:spTree>
-      <p:nvGrpSpPr>
-        <p:cNvPr id="1" name=""/>
-        <p:cNvGrpSpPr/>
-        <p:nvPr/>
-      </p:nvGrpSpPr>
-      <p:grpSpPr>
-        <a:xfrm>
-          <a:off x="0" y="0"/>
-          <a:ext cx="0" cy="0"/>
-          <a:chOff x="0" y="0"/>
-          <a:chExt cx="0" cy="0"/>
-        </a:xfrm>
-      </p:grpSpPr>
-      <p:sp>
-        <p:nvSpPr>
-          <p:cNvPr id="2" name="Slide Image Placeholder 1"/>
-          <p:cNvSpPr>
-            <a:spLocks noGrp="1" noRot="1" noChangeAspect="1"/>
-          </p:cNvSpPr>
-          <p:nvPr>
-            <p:ph type="sldImg"/>
-          </p:nvPr>
-        </p:nvSpPr>
-        <p:spPr/>
-      </p:sp>
-      <p:sp>
-        <p:nvSpPr>
-          <p:cNvPr id="3" name="Notes Placeholder 2"/>
-          <p:cNvSpPr>
-            <a:spLocks noGrp="1"/>
-          </p:cNvSpPr>
-          <p:nvPr>
-            <p:ph type="body" idx="1"/>
-          </p:nvPr>
-        </p:nvSpPr>
-        <p:spPr/>
-        <p:txBody>
-          <a:bodyPr>
-            <a:normAutofit/>
-          </a:bodyPr>
-          <a:lstStyle/>
-          <a:p>
-            <a:endParaRPr lang="en-US"/>
-          </a:p>
-        </p:txBody>
-      </p:sp>
-      <p:sp>
-        <p:nvSpPr>
-          <p:cNvPr id="4" name="Slide Number Placeholder 3"/>
-          <p:cNvSpPr>
-            <a:spLocks noGrp="1"/>
-          </p:cNvSpPr>
-          <p:nvPr>
-            <p:ph type="sldNum" sz="quarter" idx="10"/>
-          </p:nvPr>
-        </p:nvSpPr>
-        <p:spPr/>
-        <p:txBody>
-          <a:bodyPr/>
-          <a:lstStyle/>
-          <a:p>
-            <a:fld id="{08DBBD94-F691-4E8C-B563-F4811306E3CB}" type="slidenum">
-              <a:rPr lang="en-US" smtClean="0"/>
-              <a:pPr/>
-              <a:t>32</a:t>
-            </a:fld>
-            <a:endParaRPr lang="en-US"/>
-          </a:p>
-        </p:txBody>
-      </p:sp>
-    </p:spTree>
-  </p:cSld>
-  <p:clrMapOvr>
-    <a:masterClrMapping/>
-  </p:clrMapOvr>
-</p:notes>
-</file>
-
-<file path=ppt/notesSlides/notesSlide33.xml><?xml version="1.0" encoding="utf-8"?>
-<p:notes xmlns:a="http://schemas.openxmlformats.org/drawingml/2006/main" xmlns:r="http://schemas.openxmlformats.org/officeDocument/2006/relationships" xmlns:p="http://schemas.openxmlformats.org/presentationml/2006/main">
-  <p:cSld>
-    <p:spTree>
-      <p:nvGrpSpPr>
-        <p:cNvPr id="1" name=""/>
-        <p:cNvGrpSpPr/>
-        <p:nvPr/>
-      </p:nvGrpSpPr>
-      <p:grpSpPr>
-        <a:xfrm>
-          <a:off x="0" y="0"/>
-          <a:ext cx="0" cy="0"/>
-          <a:chOff x="0" y="0"/>
-          <a:chExt cx="0" cy="0"/>
-        </a:xfrm>
-      </p:grpSpPr>
-      <p:sp>
-        <p:nvSpPr>
-          <p:cNvPr id="2" name="Slide Image Placeholder 1"/>
-          <p:cNvSpPr>
-            <a:spLocks noGrp="1" noRot="1" noChangeAspect="1"/>
-          </p:cNvSpPr>
-          <p:nvPr>
-            <p:ph type="sldImg"/>
-          </p:nvPr>
-        </p:nvSpPr>
-        <p:spPr/>
-      </p:sp>
-      <p:sp>
-        <p:nvSpPr>
-          <p:cNvPr id="3" name="Notes Placeholder 2"/>
-          <p:cNvSpPr>
-            <a:spLocks noGrp="1"/>
-          </p:cNvSpPr>
-          <p:nvPr>
-            <p:ph type="body" idx="1"/>
-          </p:nvPr>
-        </p:nvSpPr>
-        <p:spPr/>
-        <p:txBody>
-          <a:bodyPr>
-            <a:normAutofit/>
-          </a:bodyPr>
-          <a:lstStyle/>
-          <a:p>
-            <a:endParaRPr lang="en-US"/>
-          </a:p>
-        </p:txBody>
-      </p:sp>
-      <p:sp>
-        <p:nvSpPr>
-          <p:cNvPr id="4" name="Slide Number Placeholder 3"/>
-          <p:cNvSpPr>
-            <a:spLocks noGrp="1"/>
-          </p:cNvSpPr>
-          <p:nvPr>
-            <p:ph type="sldNum" sz="quarter" idx="10"/>
-          </p:nvPr>
-        </p:nvSpPr>
-        <p:spPr/>
-        <p:txBody>
-          <a:bodyPr/>
-          <a:lstStyle/>
-          <a:p>
-            <a:fld id="{08DBBD94-F691-4E8C-B563-F4811306E3CB}" type="slidenum">
-              <a:rPr lang="en-US" smtClean="0"/>
-              <a:pPr/>
-              <a:t>33</a:t>
             </a:fld>
             <a:endParaRPr lang="en-US"/>
           </a:p>
@@ -8521,6 +5021,13 @@
   <p:clrMapOvr>
     <a:masterClrMapping/>
   </p:clrMapOvr>
+  <p:timing>
+    <p:tnLst>
+      <p:par>
+        <p:cTn id="1" dur="indefinite" restart="never" nodeType="tmRoot"/>
+      </p:par>
+    </p:tnLst>
+  </p:timing>
 </p:sld>
 </file>
 
@@ -8651,6 +5158,13 @@
   <p:clrMapOvr>
     <a:masterClrMapping/>
   </p:clrMapOvr>
+  <p:timing>
+    <p:tnLst>
+      <p:par>
+        <p:cTn id="1" dur="indefinite" restart="never" nodeType="tmRoot"/>
+      </p:par>
+    </p:tnLst>
+  </p:timing>
 </p:sld>
 </file>
 
@@ -8817,6 +5331,13 @@
   <p:clrMapOvr>
     <a:masterClrMapping/>
   </p:clrMapOvr>
+  <p:timing>
+    <p:tnLst>
+      <p:par>
+        <p:cTn id="1" dur="indefinite" restart="never" nodeType="tmRoot"/>
+      </p:par>
+    </p:tnLst>
+  </p:timing>
 </p:sld>
 </file>
 
@@ -9105,6 +5626,13 @@
   <p:clrMapOvr>
     <a:masterClrMapping/>
   </p:clrMapOvr>
+  <p:timing>
+    <p:tnLst>
+      <p:par>
+        <p:cTn id="1" dur="indefinite" restart="never" nodeType="tmRoot"/>
+      </p:par>
+    </p:tnLst>
+  </p:timing>
 </p:sld>
 </file>
 
@@ -9210,6 +5738,13 @@
   <p:clrMapOvr>
     <a:masterClrMapping/>
   </p:clrMapOvr>
+  <p:timing>
+    <p:tnLst>
+      <p:par>
+        <p:cTn id="1" dur="indefinite" restart="never" nodeType="tmRoot"/>
+      </p:par>
+    </p:tnLst>
+  </p:timing>
 </p:sld>
 </file>
 
@@ -9498,6 +6033,13 @@
   <p:clrMapOvr>
     <a:masterClrMapping/>
   </p:clrMapOvr>
+  <p:timing>
+    <p:tnLst>
+      <p:par>
+        <p:cTn id="1" dur="indefinite" restart="never" nodeType="tmRoot"/>
+      </p:par>
+    </p:tnLst>
+  </p:timing>
 </p:sld>
 </file>
 
@@ -9684,6 +6226,13 @@
   <p:clrMapOvr>
     <a:masterClrMapping/>
   </p:clrMapOvr>
+  <p:timing>
+    <p:tnLst>
+      <p:par>
+        <p:cTn id="1" dur="indefinite" restart="never" nodeType="tmRoot"/>
+      </p:par>
+    </p:tnLst>
+  </p:timing>
 </p:sld>
 </file>
 
@@ -9869,6 +6418,13 @@
   <p:clrMapOvr>
     <a:masterClrMapping/>
   </p:clrMapOvr>
+  <p:timing>
+    <p:tnLst>
+      <p:par>
+        <p:cTn id="1" dur="indefinite" restart="never" nodeType="tmRoot"/>
+      </p:par>
+    </p:tnLst>
+  </p:timing>
 </p:sld>
 </file>
 
@@ -26600,6 +23156,13 @@
   <p:clrMapOvr>
     <a:masterClrMapping/>
   </p:clrMapOvr>
+  <p:timing>
+    <p:tnLst>
+      <p:par>
+        <p:cTn id="1" dur="indefinite" restart="never" nodeType="tmRoot"/>
+      </p:par>
+    </p:tnLst>
+  </p:timing>
 </p:sld>
 </file>
 
@@ -26823,6 +23386,13 @@
   <p:clrMapOvr>
     <a:masterClrMapping/>
   </p:clrMapOvr>
+  <p:timing>
+    <p:tnLst>
+      <p:par>
+        <p:cTn id="1" dur="indefinite" restart="never" nodeType="tmRoot"/>
+      </p:par>
+    </p:tnLst>
+  </p:timing>
 </p:sld>
 </file>
 
@@ -26868,11 +23438,7 @@
             </a:r>
             <a:r>
               <a:rPr lang="en-US" smtClean="0"/>
-              <a:t>Sample </a:t>
-            </a:r>
-            <a:r>
-              <a:rPr lang="en-US" smtClean="0"/>
-              <a:t>Output</a:t>
+              <a:t>Sample Output</a:t>
             </a:r>
             <a:endParaRPr lang="en-US" dirty="0"/>
           </a:p>
@@ -27374,6 +23940,13 @@
   <p:clrMapOvr>
     <a:masterClrMapping/>
   </p:clrMapOvr>
+  <p:timing>
+    <p:tnLst>
+      <p:par>
+        <p:cTn id="1" dur="indefinite" restart="never" nodeType="tmRoot"/>
+      </p:par>
+    </p:tnLst>
+  </p:timing>
 </p:sld>
 </file>
 
@@ -27843,6 +24416,13 @@
   <p:clrMapOvr>
     <a:masterClrMapping/>
   </p:clrMapOvr>
+  <p:timing>
+    <p:tnLst>
+      <p:par>
+        <p:cTn id="1" dur="indefinite" restart="never" nodeType="tmRoot"/>
+      </p:par>
+    </p:tnLst>
+  </p:timing>
 </p:sld>
 </file>
 
@@ -27975,6 +24555,13 @@
   <p:clrMapOvr>
     <a:masterClrMapping/>
   </p:clrMapOvr>
+  <p:timing>
+    <p:tnLst>
+      <p:par>
+        <p:cTn id="1" dur="indefinite" restart="never" nodeType="tmRoot"/>
+      </p:par>
+    </p:tnLst>
+  </p:timing>
 </p:sld>
 </file>
 
@@ -28263,6 +24850,13 @@
   <p:clrMapOvr>
     <a:masterClrMapping/>
   </p:clrMapOvr>
+  <p:timing>
+    <p:tnLst>
+      <p:par>
+        <p:cTn id="1" dur="indefinite" restart="never" nodeType="tmRoot"/>
+      </p:par>
+    </p:tnLst>
+  </p:timing>
 </p:sld>
 </file>
 
@@ -28421,6 +25015,13 @@
   <p:clrMapOvr>
     <a:masterClrMapping/>
   </p:clrMapOvr>
+  <p:timing>
+    <p:tnLst>
+      <p:par>
+        <p:cTn id="1" dur="indefinite" restart="never" nodeType="tmRoot"/>
+      </p:par>
+    </p:tnLst>
+  </p:timing>
 </p:sld>
 </file>
 
@@ -28518,6 +25119,13 @@
   <p:clrMapOvr>
     <a:masterClrMapping/>
   </p:clrMapOvr>
+  <p:timing>
+    <p:tnLst>
+      <p:par>
+        <p:cTn id="1" dur="indefinite" restart="never" nodeType="tmRoot"/>
+      </p:par>
+    </p:tnLst>
+  </p:timing>
 </p:sld>
 </file>
 
@@ -28806,6 +25414,13 @@
   <p:clrMapOvr>
     <a:masterClrMapping/>
   </p:clrMapOvr>
+  <p:timing>
+    <p:tnLst>
+      <p:par>
+        <p:cTn id="1" dur="indefinite" restart="never" nodeType="tmRoot"/>
+      </p:par>
+    </p:tnLst>
+  </p:timing>
 </p:sld>
 </file>
 
@@ -29232,527 +25847,13 @@
   <p:clrMapOvr>
     <a:masterClrMapping/>
   </p:clrMapOvr>
-</p:sld>
-</file>
-
-<file path=ppt/slides/slide31.xml><?xml version="1.0" encoding="utf-8"?>
-<p:sld xmlns:a="http://schemas.openxmlformats.org/drawingml/2006/main" xmlns:r="http://schemas.openxmlformats.org/officeDocument/2006/relationships" xmlns:p="http://schemas.openxmlformats.org/presentationml/2006/main" show="0">
-  <p:cSld>
-    <p:spTree>
-      <p:nvGrpSpPr>
-        <p:cNvPr id="1" name=""/>
-        <p:cNvGrpSpPr/>
-        <p:nvPr/>
-      </p:nvGrpSpPr>
-      <p:grpSpPr>
-        <a:xfrm>
-          <a:off x="0" y="0"/>
-          <a:ext cx="0" cy="0"/>
-          <a:chOff x="0" y="0"/>
-          <a:chExt cx="0" cy="0"/>
-        </a:xfrm>
-      </p:grpSpPr>
-      <p:sp>
-        <p:nvSpPr>
-          <p:cNvPr id="2" name="Title 1"/>
-          <p:cNvSpPr>
-            <a:spLocks noGrp="1"/>
-          </p:cNvSpPr>
-          <p:nvPr>
-            <p:ph type="title"/>
-          </p:nvPr>
-        </p:nvSpPr>
-        <p:spPr/>
-        <p:txBody>
-          <a:bodyPr/>
-          <a:lstStyle/>
-          <a:p>
-            <a:r>
-              <a:rPr lang="en-US" dirty="0" smtClean="0"/>
-              <a:t>Use Case: Bios Task Stack Monitor</a:t>
-            </a:r>
-            <a:endParaRPr lang="en-US" dirty="0"/>
-          </a:p>
-        </p:txBody>
-      </p:sp>
-      <p:sp>
-        <p:nvSpPr>
-          <p:cNvPr id="3" name="Content Placeholder 2"/>
-          <p:cNvSpPr>
-            <a:spLocks noGrp="1"/>
-          </p:cNvSpPr>
-          <p:nvPr>
-            <p:ph idx="1"/>
-          </p:nvPr>
-        </p:nvSpPr>
-        <p:spPr/>
-        <p:txBody>
-          <a:bodyPr/>
-          <a:lstStyle/>
-          <a:p>
-            <a:r>
-              <a:rPr lang="en-US" dirty="0" smtClean="0"/>
-              <a:t>Goal?</a:t>
-            </a:r>
-          </a:p>
-          <a:p>
-            <a:pPr lvl="1"/>
-            <a:r>
-              <a:rPr lang="en-US" dirty="0" smtClean="0"/>
-              <a:t>Configure Advanced Event Triggering to generate an interrupt when a value is written to the top 10% of the stack</a:t>
-            </a:r>
-          </a:p>
-          <a:p>
-            <a:r>
-              <a:rPr lang="en-US" dirty="0" smtClean="0"/>
-              <a:t>What do we know?</a:t>
-            </a:r>
-          </a:p>
-          <a:p>
-            <a:pPr lvl="1"/>
-            <a:r>
-              <a:rPr lang="en-US" dirty="0" smtClean="0"/>
-              <a:t>Each Bios Task has it’s own Task Stack. </a:t>
-            </a:r>
-          </a:p>
-          <a:p>
-            <a:pPr lvl="1"/>
-            <a:r>
-              <a:rPr lang="en-US" dirty="0" smtClean="0"/>
-              <a:t>Advanced Event Triggering contains 4 32-bit Dual Range Comparators for watching Data Address Bus</a:t>
-            </a:r>
-          </a:p>
-          <a:p>
-            <a:r>
-              <a:rPr lang="en-US" dirty="0" smtClean="0"/>
-              <a:t>Assumptions</a:t>
-            </a:r>
-          </a:p>
-          <a:p>
-            <a:pPr lvl="1"/>
-            <a:r>
-              <a:rPr lang="en-US" dirty="0" smtClean="0"/>
-              <a:t>Application has 5 tasks; 3 statically generated; 2 dynamically generated</a:t>
-            </a:r>
-          </a:p>
-          <a:p>
-            <a:pPr lvl="1"/>
-            <a:endParaRPr lang="en-US" dirty="0" smtClean="0"/>
-          </a:p>
-          <a:p>
-            <a:pPr lvl="1"/>
-            <a:endParaRPr lang="en-US" dirty="0" smtClean="0"/>
-          </a:p>
-        </p:txBody>
-      </p:sp>
-    </p:spTree>
-  </p:cSld>
-  <p:clrMapOvr>
-    <a:masterClrMapping/>
-  </p:clrMapOvr>
-  <p:transition/>
-</p:sld>
-</file>
-
-<file path=ppt/slides/slide32.xml><?xml version="1.0" encoding="utf-8"?>
-<p:sld xmlns:a="http://schemas.openxmlformats.org/drawingml/2006/main" xmlns:r="http://schemas.openxmlformats.org/officeDocument/2006/relationships" xmlns:p="http://schemas.openxmlformats.org/presentationml/2006/main">
-  <p:cSld>
-    <p:spTree>
-      <p:nvGrpSpPr>
-        <p:cNvPr id="1" name=""/>
-        <p:cNvGrpSpPr/>
-        <p:nvPr/>
-      </p:nvGrpSpPr>
-      <p:grpSpPr>
-        <a:xfrm>
-          <a:off x="0" y="0"/>
-          <a:ext cx="0" cy="0"/>
-          <a:chOff x="0" y="0"/>
-          <a:chExt cx="0" cy="0"/>
-        </a:xfrm>
-      </p:grpSpPr>
-      <p:sp>
-        <p:nvSpPr>
-          <p:cNvPr id="2" name="Title 1"/>
-          <p:cNvSpPr>
-            <a:spLocks noGrp="1"/>
-          </p:cNvSpPr>
-          <p:nvPr>
-            <p:ph type="title"/>
-          </p:nvPr>
-        </p:nvSpPr>
-        <p:spPr/>
-        <p:txBody>
-          <a:bodyPr/>
-          <a:lstStyle/>
-          <a:p>
-            <a:r>
-              <a:rPr lang="en-US" dirty="0" smtClean="0"/>
-              <a:t>Application View</a:t>
-            </a:r>
-            <a:endParaRPr lang="en-US" dirty="0"/>
-          </a:p>
-        </p:txBody>
-      </p:sp>
-      <p:graphicFrame>
-        <p:nvGraphicFramePr>
-          <p:cNvPr id="4" name="Diagram 3"/>
-          <p:cNvGraphicFramePr/>
-          <p:nvPr/>
-        </p:nvGraphicFramePr>
-        <p:xfrm>
-          <a:off x="0" y="1066800"/>
-          <a:ext cx="4191000" cy="3810000"/>
-        </p:xfrm>
-        <a:graphic>
-          <a:graphicData uri="http://schemas.openxmlformats.org/drawingml/2006/diagram">
-            <dgm:relIds xmlns:dgm="http://schemas.openxmlformats.org/drawingml/2006/diagram" xmlns:r="http://schemas.openxmlformats.org/officeDocument/2006/relationships" r:dm="rId3" r:lo="rId4" r:qs="rId5" r:cs="rId6"/>
-          </a:graphicData>
-        </a:graphic>
-      </p:graphicFrame>
-      <p:sp>
-        <p:nvSpPr>
-          <p:cNvPr id="5" name="TextBox 4"/>
-          <p:cNvSpPr txBox="1"/>
-          <p:nvPr/>
-        </p:nvSpPr>
-        <p:spPr>
-          <a:xfrm>
-            <a:off x="4343400" y="1066800"/>
-            <a:ext cx="4800600" cy="1815882"/>
-          </a:xfrm>
-          <a:prstGeom prst="rect">
-            <a:avLst/>
-          </a:prstGeom>
-          <a:noFill/>
-        </p:spPr>
-        <p:txBody>
-          <a:bodyPr wrap="square" rtlCol="0">
-            <a:spAutoFit/>
-          </a:bodyPr>
-          <a:lstStyle/>
-          <a:p>
-            <a:pPr>
-              <a:buFont typeface="Arial" pitchFamily="34" charset="0"/>
-              <a:buChar char="•"/>
-            </a:pPr>
-            <a:r>
-              <a:rPr lang="en-US" sz="2800" dirty="0" smtClean="0"/>
-              <a:t>Each Task has it’s own stack</a:t>
-            </a:r>
-          </a:p>
-          <a:p>
-            <a:pPr>
-              <a:buFont typeface="Arial" pitchFamily="34" charset="0"/>
-              <a:buChar char="•"/>
-            </a:pPr>
-            <a:r>
-              <a:rPr lang="en-US" sz="2800" dirty="0" smtClean="0"/>
-              <a:t>Tasks have different stack sizes</a:t>
-            </a:r>
-          </a:p>
-          <a:p>
-            <a:pPr>
-              <a:buFont typeface="Arial" pitchFamily="34" charset="0"/>
-              <a:buChar char="•"/>
-            </a:pPr>
-            <a:r>
-              <a:rPr lang="en-US" sz="2800" dirty="0" smtClean="0"/>
-              <a:t>Blue – Statically Allocated</a:t>
-            </a:r>
-          </a:p>
-          <a:p>
-            <a:pPr>
-              <a:buFont typeface="Arial" pitchFamily="34" charset="0"/>
-              <a:buChar char="•"/>
-            </a:pPr>
-            <a:r>
-              <a:rPr lang="en-US" sz="2800" dirty="0" smtClean="0"/>
-              <a:t>Red – Dynamically Allocated</a:t>
-            </a:r>
-          </a:p>
-        </p:txBody>
-      </p:sp>
-    </p:spTree>
-  </p:cSld>
-  <p:clrMapOvr>
-    <a:masterClrMapping/>
-  </p:clrMapOvr>
-</p:sld>
-</file>
-
-<file path=ppt/slides/slide33.xml><?xml version="1.0" encoding="utf-8"?>
-<p:sld xmlns:a="http://schemas.openxmlformats.org/drawingml/2006/main" xmlns:r="http://schemas.openxmlformats.org/officeDocument/2006/relationships" xmlns:p="http://schemas.openxmlformats.org/presentationml/2006/main">
-  <p:cSld>
-    <p:spTree>
-      <p:nvGrpSpPr>
-        <p:cNvPr id="1" name=""/>
-        <p:cNvGrpSpPr/>
-        <p:nvPr/>
-      </p:nvGrpSpPr>
-      <p:grpSpPr>
-        <a:xfrm>
-          <a:off x="0" y="0"/>
-          <a:ext cx="0" cy="0"/>
-          <a:chOff x="0" y="0"/>
-          <a:chExt cx="0" cy="0"/>
-        </a:xfrm>
-      </p:grpSpPr>
-      <p:sp>
-        <p:nvSpPr>
-          <p:cNvPr id="2" name="Title 1"/>
-          <p:cNvSpPr>
-            <a:spLocks noGrp="1"/>
-          </p:cNvSpPr>
-          <p:nvPr>
-            <p:ph type="title"/>
-          </p:nvPr>
-        </p:nvSpPr>
-        <p:spPr/>
-        <p:txBody>
-          <a:bodyPr/>
-          <a:lstStyle/>
-          <a:p>
-            <a:r>
-              <a:rPr lang="en-US" dirty="0" smtClean="0"/>
-              <a:t>Dual Range Comparators</a:t>
-            </a:r>
-            <a:endParaRPr lang="en-US" dirty="0"/>
-          </a:p>
-        </p:txBody>
-      </p:sp>
-      <p:sp>
-        <p:nvSpPr>
-          <p:cNvPr id="4" name="Content Placeholder 3"/>
-          <p:cNvSpPr>
-            <a:spLocks noGrp="1"/>
-          </p:cNvSpPr>
-          <p:nvPr>
-            <p:ph idx="10"/>
-          </p:nvPr>
-        </p:nvSpPr>
-        <p:spPr>
-          <a:xfrm>
-            <a:off x="6096000" y="990600"/>
-            <a:ext cx="2819400" cy="5334000"/>
-          </a:xfrm>
-        </p:spPr>
-        <p:txBody>
-          <a:bodyPr/>
-          <a:lstStyle/>
-          <a:p>
-            <a:r>
-              <a:rPr lang="en-US" sz="2400" dirty="0" smtClean="0"/>
-              <a:t>4 Connected to Data Buses</a:t>
-            </a:r>
-          </a:p>
-          <a:p>
-            <a:r>
-              <a:rPr lang="en-US" sz="2400" dirty="0" smtClean="0"/>
-              <a:t>32 Bits </a:t>
-            </a:r>
-          </a:p>
-          <a:p>
-            <a:r>
-              <a:rPr lang="en-US" sz="2400" dirty="0" smtClean="0"/>
-              <a:t>Multiple Configurations </a:t>
-            </a:r>
-          </a:p>
-          <a:p>
-            <a:pPr lvl="1"/>
-            <a:r>
-              <a:rPr lang="en-US" sz="2000" dirty="0" smtClean="0"/>
-              <a:t>GT</a:t>
-            </a:r>
-          </a:p>
-          <a:p>
-            <a:pPr lvl="1"/>
-            <a:r>
-              <a:rPr lang="en-US" sz="2000" dirty="0" smtClean="0"/>
-              <a:t>GEQ</a:t>
-            </a:r>
-          </a:p>
-          <a:p>
-            <a:pPr lvl="1"/>
-            <a:r>
-              <a:rPr lang="en-US" sz="2000" dirty="0" smtClean="0"/>
-              <a:t>LT</a:t>
-            </a:r>
-          </a:p>
-          <a:p>
-            <a:pPr lvl="1"/>
-            <a:r>
-              <a:rPr lang="en-US" sz="2000" dirty="0" smtClean="0"/>
-              <a:t>LEQ</a:t>
-            </a:r>
-          </a:p>
-          <a:p>
-            <a:pPr lvl="1"/>
-            <a:r>
-              <a:rPr lang="en-US" sz="2000" dirty="0" smtClean="0"/>
-              <a:t>EQ</a:t>
-            </a:r>
-          </a:p>
-          <a:p>
-            <a:pPr>
-              <a:buNone/>
-            </a:pPr>
-            <a:endParaRPr lang="en-US" sz="2400" dirty="0"/>
-          </a:p>
-        </p:txBody>
-      </p:sp>
-      <p:grpSp>
-        <p:nvGrpSpPr>
-          <p:cNvPr id="13" name="Group 12"/>
-          <p:cNvGrpSpPr/>
-          <p:nvPr/>
-        </p:nvGrpSpPr>
-        <p:grpSpPr>
-          <a:xfrm>
-            <a:off x="685800" y="1295400"/>
-            <a:ext cx="413896" cy="4495800"/>
-            <a:chOff x="685800" y="1295400"/>
-            <a:chExt cx="413896" cy="4495800"/>
-          </a:xfrm>
-        </p:grpSpPr>
-        <p:cxnSp>
-          <p:nvCxnSpPr>
-            <p:cNvPr id="6" name="Straight Connector 5"/>
-            <p:cNvCxnSpPr/>
-            <p:nvPr/>
-          </p:nvCxnSpPr>
-          <p:spPr bwMode="auto">
-            <a:xfrm>
-              <a:off x="892748" y="1676400"/>
-              <a:ext cx="0" cy="4114800"/>
-            </a:xfrm>
-            <a:prstGeom prst="line">
-              <a:avLst/>
-            </a:prstGeom>
-            <a:solidFill>
-              <a:schemeClr val="accent1"/>
-            </a:solidFill>
-            <a:ln w="9525" cap="flat" cmpd="sng" algn="ctr">
-              <a:solidFill>
-                <a:schemeClr val="tx1"/>
-              </a:solidFill>
-              <a:prstDash val="solid"/>
-              <a:round/>
-              <a:headEnd type="none" w="med" len="med"/>
-              <a:tailEnd type="none" w="med" len="med"/>
-            </a:ln>
-            <a:effectLst/>
-          </p:spPr>
-        </p:cxnSp>
-        <p:sp>
-          <p:nvSpPr>
-            <p:cNvPr id="10" name="TextBox 9"/>
-            <p:cNvSpPr txBox="1"/>
-            <p:nvPr/>
-          </p:nvSpPr>
-          <p:spPr>
-            <a:xfrm>
-              <a:off x="685800" y="1295400"/>
-              <a:ext cx="413896" cy="369332"/>
-            </a:xfrm>
-            <a:prstGeom prst="rect">
-              <a:avLst/>
-            </a:prstGeom>
-            <a:noFill/>
-          </p:spPr>
-          <p:txBody>
-            <a:bodyPr wrap="none" rtlCol="0">
-              <a:spAutoFit/>
-            </a:bodyPr>
-            <a:lstStyle/>
-            <a:p>
-              <a:r>
-                <a:rPr lang="en-US" dirty="0" smtClean="0"/>
-                <a:t>T1</a:t>
-              </a:r>
-              <a:endParaRPr lang="en-US" dirty="0"/>
-            </a:p>
-          </p:txBody>
-        </p:sp>
-      </p:grpSp>
-      <p:grpSp>
-        <p:nvGrpSpPr>
-          <p:cNvPr id="12" name="Group 11"/>
-          <p:cNvGrpSpPr/>
-          <p:nvPr/>
-        </p:nvGrpSpPr>
-        <p:grpSpPr>
-          <a:xfrm>
-            <a:off x="1033904" y="1295400"/>
-            <a:ext cx="413896" cy="4495800"/>
-            <a:chOff x="2176904" y="1295400"/>
-            <a:chExt cx="413896" cy="4495800"/>
-          </a:xfrm>
-        </p:grpSpPr>
-        <p:cxnSp>
-          <p:nvCxnSpPr>
-            <p:cNvPr id="8" name="Straight Connector 7"/>
-            <p:cNvCxnSpPr/>
-            <p:nvPr/>
-          </p:nvCxnSpPr>
-          <p:spPr bwMode="auto">
-            <a:xfrm>
-              <a:off x="2383852" y="1676400"/>
-              <a:ext cx="0" cy="4114800"/>
-            </a:xfrm>
-            <a:prstGeom prst="line">
-              <a:avLst/>
-            </a:prstGeom>
-            <a:solidFill>
-              <a:schemeClr val="accent1"/>
-            </a:solidFill>
-            <a:ln w="9525" cap="flat" cmpd="sng" algn="ctr">
-              <a:solidFill>
-                <a:schemeClr val="tx1"/>
-              </a:solidFill>
-              <a:prstDash val="solid"/>
-              <a:round/>
-              <a:headEnd type="none" w="med" len="med"/>
-              <a:tailEnd type="none" w="med" len="med"/>
-            </a:ln>
-            <a:effectLst/>
-          </p:spPr>
-        </p:cxnSp>
-        <p:sp>
-          <p:nvSpPr>
-            <p:cNvPr id="11" name="TextBox 10"/>
-            <p:cNvSpPr txBox="1"/>
-            <p:nvPr/>
-          </p:nvSpPr>
-          <p:spPr>
-            <a:xfrm>
-              <a:off x="2176904" y="1295400"/>
-              <a:ext cx="413896" cy="369332"/>
-            </a:xfrm>
-            <a:prstGeom prst="rect">
-              <a:avLst/>
-            </a:prstGeom>
-            <a:noFill/>
-          </p:spPr>
-          <p:txBody>
-            <a:bodyPr wrap="none" rtlCol="0">
-              <a:spAutoFit/>
-            </a:bodyPr>
-            <a:lstStyle/>
-            <a:p>
-              <a:r>
-                <a:rPr lang="en-US" dirty="0" smtClean="0"/>
-                <a:t>T2</a:t>
-              </a:r>
-            </a:p>
-          </p:txBody>
-        </p:sp>
-      </p:grpSp>
-    </p:spTree>
-  </p:cSld>
-  <p:clrMapOvr>
-    <a:masterClrMapping/>
-  </p:clrMapOvr>
+  <p:timing>
+    <p:tnLst>
+      <p:par>
+        <p:cTn id="1" dur="indefinite" restart="never" nodeType="tmRoot"/>
+      </p:par>
+    </p:tnLst>
+  </p:timing>
 </p:sld>
 </file>
 
@@ -29979,6 +26080,13 @@
   <p:clrMapOvr>
     <a:masterClrMapping/>
   </p:clrMapOvr>
+  <p:timing>
+    <p:tnLst>
+      <p:par>
+        <p:cTn id="1" dur="indefinite" restart="never" nodeType="tmRoot"/>
+      </p:par>
+    </p:tnLst>
+  </p:timing>
 </p:sld>
 </file>
 
@@ -30308,6 +26416,13 @@
   <p:clrMapOvr>
     <a:masterClrMapping/>
   </p:clrMapOvr>
+  <p:timing>
+    <p:tnLst>
+      <p:par>
+        <p:cTn id="1" dur="indefinite" restart="never" nodeType="tmRoot"/>
+      </p:par>
+    </p:tnLst>
+  </p:timing>
 </p:sld>
 </file>
 
@@ -30506,6 +26621,13 @@
   <p:clrMapOvr>
     <a:masterClrMapping/>
   </p:clrMapOvr>
+  <p:timing>
+    <p:tnLst>
+      <p:par>
+        <p:cTn id="1" dur="indefinite" restart="never" nodeType="tmRoot"/>
+      </p:par>
+    </p:tnLst>
+  </p:timing>
 </p:sld>
 </file>
 
@@ -32446,6 +28568,13 @@
   <p:clrMapOvr>
     <a:masterClrMapping/>
   </p:clrMapOvr>
+  <p:timing>
+    <p:tnLst>
+      <p:par>
+        <p:cTn id="1" dur="indefinite" restart="never" nodeType="tmRoot"/>
+      </p:par>
+    </p:tnLst>
+  </p:timing>
 </p:sld>
 </file>
 
@@ -32734,6 +28863,13 @@
   <p:clrMapOvr>
     <a:masterClrMapping/>
   </p:clrMapOvr>
+  <p:timing>
+    <p:tnLst>
+      <p:par>
+        <p:cTn id="1" dur="indefinite" restart="never" nodeType="tmRoot"/>
+      </p:par>
+    </p:tnLst>
+  </p:timing>
 </p:sld>
 </file>
 
@@ -32884,6 +29020,13 @@
   <p:clrMapOvr>
     <a:masterClrMapping/>
   </p:clrMapOvr>
+  <p:timing>
+    <p:tnLst>
+      <p:par>
+        <p:cTn id="1" dur="indefinite" restart="never" nodeType="tmRoot"/>
+      </p:par>
+    </p:tnLst>
+  </p:timing>
 </p:sld>
 </file>
 

</xml_diff>